<commit_message>
Update process with TaskA001 process
</commit_message>
<xml_diff>
--- a/openshift_process.pptx
+++ b/openshift_process.pptx
@@ -5,15 +5,16 @@
     <p:sldMasterId id="2147483774" r:id="rId1"/>
   </p:sldMasterIdLst>
   <p:notesMasterIdLst>
-    <p:notesMasterId r:id="rId8"/>
+    <p:notesMasterId r:id="rId9"/>
   </p:notesMasterIdLst>
   <p:sldIdLst>
     <p:sldId id="256" r:id="rId2"/>
     <p:sldId id="260" r:id="rId3"/>
     <p:sldId id="262" r:id="rId4"/>
     <p:sldId id="263" r:id="rId5"/>
-    <p:sldId id="261" r:id="rId6"/>
-    <p:sldId id="258" r:id="rId7"/>
+    <p:sldId id="264" r:id="rId6"/>
+    <p:sldId id="261" r:id="rId7"/>
+    <p:sldId id="258" r:id="rId8"/>
   </p:sldIdLst>
   <p:sldSz cx="12192000" cy="6858000"/>
   <p:notesSz cx="6858000" cy="9144000"/>
@@ -112,6 +113,14 @@
       </a:defRPr>
     </a:lvl9pPr>
   </p:defaultTextStyle>
+  <p:extLst>
+    <p:ext uri="{EFAFB233-063F-42B5-8137-9DF3F51BA10A}">
+      <p15:sldGuideLst xmlns:p15="http://schemas.microsoft.com/office/powerpoint/2012/main"/>
+    </p:ext>
+    <p:ext uri="{2D200454-40CA-4A62-9FC3-DE9A4176ACB9}">
+      <p15:notesGuideLst xmlns:p15="http://schemas.microsoft.com/office/powerpoint/2012/main"/>
+    </p:ext>
+  </p:extLst>
 </p:presentation>
 </file>
 
@@ -595,7 +604,7 @@
           <a:p>
             <a:fld id="{BD7B1233-555D-48FA-9E44-77CCB64FCC03}" type="datetimeFigureOut">
               <a:rPr lang="en-US" smtClean="0"/>
-              <a:t>8/23/2019</a:t>
+              <a:t>8/24/2019</a:t>
             </a:fld>
             <a:endParaRPr lang="en-US"/>
           </a:p>
@@ -770,7 +779,7 @@
           <a:p>
             <a:fld id="{BD7B1233-555D-48FA-9E44-77CCB64FCC03}" type="datetimeFigureOut">
               <a:rPr lang="en-US" smtClean="0"/>
-              <a:t>8/23/2019</a:t>
+              <a:t>8/24/2019</a:t>
             </a:fld>
             <a:endParaRPr lang="en-US"/>
           </a:p>
@@ -950,7 +959,7 @@
           <a:p>
             <a:fld id="{BD7B1233-555D-48FA-9E44-77CCB64FCC03}" type="datetimeFigureOut">
               <a:rPr lang="en-US" smtClean="0"/>
-              <a:t>8/23/2019</a:t>
+              <a:t>8/24/2019</a:t>
             </a:fld>
             <a:endParaRPr lang="en-US"/>
           </a:p>
@@ -1125,7 +1134,7 @@
           <a:p>
             <a:fld id="{BD7B1233-555D-48FA-9E44-77CCB64FCC03}" type="datetimeFigureOut">
               <a:rPr lang="en-US" smtClean="0"/>
-              <a:t>8/23/2019</a:t>
+              <a:t>8/24/2019</a:t>
             </a:fld>
             <a:endParaRPr lang="en-US"/>
           </a:p>
@@ -1371,7 +1380,7 @@
           <a:p>
             <a:fld id="{BD7B1233-555D-48FA-9E44-77CCB64FCC03}" type="datetimeFigureOut">
               <a:rPr lang="en-US" smtClean="0"/>
-              <a:t>8/23/2019</a:t>
+              <a:t>8/24/2019</a:t>
             </a:fld>
             <a:endParaRPr lang="en-US"/>
           </a:p>
@@ -1608,7 +1617,7 @@
           <a:p>
             <a:fld id="{BD7B1233-555D-48FA-9E44-77CCB64FCC03}" type="datetimeFigureOut">
               <a:rPr lang="en-US" smtClean="0"/>
-              <a:t>8/23/2019</a:t>
+              <a:t>8/24/2019</a:t>
             </a:fld>
             <a:endParaRPr lang="en-US"/>
           </a:p>
@@ -1975,7 +1984,7 @@
           <a:p>
             <a:fld id="{BD7B1233-555D-48FA-9E44-77CCB64FCC03}" type="datetimeFigureOut">
               <a:rPr lang="en-US" smtClean="0"/>
-              <a:t>8/23/2019</a:t>
+              <a:t>8/24/2019</a:t>
             </a:fld>
             <a:endParaRPr lang="en-US"/>
           </a:p>
@@ -2104,7 +2113,7 @@
           <a:p>
             <a:fld id="{BD7B1233-555D-48FA-9E44-77CCB64FCC03}" type="datetimeFigureOut">
               <a:rPr lang="en-US" smtClean="0"/>
-              <a:t>8/23/2019</a:t>
+              <a:t>8/24/2019</a:t>
             </a:fld>
             <a:endParaRPr lang="en-US"/>
           </a:p>
@@ -2199,7 +2208,7 @@
           <a:p>
             <a:fld id="{BD7B1233-555D-48FA-9E44-77CCB64FCC03}" type="datetimeFigureOut">
               <a:rPr lang="en-US" smtClean="0"/>
-              <a:t>8/23/2019</a:t>
+              <a:t>8/24/2019</a:t>
             </a:fld>
             <a:endParaRPr lang="en-US"/>
           </a:p>
@@ -2476,7 +2485,7 @@
           <a:p>
             <a:fld id="{BD7B1233-555D-48FA-9E44-77CCB64FCC03}" type="datetimeFigureOut">
               <a:rPr lang="en-US" smtClean="0"/>
-              <a:t>8/23/2019</a:t>
+              <a:t>8/24/2019</a:t>
             </a:fld>
             <a:endParaRPr lang="en-US"/>
           </a:p>
@@ -2733,7 +2742,7 @@
           <a:p>
             <a:fld id="{BD7B1233-555D-48FA-9E44-77CCB64FCC03}" type="datetimeFigureOut">
               <a:rPr lang="en-US" smtClean="0"/>
-              <a:t>8/23/2019</a:t>
+              <a:t>8/24/2019</a:t>
             </a:fld>
             <a:endParaRPr lang="en-US"/>
           </a:p>
@@ -2946,7 +2955,7 @@
           <a:p>
             <a:fld id="{BD7B1233-555D-48FA-9E44-77CCB64FCC03}" type="datetimeFigureOut">
               <a:rPr lang="en-US" smtClean="0"/>
-              <a:t>8/23/2019</a:t>
+              <a:t>8/24/2019</a:t>
             </a:fld>
             <a:endParaRPr lang="en-US"/>
           </a:p>
@@ -3377,7 +3386,10 @@
           <a:bodyPr/>
           <a:lstStyle/>
           <a:p>
-            <a:endParaRPr lang="en-US"/>
+            <a:r>
+              <a:rPr lang="en-US" dirty="0"/>
+              <a:t>OMS CICD</a:t>
+            </a:r>
           </a:p>
         </p:txBody>
       </p:sp>
@@ -3402,7 +3414,18 @@
           <a:bodyPr/>
           <a:lstStyle/>
           <a:p>
-            <a:endParaRPr lang="en-US"/>
+            <a:r>
+              <a:rPr lang="en-US" dirty="0"/>
+              <a:t>IBM Sterling OMS v10 CICD process on </a:t>
+            </a:r>
+            <a:r>
+              <a:rPr lang="en-US" dirty="0" err="1"/>
+              <a:t>Redhat</a:t>
+            </a:r>
+            <a:r>
+              <a:rPr lang="en-US" dirty="0"/>
+              <a:t> OpenShift</a:t>
+            </a:r>
           </a:p>
         </p:txBody>
       </p:sp>
@@ -3483,7 +3506,7 @@
         </p:nvSpPr>
         <p:spPr>
           <a:xfrm>
-            <a:off x="50130" y="918954"/>
+            <a:off x="168891" y="854853"/>
             <a:ext cx="2397114" cy="5767856"/>
           </a:xfrm>
           <a:prstGeom prst="roundRect">
@@ -3556,7 +3579,7 @@
         </p:nvGrpSpPr>
         <p:grpSpPr>
           <a:xfrm>
-            <a:off x="270492" y="2513115"/>
+            <a:off x="389253" y="2449014"/>
             <a:ext cx="2005638" cy="1942056"/>
             <a:chOff x="203981" y="1554180"/>
             <a:chExt cx="2005638" cy="1942056"/>
@@ -3869,7 +3892,7 @@
         </p:nvGrpSpPr>
         <p:grpSpPr>
           <a:xfrm>
-            <a:off x="245292" y="4549944"/>
+            <a:off x="364053" y="4485843"/>
             <a:ext cx="2005638" cy="1942057"/>
             <a:chOff x="2306628" y="1554179"/>
             <a:chExt cx="2005638" cy="1942057"/>
@@ -7590,7 +7613,7 @@
         </p:nvSpPr>
         <p:spPr>
           <a:xfrm>
-            <a:off x="270492" y="1393372"/>
+            <a:off x="389253" y="1329271"/>
             <a:ext cx="2005638" cy="924934"/>
           </a:xfrm>
           <a:prstGeom prst="roundRect">
@@ -7663,7 +7686,7 @@
         </p:nvSpPr>
         <p:spPr>
           <a:xfrm>
-            <a:off x="415681" y="1840371"/>
+            <a:off x="534442" y="1776270"/>
             <a:ext cx="701752" cy="360511"/>
           </a:xfrm>
           <a:prstGeom prst="roundRect">
@@ -7736,7 +7759,7 @@
         </p:nvSpPr>
         <p:spPr>
           <a:xfrm>
-            <a:off x="1383834" y="1844156"/>
+            <a:off x="1502595" y="1780055"/>
             <a:ext cx="701752" cy="360511"/>
           </a:xfrm>
           <a:prstGeom prst="roundRect">
@@ -8728,7 +8751,7 @@
           <a:p>
             <a:r>
               <a:rPr lang="en-US" dirty="0"/>
-              <a:t>Initialize OMS Group Env and Repo</a:t>
+              <a:t>Initialize OMS Group (Testing) Environment and CDT</a:t>
             </a:r>
           </a:p>
         </p:txBody>
@@ -8753,21 +8776,42 @@
           <a:prstGeom prst="rect">
             <a:avLst/>
           </a:prstGeom>
-          <a:solidFill>
-            <a:srgbClr val="C00000"/>
-          </a:solidFill>
+          <a:gradFill flip="none" rotWithShape="1">
+            <a:gsLst>
+              <a:gs pos="0">
+                <a:schemeClr val="accent4">
+                  <a:lumMod val="67000"/>
+                </a:schemeClr>
+              </a:gs>
+              <a:gs pos="48000">
+                <a:schemeClr val="accent4">
+                  <a:lumMod val="97000"/>
+                  <a:lumOff val="3000"/>
+                </a:schemeClr>
+              </a:gs>
+              <a:gs pos="100000">
+                <a:schemeClr val="accent4">
+                  <a:lumMod val="60000"/>
+                  <a:lumOff val="40000"/>
+                </a:schemeClr>
+              </a:gs>
+            </a:gsLst>
+            <a:lin ang="16200000" scaled="1"/>
+            <a:tileRect/>
+          </a:gradFill>
+          <a:ln>
+            <a:noFill/>
+          </a:ln>
         </p:spPr>
         <p:style>
-          <a:lnRef idx="2">
-            <a:schemeClr val="accent1">
-              <a:shade val="50000"/>
-            </a:schemeClr>
+          <a:lnRef idx="0">
+            <a:scrgbClr r="0" g="0" b="0"/>
           </a:lnRef>
-          <a:fillRef idx="1">
-            <a:schemeClr val="accent1"/>
+          <a:fillRef idx="0">
+            <a:scrgbClr r="0" g="0" b="0"/>
           </a:fillRef>
           <a:effectRef idx="0">
-            <a:schemeClr val="accent1"/>
+            <a:scrgbClr r="0" g="0" b="0"/>
           </a:effectRef>
           <a:fontRef idx="minor">
             <a:schemeClr val="lt1"/>
@@ -8832,7 +8876,7 @@
             <a:pPr algn="ctr"/>
             <a:r>
               <a:rPr lang="en-US" dirty="0"/>
-              <a:t>OMS Group Project</a:t>
+              <a:t>OMS Group (Testing) Project</a:t>
             </a:r>
           </a:p>
         </p:txBody>
@@ -9562,7 +9606,7 @@
             <a:pPr algn="ctr"/>
             <a:r>
               <a:rPr lang="en-US" sz="800" dirty="0"/>
-              <a:t>Base OCT</a:t>
+              <a:t>Base CDT</a:t>
             </a:r>
           </a:p>
         </p:txBody>
@@ -11385,7 +11429,7 @@
             <a:pPr algn="ctr"/>
             <a:r>
               <a:rPr lang="en-US" dirty="0"/>
-              <a:t>Service A Project</a:t>
+              <a:t>Service A Dev Project</a:t>
             </a:r>
           </a:p>
         </p:txBody>
@@ -11434,7 +11478,7 @@
             <a:pPr algn="ctr"/>
             <a:r>
               <a:rPr lang="en-US" sz="800" dirty="0"/>
-              <a:t>Base OCT</a:t>
+              <a:t>Base CDT</a:t>
             </a:r>
           </a:p>
         </p:txBody>
@@ -12928,6 +12972,2820 @@
           <p:cNvPr id="2" name="Title 1">
             <a:extLst>
               <a:ext uri="{FF2B5EF4-FFF2-40B4-BE49-F238E27FC236}">
+                <a16:creationId xmlns:a16="http://schemas.microsoft.com/office/drawing/2014/main" id="{BDFD3F3F-AF75-4C88-A814-75BF3011B88B}"/>
+              </a:ext>
+            </a:extLst>
+          </p:cNvPr>
+          <p:cNvSpPr>
+            <a:spLocks noGrp="1"/>
+          </p:cNvSpPr>
+          <p:nvPr>
+            <p:ph type="title"/>
+          </p:nvPr>
+        </p:nvSpPr>
+        <p:spPr>
+          <a:xfrm>
+            <a:off x="587189" y="189941"/>
+            <a:ext cx="10515600" cy="482412"/>
+          </a:xfrm>
+        </p:spPr>
+        <p:txBody>
+          <a:bodyPr/>
+          <a:lstStyle/>
+          <a:p>
+            <a:r>
+              <a:rPr lang="en-US" dirty="0"/>
+              <a:t>Task A001 Development (and testing)</a:t>
+            </a:r>
+          </a:p>
+        </p:txBody>
+      </p:sp>
+      <p:sp>
+        <p:nvSpPr>
+          <p:cNvPr id="3" name="Rectangle 2">
+            <a:extLst>
+              <a:ext uri="{FF2B5EF4-FFF2-40B4-BE49-F238E27FC236}">
+                <a16:creationId xmlns:a16="http://schemas.microsoft.com/office/drawing/2014/main" id="{C662BC5F-3B49-4675-8541-ADF98EB865CD}"/>
+              </a:ext>
+            </a:extLst>
+          </p:cNvPr>
+          <p:cNvSpPr/>
+          <p:nvPr/>
+        </p:nvSpPr>
+        <p:spPr>
+          <a:xfrm>
+            <a:off x="3469786" y="965395"/>
+            <a:ext cx="1428983" cy="4826942"/>
+          </a:xfrm>
+          <a:prstGeom prst="rect">
+            <a:avLst/>
+          </a:prstGeom>
+          <a:gradFill flip="none" rotWithShape="1">
+            <a:gsLst>
+              <a:gs pos="0">
+                <a:schemeClr val="accent4">
+                  <a:lumMod val="67000"/>
+                </a:schemeClr>
+              </a:gs>
+              <a:gs pos="48000">
+                <a:schemeClr val="accent4">
+                  <a:lumMod val="97000"/>
+                  <a:lumOff val="3000"/>
+                </a:schemeClr>
+              </a:gs>
+              <a:gs pos="100000">
+                <a:schemeClr val="accent4">
+                  <a:lumMod val="60000"/>
+                  <a:lumOff val="40000"/>
+                </a:schemeClr>
+              </a:gs>
+            </a:gsLst>
+            <a:lin ang="16200000" scaled="1"/>
+            <a:tileRect/>
+          </a:gradFill>
+          <a:ln>
+            <a:noFill/>
+          </a:ln>
+        </p:spPr>
+        <p:style>
+          <a:lnRef idx="0">
+            <a:scrgbClr r="0" g="0" b="0"/>
+          </a:lnRef>
+          <a:fillRef idx="0">
+            <a:scrgbClr r="0" g="0" b="0"/>
+          </a:fillRef>
+          <a:effectRef idx="0">
+            <a:scrgbClr r="0" g="0" b="0"/>
+          </a:effectRef>
+          <a:fontRef idx="minor">
+            <a:schemeClr val="lt1"/>
+          </a:fontRef>
+        </p:style>
+        <p:txBody>
+          <a:bodyPr rtlCol="0" anchor="t"/>
+          <a:lstStyle/>
+          <a:p>
+            <a:pPr algn="ctr"/>
+            <a:r>
+              <a:rPr lang="en-US" dirty="0"/>
+              <a:t>Git</a:t>
+            </a:r>
+          </a:p>
+        </p:txBody>
+      </p:sp>
+      <p:sp>
+        <p:nvSpPr>
+          <p:cNvPr id="5" name="Rectangle 4">
+            <a:extLst>
+              <a:ext uri="{FF2B5EF4-FFF2-40B4-BE49-F238E27FC236}">
+                <a16:creationId xmlns:a16="http://schemas.microsoft.com/office/drawing/2014/main" id="{627E70CB-77C6-4F53-BA98-BBDF3A079C9B}"/>
+              </a:ext>
+            </a:extLst>
+          </p:cNvPr>
+          <p:cNvSpPr/>
+          <p:nvPr/>
+        </p:nvSpPr>
+        <p:spPr>
+          <a:xfrm>
+            <a:off x="1101147" y="959219"/>
+            <a:ext cx="2274765" cy="4513291"/>
+          </a:xfrm>
+          <a:prstGeom prst="rect">
+            <a:avLst/>
+          </a:prstGeom>
+          <a:solidFill>
+            <a:srgbClr val="C00000"/>
+          </a:solidFill>
+        </p:spPr>
+        <p:style>
+          <a:lnRef idx="2">
+            <a:schemeClr val="accent1">
+              <a:shade val="50000"/>
+            </a:schemeClr>
+          </a:lnRef>
+          <a:fillRef idx="1">
+            <a:schemeClr val="accent1"/>
+          </a:fillRef>
+          <a:effectRef idx="0">
+            <a:schemeClr val="accent1"/>
+          </a:effectRef>
+          <a:fontRef idx="minor">
+            <a:schemeClr val="lt1"/>
+          </a:fontRef>
+        </p:style>
+        <p:txBody>
+          <a:bodyPr rtlCol="0" anchor="t"/>
+          <a:lstStyle/>
+          <a:p>
+            <a:pPr algn="ctr"/>
+            <a:r>
+              <a:rPr lang="en-US" dirty="0"/>
+              <a:t>OpenShift Registry</a:t>
+            </a:r>
+          </a:p>
+        </p:txBody>
+      </p:sp>
+      <p:sp>
+        <p:nvSpPr>
+          <p:cNvPr id="6" name="Rectangle: Rounded Corners 5">
+            <a:extLst>
+              <a:ext uri="{FF2B5EF4-FFF2-40B4-BE49-F238E27FC236}">
+                <a16:creationId xmlns:a16="http://schemas.microsoft.com/office/drawing/2014/main" id="{E7A8A31C-4E1C-4DA7-81CF-9C8F57A31607}"/>
+              </a:ext>
+            </a:extLst>
+          </p:cNvPr>
+          <p:cNvSpPr/>
+          <p:nvPr/>
+        </p:nvSpPr>
+        <p:spPr>
+          <a:xfrm>
+            <a:off x="1380692" y="2551066"/>
+            <a:ext cx="1027032" cy="336626"/>
+          </a:xfrm>
+          <a:prstGeom prst="roundRect">
+            <a:avLst/>
+          </a:prstGeom>
+        </p:spPr>
+        <p:style>
+          <a:lnRef idx="2">
+            <a:schemeClr val="accent1">
+              <a:shade val="50000"/>
+            </a:schemeClr>
+          </a:lnRef>
+          <a:fillRef idx="1">
+            <a:schemeClr val="accent1"/>
+          </a:fillRef>
+          <a:effectRef idx="0">
+            <a:schemeClr val="accent1"/>
+          </a:effectRef>
+          <a:fontRef idx="minor">
+            <a:schemeClr val="lt1"/>
+          </a:fontRef>
+        </p:style>
+        <p:txBody>
+          <a:bodyPr rtlCol="0" anchor="ctr"/>
+          <a:lstStyle/>
+          <a:p>
+            <a:pPr algn="ctr"/>
+            <a:r>
+              <a:rPr lang="en-US" sz="900" dirty="0"/>
+              <a:t>Image</a:t>
+            </a:r>
+          </a:p>
+          <a:p>
+            <a:pPr algn="ctr"/>
+            <a:r>
+              <a:rPr lang="en-US" sz="900" dirty="0"/>
+              <a:t>OOB Agent</a:t>
+            </a:r>
+          </a:p>
+        </p:txBody>
+      </p:sp>
+      <p:sp>
+        <p:nvSpPr>
+          <p:cNvPr id="7" name="Rectangle: Rounded Corners 6">
+            <a:extLst>
+              <a:ext uri="{FF2B5EF4-FFF2-40B4-BE49-F238E27FC236}">
+                <a16:creationId xmlns:a16="http://schemas.microsoft.com/office/drawing/2014/main" id="{77DCA46F-ADFC-432B-BA5F-A776601F7021}"/>
+              </a:ext>
+            </a:extLst>
+          </p:cNvPr>
+          <p:cNvSpPr/>
+          <p:nvPr/>
+        </p:nvSpPr>
+        <p:spPr>
+          <a:xfrm>
+            <a:off x="1380692" y="2094919"/>
+            <a:ext cx="1027032" cy="336626"/>
+          </a:xfrm>
+          <a:prstGeom prst="roundRect">
+            <a:avLst/>
+          </a:prstGeom>
+        </p:spPr>
+        <p:style>
+          <a:lnRef idx="2">
+            <a:schemeClr val="accent1">
+              <a:shade val="50000"/>
+            </a:schemeClr>
+          </a:lnRef>
+          <a:fillRef idx="1">
+            <a:schemeClr val="accent1"/>
+          </a:fillRef>
+          <a:effectRef idx="0">
+            <a:schemeClr val="accent1"/>
+          </a:effectRef>
+          <a:fontRef idx="minor">
+            <a:schemeClr val="lt1"/>
+          </a:fontRef>
+        </p:style>
+        <p:txBody>
+          <a:bodyPr rtlCol="0" anchor="ctr"/>
+          <a:lstStyle/>
+          <a:p>
+            <a:pPr algn="ctr"/>
+            <a:r>
+              <a:rPr lang="en-US" sz="900" dirty="0"/>
+              <a:t>Image</a:t>
+            </a:r>
+          </a:p>
+          <a:p>
+            <a:pPr algn="ctr"/>
+            <a:r>
+              <a:rPr lang="en-US" sz="900" dirty="0"/>
+              <a:t>OOB App</a:t>
+            </a:r>
+          </a:p>
+        </p:txBody>
+      </p:sp>
+      <p:sp>
+        <p:nvSpPr>
+          <p:cNvPr id="8" name="Rectangle: Rounded Corners 7">
+            <a:extLst>
+              <a:ext uri="{FF2B5EF4-FFF2-40B4-BE49-F238E27FC236}">
+                <a16:creationId xmlns:a16="http://schemas.microsoft.com/office/drawing/2014/main" id="{3410811C-7345-4FA0-9C97-C8703953AF99}"/>
+              </a:ext>
+            </a:extLst>
+          </p:cNvPr>
+          <p:cNvSpPr/>
+          <p:nvPr/>
+        </p:nvSpPr>
+        <p:spPr>
+          <a:xfrm>
+            <a:off x="1380692" y="1638772"/>
+            <a:ext cx="1027032" cy="336626"/>
+          </a:xfrm>
+          <a:prstGeom prst="roundRect">
+            <a:avLst/>
+          </a:prstGeom>
+        </p:spPr>
+        <p:style>
+          <a:lnRef idx="2">
+            <a:schemeClr val="accent1">
+              <a:shade val="50000"/>
+            </a:schemeClr>
+          </a:lnRef>
+          <a:fillRef idx="1">
+            <a:schemeClr val="accent1"/>
+          </a:fillRef>
+          <a:effectRef idx="0">
+            <a:schemeClr val="accent1"/>
+          </a:effectRef>
+          <a:fontRef idx="minor">
+            <a:schemeClr val="lt1"/>
+          </a:fontRef>
+        </p:style>
+        <p:txBody>
+          <a:bodyPr rtlCol="0" anchor="ctr"/>
+          <a:lstStyle/>
+          <a:p>
+            <a:pPr algn="ctr"/>
+            <a:r>
+              <a:rPr lang="en-US" sz="900" dirty="0"/>
+              <a:t>Image</a:t>
+            </a:r>
+          </a:p>
+          <a:p>
+            <a:pPr algn="ctr"/>
+            <a:r>
+              <a:rPr lang="en-US" sz="900" dirty="0"/>
+              <a:t>OOB Foundation</a:t>
+            </a:r>
+          </a:p>
+        </p:txBody>
+      </p:sp>
+      <p:sp>
+        <p:nvSpPr>
+          <p:cNvPr id="9" name="Rectangle 8">
+            <a:extLst>
+              <a:ext uri="{FF2B5EF4-FFF2-40B4-BE49-F238E27FC236}">
+                <a16:creationId xmlns:a16="http://schemas.microsoft.com/office/drawing/2014/main" id="{658D5B1D-6C39-4945-B928-666A7A5708B6}"/>
+              </a:ext>
+            </a:extLst>
+          </p:cNvPr>
+          <p:cNvSpPr/>
+          <p:nvPr/>
+        </p:nvSpPr>
+        <p:spPr>
+          <a:xfrm>
+            <a:off x="5027558" y="959219"/>
+            <a:ext cx="5782054" cy="1086606"/>
+          </a:xfrm>
+          <a:prstGeom prst="rect">
+            <a:avLst/>
+          </a:prstGeom>
+          <a:solidFill>
+            <a:srgbClr val="C00000"/>
+          </a:solidFill>
+        </p:spPr>
+        <p:style>
+          <a:lnRef idx="2">
+            <a:schemeClr val="accent1">
+              <a:shade val="50000"/>
+            </a:schemeClr>
+          </a:lnRef>
+          <a:fillRef idx="1">
+            <a:schemeClr val="accent1"/>
+          </a:fillRef>
+          <a:effectRef idx="0">
+            <a:schemeClr val="accent1"/>
+          </a:effectRef>
+          <a:fontRef idx="minor">
+            <a:schemeClr val="lt1"/>
+          </a:fontRef>
+        </p:style>
+        <p:txBody>
+          <a:bodyPr rtlCol="0" anchor="ctr"/>
+          <a:lstStyle/>
+          <a:p>
+            <a:pPr algn="ctr"/>
+            <a:r>
+              <a:rPr lang="en-US" dirty="0"/>
+              <a:t>RH OS Cluster</a:t>
+            </a:r>
+          </a:p>
+        </p:txBody>
+      </p:sp>
+      <p:sp>
+        <p:nvSpPr>
+          <p:cNvPr id="10" name="Rectangle: Rounded Corners 9">
+            <a:extLst>
+              <a:ext uri="{FF2B5EF4-FFF2-40B4-BE49-F238E27FC236}">
+                <a16:creationId xmlns:a16="http://schemas.microsoft.com/office/drawing/2014/main" id="{580CA604-6520-41AF-A104-ACDA0D0B5EB9}"/>
+              </a:ext>
+            </a:extLst>
+          </p:cNvPr>
+          <p:cNvSpPr/>
+          <p:nvPr/>
+        </p:nvSpPr>
+        <p:spPr>
+          <a:xfrm>
+            <a:off x="1380692" y="3463360"/>
+            <a:ext cx="1027032" cy="336626"/>
+          </a:xfrm>
+          <a:prstGeom prst="roundRect">
+            <a:avLst/>
+          </a:prstGeom>
+          <a:solidFill>
+            <a:schemeClr val="accent6">
+              <a:lumMod val="75000"/>
+            </a:schemeClr>
+          </a:solidFill>
+        </p:spPr>
+        <p:style>
+          <a:lnRef idx="2">
+            <a:schemeClr val="accent1">
+              <a:shade val="50000"/>
+            </a:schemeClr>
+          </a:lnRef>
+          <a:fillRef idx="1">
+            <a:schemeClr val="accent1"/>
+          </a:fillRef>
+          <a:effectRef idx="0">
+            <a:schemeClr val="accent1"/>
+          </a:effectRef>
+          <a:fontRef idx="minor">
+            <a:schemeClr val="lt1"/>
+          </a:fontRef>
+        </p:style>
+        <p:txBody>
+          <a:bodyPr rtlCol="0" anchor="ctr"/>
+          <a:lstStyle/>
+          <a:p>
+            <a:pPr algn="ctr"/>
+            <a:r>
+              <a:rPr lang="en-US" sz="900" dirty="0"/>
+              <a:t>Image</a:t>
+            </a:r>
+          </a:p>
+          <a:p>
+            <a:pPr algn="ctr"/>
+            <a:r>
+              <a:rPr lang="en-US" sz="900" dirty="0"/>
+              <a:t>ActiveMQ</a:t>
+            </a:r>
+          </a:p>
+        </p:txBody>
+      </p:sp>
+      <p:sp>
+        <p:nvSpPr>
+          <p:cNvPr id="11" name="Rectangle: Rounded Corners 10">
+            <a:extLst>
+              <a:ext uri="{FF2B5EF4-FFF2-40B4-BE49-F238E27FC236}">
+                <a16:creationId xmlns:a16="http://schemas.microsoft.com/office/drawing/2014/main" id="{56EDDB0E-90C2-4A2C-B53A-1F5952038C40}"/>
+              </a:ext>
+            </a:extLst>
+          </p:cNvPr>
+          <p:cNvSpPr/>
+          <p:nvPr/>
+        </p:nvSpPr>
+        <p:spPr>
+          <a:xfrm>
+            <a:off x="1380692" y="3007213"/>
+            <a:ext cx="1027032" cy="336626"/>
+          </a:xfrm>
+          <a:prstGeom prst="roundRect">
+            <a:avLst/>
+          </a:prstGeom>
+          <a:solidFill>
+            <a:schemeClr val="accent6">
+              <a:lumMod val="75000"/>
+            </a:schemeClr>
+          </a:solidFill>
+        </p:spPr>
+        <p:style>
+          <a:lnRef idx="2">
+            <a:schemeClr val="accent1">
+              <a:shade val="50000"/>
+            </a:schemeClr>
+          </a:lnRef>
+          <a:fillRef idx="1">
+            <a:schemeClr val="accent1"/>
+          </a:fillRef>
+          <a:effectRef idx="0">
+            <a:schemeClr val="accent1"/>
+          </a:effectRef>
+          <a:fontRef idx="minor">
+            <a:schemeClr val="lt1"/>
+          </a:fontRef>
+        </p:style>
+        <p:txBody>
+          <a:bodyPr rtlCol="0" anchor="ctr"/>
+          <a:lstStyle/>
+          <a:p>
+            <a:pPr algn="ctr"/>
+            <a:r>
+              <a:rPr lang="en-US" sz="900" dirty="0"/>
+              <a:t>Image</a:t>
+            </a:r>
+          </a:p>
+          <a:p>
+            <a:pPr algn="ctr"/>
+            <a:r>
+              <a:rPr lang="en-US" sz="900" dirty="0"/>
+              <a:t>DB2</a:t>
+            </a:r>
+          </a:p>
+        </p:txBody>
+      </p:sp>
+      <p:sp>
+        <p:nvSpPr>
+          <p:cNvPr id="15" name="Rectangle 14">
+            <a:extLst>
+              <a:ext uri="{FF2B5EF4-FFF2-40B4-BE49-F238E27FC236}">
+                <a16:creationId xmlns:a16="http://schemas.microsoft.com/office/drawing/2014/main" id="{A8C6E649-69D2-49C5-86B9-AB309C90AD84}"/>
+              </a:ext>
+            </a:extLst>
+          </p:cNvPr>
+          <p:cNvSpPr/>
+          <p:nvPr/>
+        </p:nvSpPr>
+        <p:spPr>
+          <a:xfrm>
+            <a:off x="5027557" y="2078496"/>
+            <a:ext cx="5782053" cy="336626"/>
+          </a:xfrm>
+          <a:prstGeom prst="rect">
+            <a:avLst/>
+          </a:prstGeom>
+          <a:solidFill>
+            <a:srgbClr val="002060"/>
+          </a:solidFill>
+        </p:spPr>
+        <p:style>
+          <a:lnRef idx="2">
+            <a:schemeClr val="accent1">
+              <a:shade val="50000"/>
+            </a:schemeClr>
+          </a:lnRef>
+          <a:fillRef idx="1">
+            <a:schemeClr val="accent1"/>
+          </a:fillRef>
+          <a:effectRef idx="0">
+            <a:schemeClr val="accent1"/>
+          </a:effectRef>
+          <a:fontRef idx="minor">
+            <a:schemeClr val="lt1"/>
+          </a:fontRef>
+        </p:style>
+        <p:txBody>
+          <a:bodyPr rtlCol="0" anchor="ctr"/>
+          <a:lstStyle/>
+          <a:p>
+            <a:pPr algn="ctr"/>
+            <a:r>
+              <a:rPr lang="en-US" dirty="0"/>
+              <a:t>IBM Common Service</a:t>
+            </a:r>
+          </a:p>
+        </p:txBody>
+      </p:sp>
+      <p:sp>
+        <p:nvSpPr>
+          <p:cNvPr id="18" name="Rectangle 17">
+            <a:extLst>
+              <a:ext uri="{FF2B5EF4-FFF2-40B4-BE49-F238E27FC236}">
+                <a16:creationId xmlns:a16="http://schemas.microsoft.com/office/drawing/2014/main" id="{0EB48C62-2372-49A1-A36F-FD92B7DFE2FF}"/>
+              </a:ext>
+            </a:extLst>
+          </p:cNvPr>
+          <p:cNvSpPr/>
+          <p:nvPr/>
+        </p:nvSpPr>
+        <p:spPr>
+          <a:xfrm>
+            <a:off x="5253316" y="2478941"/>
+            <a:ext cx="5440681" cy="3317915"/>
+          </a:xfrm>
+          <a:prstGeom prst="rect">
+            <a:avLst/>
+          </a:prstGeom>
+          <a:solidFill>
+            <a:srgbClr val="C00000"/>
+          </a:solidFill>
+        </p:spPr>
+        <p:style>
+          <a:lnRef idx="2">
+            <a:schemeClr val="accent1">
+              <a:shade val="50000"/>
+            </a:schemeClr>
+          </a:lnRef>
+          <a:fillRef idx="1">
+            <a:schemeClr val="accent1"/>
+          </a:fillRef>
+          <a:effectRef idx="0">
+            <a:schemeClr val="accent1"/>
+          </a:effectRef>
+          <a:fontRef idx="minor">
+            <a:schemeClr val="lt1"/>
+          </a:fontRef>
+        </p:style>
+        <p:txBody>
+          <a:bodyPr rtlCol="0" anchor="t"/>
+          <a:lstStyle/>
+          <a:p>
+            <a:pPr algn="ctr"/>
+            <a:r>
+              <a:rPr lang="en-US" dirty="0"/>
+              <a:t>Service A Dev Project</a:t>
+            </a:r>
+          </a:p>
+        </p:txBody>
+      </p:sp>
+      <p:sp>
+        <p:nvSpPr>
+          <p:cNvPr id="4" name="Rectangle 3">
+            <a:extLst>
+              <a:ext uri="{FF2B5EF4-FFF2-40B4-BE49-F238E27FC236}">
+                <a16:creationId xmlns:a16="http://schemas.microsoft.com/office/drawing/2014/main" id="{44BD849C-DAD1-4E1D-AA12-82CAAF521E61}"/>
+              </a:ext>
+            </a:extLst>
+          </p:cNvPr>
+          <p:cNvSpPr/>
+          <p:nvPr/>
+        </p:nvSpPr>
+        <p:spPr>
+          <a:xfrm>
+            <a:off x="6968692" y="3991631"/>
+            <a:ext cx="3303456" cy="1547605"/>
+          </a:xfrm>
+          <a:prstGeom prst="rect">
+            <a:avLst/>
+          </a:prstGeom>
+          <a:noFill/>
+          <a:ln w="38100">
+            <a:solidFill>
+              <a:schemeClr val="bg1">
+                <a:lumMod val="95000"/>
+                <a:lumOff val="5000"/>
+              </a:schemeClr>
+            </a:solidFill>
+            <a:prstDash val="lgDashDot"/>
+          </a:ln>
+        </p:spPr>
+        <p:style>
+          <a:lnRef idx="2">
+            <a:schemeClr val="accent1">
+              <a:shade val="50000"/>
+            </a:schemeClr>
+          </a:lnRef>
+          <a:fillRef idx="1">
+            <a:schemeClr val="accent1"/>
+          </a:fillRef>
+          <a:effectRef idx="0">
+            <a:schemeClr val="accent1"/>
+          </a:effectRef>
+          <a:fontRef idx="minor">
+            <a:schemeClr val="lt1"/>
+          </a:fontRef>
+        </p:style>
+        <p:txBody>
+          <a:bodyPr rtlCol="0" anchor="t"/>
+          <a:lstStyle/>
+          <a:p>
+            <a:r>
+              <a:rPr lang="en-US" sz="1100" dirty="0"/>
+              <a:t>Task 001 Run Time</a:t>
+            </a:r>
+          </a:p>
+          <a:p>
+            <a:endParaRPr lang="en-US" sz="1100" dirty="0"/>
+          </a:p>
+        </p:txBody>
+      </p:sp>
+      <p:sp>
+        <p:nvSpPr>
+          <p:cNvPr id="21" name="Oval 20">
+            <a:extLst>
+              <a:ext uri="{FF2B5EF4-FFF2-40B4-BE49-F238E27FC236}">
+                <a16:creationId xmlns:a16="http://schemas.microsoft.com/office/drawing/2014/main" id="{B65AFB2E-58AD-4F8D-A5BC-C852021EAF2E}"/>
+              </a:ext>
+            </a:extLst>
+          </p:cNvPr>
+          <p:cNvSpPr/>
+          <p:nvPr/>
+        </p:nvSpPr>
+        <p:spPr>
+          <a:xfrm>
+            <a:off x="7992229" y="3267065"/>
+            <a:ext cx="914400" cy="504939"/>
+          </a:xfrm>
+          <a:prstGeom prst="ellipse">
+            <a:avLst/>
+          </a:prstGeom>
+          <a:solidFill>
+            <a:schemeClr val="accent6">
+              <a:lumMod val="75000"/>
+            </a:schemeClr>
+          </a:solidFill>
+        </p:spPr>
+        <p:style>
+          <a:lnRef idx="2">
+            <a:schemeClr val="accent1">
+              <a:shade val="50000"/>
+            </a:schemeClr>
+          </a:lnRef>
+          <a:fillRef idx="1">
+            <a:schemeClr val="accent1"/>
+          </a:fillRef>
+          <a:effectRef idx="0">
+            <a:schemeClr val="accent1"/>
+          </a:effectRef>
+          <a:fontRef idx="minor">
+            <a:schemeClr val="lt1"/>
+          </a:fontRef>
+        </p:style>
+        <p:txBody>
+          <a:bodyPr rtlCol="0" anchor="ctr"/>
+          <a:lstStyle/>
+          <a:p>
+            <a:pPr algn="ctr"/>
+            <a:r>
+              <a:rPr lang="en-US" sz="800" dirty="0"/>
+              <a:t>Container</a:t>
+            </a:r>
+          </a:p>
+          <a:p>
+            <a:pPr algn="ctr"/>
+            <a:r>
+              <a:rPr lang="en-US" sz="800" dirty="0"/>
+              <a:t>DB2 Config</a:t>
+            </a:r>
+          </a:p>
+          <a:p>
+            <a:pPr algn="ctr"/>
+            <a:r>
+              <a:rPr lang="en-US" sz="800" dirty="0"/>
+              <a:t>Base CDT</a:t>
+            </a:r>
+          </a:p>
+        </p:txBody>
+      </p:sp>
+      <p:sp>
+        <p:nvSpPr>
+          <p:cNvPr id="22" name="Oval 21">
+            <a:extLst>
+              <a:ext uri="{FF2B5EF4-FFF2-40B4-BE49-F238E27FC236}">
+                <a16:creationId xmlns:a16="http://schemas.microsoft.com/office/drawing/2014/main" id="{C52CC768-E412-4890-A899-785F066881E1}"/>
+              </a:ext>
+            </a:extLst>
+          </p:cNvPr>
+          <p:cNvSpPr/>
+          <p:nvPr/>
+        </p:nvSpPr>
+        <p:spPr>
+          <a:xfrm>
+            <a:off x="8735146" y="3311342"/>
+            <a:ext cx="914400" cy="504939"/>
+          </a:xfrm>
+          <a:prstGeom prst="ellipse">
+            <a:avLst/>
+          </a:prstGeom>
+          <a:solidFill>
+            <a:schemeClr val="accent6">
+              <a:lumMod val="75000"/>
+            </a:schemeClr>
+          </a:solidFill>
+        </p:spPr>
+        <p:style>
+          <a:lnRef idx="2">
+            <a:schemeClr val="accent1">
+              <a:shade val="50000"/>
+            </a:schemeClr>
+          </a:lnRef>
+          <a:fillRef idx="1">
+            <a:schemeClr val="accent1"/>
+          </a:fillRef>
+          <a:effectRef idx="0">
+            <a:schemeClr val="accent1"/>
+          </a:effectRef>
+          <a:fontRef idx="minor">
+            <a:schemeClr val="lt1"/>
+          </a:fontRef>
+        </p:style>
+        <p:txBody>
+          <a:bodyPr rtlCol="0" anchor="ctr"/>
+          <a:lstStyle/>
+          <a:p>
+            <a:pPr algn="ctr"/>
+            <a:r>
+              <a:rPr lang="en-US" sz="800" dirty="0"/>
+              <a:t>Container</a:t>
+            </a:r>
+          </a:p>
+          <a:p>
+            <a:pPr algn="ctr"/>
+            <a:r>
+              <a:rPr lang="en-US" sz="800" dirty="0"/>
+              <a:t>DB2 </a:t>
+            </a:r>
+            <a:r>
+              <a:rPr lang="en-US" sz="800" dirty="0" err="1"/>
+              <a:t>NonConfig</a:t>
+            </a:r>
+            <a:endParaRPr lang="en-US" sz="800" dirty="0"/>
+          </a:p>
+        </p:txBody>
+      </p:sp>
+      <p:sp>
+        <p:nvSpPr>
+          <p:cNvPr id="23" name="Rectangle 22">
+            <a:extLst>
+              <a:ext uri="{FF2B5EF4-FFF2-40B4-BE49-F238E27FC236}">
+                <a16:creationId xmlns:a16="http://schemas.microsoft.com/office/drawing/2014/main" id="{8448B24D-02A4-4D8D-9218-59633BFAF6AB}"/>
+              </a:ext>
+            </a:extLst>
+          </p:cNvPr>
+          <p:cNvSpPr/>
+          <p:nvPr/>
+        </p:nvSpPr>
+        <p:spPr>
+          <a:xfrm>
+            <a:off x="5576436" y="2838900"/>
+            <a:ext cx="4831587" cy="336626"/>
+          </a:xfrm>
+          <a:prstGeom prst="rect">
+            <a:avLst/>
+          </a:prstGeom>
+          <a:solidFill>
+            <a:srgbClr val="002060"/>
+          </a:solidFill>
+        </p:spPr>
+        <p:style>
+          <a:lnRef idx="2">
+            <a:schemeClr val="accent1">
+              <a:shade val="50000"/>
+            </a:schemeClr>
+          </a:lnRef>
+          <a:fillRef idx="1">
+            <a:schemeClr val="accent1"/>
+          </a:fillRef>
+          <a:effectRef idx="0">
+            <a:schemeClr val="accent1"/>
+          </a:effectRef>
+          <a:fontRef idx="minor">
+            <a:schemeClr val="lt1"/>
+          </a:fontRef>
+        </p:style>
+        <p:txBody>
+          <a:bodyPr rtlCol="0" anchor="ctr"/>
+          <a:lstStyle/>
+          <a:p>
+            <a:pPr algn="ctr"/>
+            <a:r>
+              <a:rPr lang="en-US" dirty="0"/>
+              <a:t>Project Setup for OMS</a:t>
+            </a:r>
+          </a:p>
+        </p:txBody>
+      </p:sp>
+      <p:sp>
+        <p:nvSpPr>
+          <p:cNvPr id="24" name="Oval 23">
+            <a:extLst>
+              <a:ext uri="{FF2B5EF4-FFF2-40B4-BE49-F238E27FC236}">
+                <a16:creationId xmlns:a16="http://schemas.microsoft.com/office/drawing/2014/main" id="{20CCDCA1-5DFB-4EC4-96B9-1369FABAE4A6}"/>
+              </a:ext>
+            </a:extLst>
+          </p:cNvPr>
+          <p:cNvSpPr/>
+          <p:nvPr/>
+        </p:nvSpPr>
+        <p:spPr>
+          <a:xfrm>
+            <a:off x="7083750" y="3284229"/>
+            <a:ext cx="914400" cy="504939"/>
+          </a:xfrm>
+          <a:prstGeom prst="ellipse">
+            <a:avLst/>
+          </a:prstGeom>
+        </p:spPr>
+        <p:style>
+          <a:lnRef idx="2">
+            <a:schemeClr val="accent1">
+              <a:shade val="50000"/>
+            </a:schemeClr>
+          </a:lnRef>
+          <a:fillRef idx="1">
+            <a:schemeClr val="accent1"/>
+          </a:fillRef>
+          <a:effectRef idx="0">
+            <a:schemeClr val="accent1"/>
+          </a:effectRef>
+          <a:fontRef idx="minor">
+            <a:schemeClr val="lt1"/>
+          </a:fontRef>
+        </p:style>
+        <p:txBody>
+          <a:bodyPr rtlCol="0" anchor="ctr"/>
+          <a:lstStyle/>
+          <a:p>
+            <a:pPr algn="ctr"/>
+            <a:r>
+              <a:rPr lang="en-US" sz="800" dirty="0"/>
+              <a:t>Container</a:t>
+            </a:r>
+          </a:p>
+          <a:p>
+            <a:pPr algn="ctr"/>
+            <a:r>
+              <a:rPr lang="en-US" sz="800" dirty="0"/>
+              <a:t>Foundation</a:t>
+            </a:r>
+          </a:p>
+        </p:txBody>
+      </p:sp>
+      <p:sp>
+        <p:nvSpPr>
+          <p:cNvPr id="25" name="Oval 24">
+            <a:extLst>
+              <a:ext uri="{FF2B5EF4-FFF2-40B4-BE49-F238E27FC236}">
+                <a16:creationId xmlns:a16="http://schemas.microsoft.com/office/drawing/2014/main" id="{11600F30-8475-4B7E-BAAF-8E0714DDCECD}"/>
+              </a:ext>
+            </a:extLst>
+          </p:cNvPr>
+          <p:cNvSpPr/>
+          <p:nvPr/>
+        </p:nvSpPr>
+        <p:spPr>
+          <a:xfrm>
+            <a:off x="5295058" y="3284229"/>
+            <a:ext cx="914400" cy="504939"/>
+          </a:xfrm>
+          <a:prstGeom prst="ellipse">
+            <a:avLst/>
+          </a:prstGeom>
+        </p:spPr>
+        <p:style>
+          <a:lnRef idx="2">
+            <a:schemeClr val="accent1">
+              <a:shade val="50000"/>
+            </a:schemeClr>
+          </a:lnRef>
+          <a:fillRef idx="1">
+            <a:schemeClr val="accent1"/>
+          </a:fillRef>
+          <a:effectRef idx="0">
+            <a:schemeClr val="accent1"/>
+          </a:effectRef>
+          <a:fontRef idx="minor">
+            <a:schemeClr val="lt1"/>
+          </a:fontRef>
+        </p:style>
+        <p:txBody>
+          <a:bodyPr rtlCol="0" anchor="ctr"/>
+          <a:lstStyle/>
+          <a:p>
+            <a:pPr algn="ctr"/>
+            <a:r>
+              <a:rPr lang="en-US" sz="800" dirty="0"/>
+              <a:t>Container</a:t>
+            </a:r>
+          </a:p>
+          <a:p>
+            <a:pPr algn="ctr"/>
+            <a:r>
+              <a:rPr lang="en-US" sz="800" dirty="0"/>
+              <a:t>Service A App</a:t>
+            </a:r>
+          </a:p>
+        </p:txBody>
+      </p:sp>
+      <p:sp>
+        <p:nvSpPr>
+          <p:cNvPr id="26" name="Oval 25">
+            <a:extLst>
+              <a:ext uri="{FF2B5EF4-FFF2-40B4-BE49-F238E27FC236}">
+                <a16:creationId xmlns:a16="http://schemas.microsoft.com/office/drawing/2014/main" id="{11D941F9-5E80-45C3-A062-FC0F5D88C65E}"/>
+              </a:ext>
+            </a:extLst>
+          </p:cNvPr>
+          <p:cNvSpPr/>
+          <p:nvPr/>
+        </p:nvSpPr>
+        <p:spPr>
+          <a:xfrm>
+            <a:off x="6189404" y="3284229"/>
+            <a:ext cx="914400" cy="504939"/>
+          </a:xfrm>
+          <a:prstGeom prst="ellipse">
+            <a:avLst/>
+          </a:prstGeom>
+        </p:spPr>
+        <p:style>
+          <a:lnRef idx="2">
+            <a:schemeClr val="accent1">
+              <a:shade val="50000"/>
+            </a:schemeClr>
+          </a:lnRef>
+          <a:fillRef idx="1">
+            <a:schemeClr val="accent1"/>
+          </a:fillRef>
+          <a:effectRef idx="0">
+            <a:schemeClr val="accent1"/>
+          </a:effectRef>
+          <a:fontRef idx="minor">
+            <a:schemeClr val="lt1"/>
+          </a:fontRef>
+        </p:style>
+        <p:txBody>
+          <a:bodyPr rtlCol="0" anchor="ctr"/>
+          <a:lstStyle/>
+          <a:p>
+            <a:pPr algn="ctr"/>
+            <a:r>
+              <a:rPr lang="en-US" sz="800" dirty="0"/>
+              <a:t>Container</a:t>
+            </a:r>
+          </a:p>
+          <a:p>
+            <a:pPr algn="ctr"/>
+            <a:r>
+              <a:rPr lang="en-US" sz="800" dirty="0"/>
+              <a:t>Service A Agent</a:t>
+            </a:r>
+          </a:p>
+        </p:txBody>
+      </p:sp>
+      <p:sp>
+        <p:nvSpPr>
+          <p:cNvPr id="27" name="Oval 26">
+            <a:extLst>
+              <a:ext uri="{FF2B5EF4-FFF2-40B4-BE49-F238E27FC236}">
+                <a16:creationId xmlns:a16="http://schemas.microsoft.com/office/drawing/2014/main" id="{00BEB5C7-3E82-496E-A9E5-42E04C2CC432}"/>
+              </a:ext>
+            </a:extLst>
+          </p:cNvPr>
+          <p:cNvSpPr/>
+          <p:nvPr/>
+        </p:nvSpPr>
+        <p:spPr>
+          <a:xfrm>
+            <a:off x="9624819" y="3295047"/>
+            <a:ext cx="914400" cy="504939"/>
+          </a:xfrm>
+          <a:prstGeom prst="ellipse">
+            <a:avLst/>
+          </a:prstGeom>
+          <a:solidFill>
+            <a:schemeClr val="accent6">
+              <a:lumMod val="75000"/>
+            </a:schemeClr>
+          </a:solidFill>
+        </p:spPr>
+        <p:style>
+          <a:lnRef idx="2">
+            <a:schemeClr val="accent1">
+              <a:shade val="50000"/>
+            </a:schemeClr>
+          </a:lnRef>
+          <a:fillRef idx="1">
+            <a:schemeClr val="accent1"/>
+          </a:fillRef>
+          <a:effectRef idx="0">
+            <a:schemeClr val="accent1"/>
+          </a:effectRef>
+          <a:fontRef idx="minor">
+            <a:schemeClr val="lt1"/>
+          </a:fontRef>
+        </p:style>
+        <p:txBody>
+          <a:bodyPr rtlCol="0" anchor="ctr"/>
+          <a:lstStyle/>
+          <a:p>
+            <a:pPr algn="ctr"/>
+            <a:r>
+              <a:rPr lang="en-US" sz="800" dirty="0"/>
+              <a:t>Container</a:t>
+            </a:r>
+          </a:p>
+          <a:p>
+            <a:pPr algn="ctr"/>
+            <a:r>
+              <a:rPr lang="en-US" sz="800" dirty="0"/>
+              <a:t>ActiveMQ</a:t>
+            </a:r>
+          </a:p>
+        </p:txBody>
+      </p:sp>
+      <p:sp>
+        <p:nvSpPr>
+          <p:cNvPr id="33" name="Rectangle 32">
+            <a:extLst>
+              <a:ext uri="{FF2B5EF4-FFF2-40B4-BE49-F238E27FC236}">
+                <a16:creationId xmlns:a16="http://schemas.microsoft.com/office/drawing/2014/main" id="{0DD6071F-26D8-42A5-B6B4-95B9A603425C}"/>
+              </a:ext>
+            </a:extLst>
+          </p:cNvPr>
+          <p:cNvSpPr/>
+          <p:nvPr/>
+        </p:nvSpPr>
+        <p:spPr>
+          <a:xfrm>
+            <a:off x="4200664" y="2158041"/>
+            <a:ext cx="683196" cy="3377591"/>
+          </a:xfrm>
+          <a:prstGeom prst="rect">
+            <a:avLst/>
+          </a:prstGeom>
+          <a:gradFill flip="none" rotWithShape="1">
+            <a:gsLst>
+              <a:gs pos="0">
+                <a:schemeClr val="dk1">
+                  <a:lumMod val="67000"/>
+                </a:schemeClr>
+              </a:gs>
+              <a:gs pos="48000">
+                <a:schemeClr val="dk1">
+                  <a:lumMod val="97000"/>
+                  <a:lumOff val="3000"/>
+                </a:schemeClr>
+              </a:gs>
+              <a:gs pos="100000">
+                <a:schemeClr val="dk1">
+                  <a:lumMod val="60000"/>
+                  <a:lumOff val="40000"/>
+                </a:schemeClr>
+              </a:gs>
+            </a:gsLst>
+            <a:lin ang="16200000" scaled="1"/>
+            <a:tileRect/>
+          </a:gradFill>
+          <a:ln>
+            <a:noFill/>
+          </a:ln>
+        </p:spPr>
+        <p:style>
+          <a:lnRef idx="0">
+            <a:scrgbClr r="0" g="0" b="0"/>
+          </a:lnRef>
+          <a:fillRef idx="0">
+            <a:scrgbClr r="0" g="0" b="0"/>
+          </a:fillRef>
+          <a:effectRef idx="0">
+            <a:scrgbClr r="0" g="0" b="0"/>
+          </a:effectRef>
+          <a:fontRef idx="minor">
+            <a:schemeClr val="lt1"/>
+          </a:fontRef>
+        </p:style>
+        <p:txBody>
+          <a:bodyPr rtlCol="0" anchor="t"/>
+          <a:lstStyle/>
+          <a:p>
+            <a:pPr algn="ctr"/>
+            <a:r>
+              <a:rPr lang="en-US" dirty="0"/>
+              <a:t>TaskA001</a:t>
+            </a:r>
+          </a:p>
+        </p:txBody>
+      </p:sp>
+      <p:sp>
+        <p:nvSpPr>
+          <p:cNvPr id="20" name="Rectangle: Top Corners One Rounded and One Snipped 19">
+            <a:extLst>
+              <a:ext uri="{FF2B5EF4-FFF2-40B4-BE49-F238E27FC236}">
+                <a16:creationId xmlns:a16="http://schemas.microsoft.com/office/drawing/2014/main" id="{6A5C490F-E6F7-44C3-8B87-EDE8D1419A49}"/>
+              </a:ext>
+            </a:extLst>
+          </p:cNvPr>
+          <p:cNvSpPr/>
+          <p:nvPr/>
+        </p:nvSpPr>
+        <p:spPr>
+          <a:xfrm>
+            <a:off x="3736041" y="1564710"/>
+            <a:ext cx="896471" cy="336626"/>
+          </a:xfrm>
+          <a:prstGeom prst="snipRoundRect">
+            <a:avLst/>
+          </a:prstGeom>
+        </p:spPr>
+        <p:style>
+          <a:lnRef idx="2">
+            <a:schemeClr val="accent1">
+              <a:shade val="50000"/>
+            </a:schemeClr>
+          </a:lnRef>
+          <a:fillRef idx="1">
+            <a:schemeClr val="accent1"/>
+          </a:fillRef>
+          <a:effectRef idx="0">
+            <a:schemeClr val="accent1"/>
+          </a:effectRef>
+          <a:fontRef idx="minor">
+            <a:schemeClr val="lt1"/>
+          </a:fontRef>
+        </p:style>
+        <p:txBody>
+          <a:bodyPr rtlCol="0" anchor="ctr"/>
+          <a:lstStyle/>
+          <a:p>
+            <a:pPr algn="ctr"/>
+            <a:r>
+              <a:rPr lang="en-US" sz="800" dirty="0"/>
+              <a:t>Base CDT</a:t>
+            </a:r>
+          </a:p>
+        </p:txBody>
+      </p:sp>
+      <p:sp>
+        <p:nvSpPr>
+          <p:cNvPr id="38" name="Rectangle 37">
+            <a:extLst>
+              <a:ext uri="{FF2B5EF4-FFF2-40B4-BE49-F238E27FC236}">
+                <a16:creationId xmlns:a16="http://schemas.microsoft.com/office/drawing/2014/main" id="{141A9696-2499-43F5-BBC6-533E1CF139E4}"/>
+              </a:ext>
+            </a:extLst>
+          </p:cNvPr>
+          <p:cNvSpPr/>
+          <p:nvPr/>
+        </p:nvSpPr>
+        <p:spPr>
+          <a:xfrm>
+            <a:off x="3493627" y="2158040"/>
+            <a:ext cx="683196" cy="3377591"/>
+          </a:xfrm>
+          <a:prstGeom prst="rect">
+            <a:avLst/>
+          </a:prstGeom>
+          <a:gradFill flip="none" rotWithShape="1">
+            <a:gsLst>
+              <a:gs pos="0">
+                <a:schemeClr val="dk1">
+                  <a:lumMod val="67000"/>
+                </a:schemeClr>
+              </a:gs>
+              <a:gs pos="48000">
+                <a:schemeClr val="dk1">
+                  <a:lumMod val="97000"/>
+                  <a:lumOff val="3000"/>
+                </a:schemeClr>
+              </a:gs>
+              <a:gs pos="100000">
+                <a:schemeClr val="dk1">
+                  <a:lumMod val="60000"/>
+                  <a:lumOff val="40000"/>
+                </a:schemeClr>
+              </a:gs>
+            </a:gsLst>
+            <a:lin ang="16200000" scaled="1"/>
+            <a:tileRect/>
+          </a:gradFill>
+          <a:ln>
+            <a:noFill/>
+          </a:ln>
+        </p:spPr>
+        <p:style>
+          <a:lnRef idx="0">
+            <a:scrgbClr r="0" g="0" b="0"/>
+          </a:lnRef>
+          <a:fillRef idx="0">
+            <a:scrgbClr r="0" g="0" b="0"/>
+          </a:fillRef>
+          <a:effectRef idx="0">
+            <a:scrgbClr r="0" g="0" b="0"/>
+          </a:effectRef>
+          <a:fontRef idx="minor">
+            <a:schemeClr val="lt1"/>
+          </a:fontRef>
+        </p:style>
+        <p:txBody>
+          <a:bodyPr rtlCol="0" anchor="t"/>
+          <a:lstStyle/>
+          <a:p>
+            <a:pPr algn="ctr"/>
+            <a:r>
+              <a:rPr lang="en-US" dirty="0" err="1"/>
+              <a:t>Srvc</a:t>
+            </a:r>
+            <a:r>
+              <a:rPr lang="en-US" dirty="0"/>
+              <a:t> A</a:t>
+            </a:r>
+          </a:p>
+        </p:txBody>
+      </p:sp>
+      <p:sp>
+        <p:nvSpPr>
+          <p:cNvPr id="34" name="Oval 33">
+            <a:extLst>
+              <a:ext uri="{FF2B5EF4-FFF2-40B4-BE49-F238E27FC236}">
+                <a16:creationId xmlns:a16="http://schemas.microsoft.com/office/drawing/2014/main" id="{E9EA4076-5BC6-455E-B940-C70DACE8AFFD}"/>
+              </a:ext>
+            </a:extLst>
+          </p:cNvPr>
+          <p:cNvSpPr/>
+          <p:nvPr/>
+        </p:nvSpPr>
+        <p:spPr>
+          <a:xfrm>
+            <a:off x="8400249" y="4993742"/>
+            <a:ext cx="914400" cy="504939"/>
+          </a:xfrm>
+          <a:prstGeom prst="ellipse">
+            <a:avLst/>
+          </a:prstGeom>
+          <a:solidFill>
+            <a:schemeClr val="accent6">
+              <a:lumMod val="50000"/>
+            </a:schemeClr>
+          </a:solidFill>
+        </p:spPr>
+        <p:style>
+          <a:lnRef idx="2">
+            <a:schemeClr val="accent1">
+              <a:shade val="50000"/>
+            </a:schemeClr>
+          </a:lnRef>
+          <a:fillRef idx="1">
+            <a:schemeClr val="accent1"/>
+          </a:fillRef>
+          <a:effectRef idx="0">
+            <a:schemeClr val="accent1"/>
+          </a:effectRef>
+          <a:fontRef idx="minor">
+            <a:schemeClr val="lt1"/>
+          </a:fontRef>
+        </p:style>
+        <p:txBody>
+          <a:bodyPr rtlCol="0" anchor="ctr"/>
+          <a:lstStyle/>
+          <a:p>
+            <a:pPr algn="ctr"/>
+            <a:r>
+              <a:rPr lang="en-US" sz="800" dirty="0"/>
+              <a:t>Container</a:t>
+            </a:r>
+          </a:p>
+          <a:p>
+            <a:pPr algn="ctr"/>
+            <a:r>
+              <a:rPr lang="en-US" sz="800" dirty="0"/>
+              <a:t>DB2 Config</a:t>
+            </a:r>
+          </a:p>
+        </p:txBody>
+      </p:sp>
+      <p:sp>
+        <p:nvSpPr>
+          <p:cNvPr id="36" name="Oval 35">
+            <a:extLst>
+              <a:ext uri="{FF2B5EF4-FFF2-40B4-BE49-F238E27FC236}">
+                <a16:creationId xmlns:a16="http://schemas.microsoft.com/office/drawing/2014/main" id="{65389949-4305-4842-9898-819C61992F25}"/>
+              </a:ext>
+            </a:extLst>
+          </p:cNvPr>
+          <p:cNvSpPr/>
+          <p:nvPr/>
+        </p:nvSpPr>
+        <p:spPr>
+          <a:xfrm>
+            <a:off x="8857449" y="4496767"/>
+            <a:ext cx="914400" cy="504939"/>
+          </a:xfrm>
+          <a:prstGeom prst="ellipse">
+            <a:avLst/>
+          </a:prstGeom>
+          <a:solidFill>
+            <a:schemeClr val="bg1">
+              <a:lumMod val="85000"/>
+              <a:lumOff val="15000"/>
+            </a:schemeClr>
+          </a:solidFill>
+        </p:spPr>
+        <p:style>
+          <a:lnRef idx="2">
+            <a:schemeClr val="accent1">
+              <a:shade val="50000"/>
+            </a:schemeClr>
+          </a:lnRef>
+          <a:fillRef idx="1">
+            <a:schemeClr val="accent1"/>
+          </a:fillRef>
+          <a:effectRef idx="0">
+            <a:schemeClr val="accent1"/>
+          </a:effectRef>
+          <a:fontRef idx="minor">
+            <a:schemeClr val="lt1"/>
+          </a:fontRef>
+        </p:style>
+        <p:txBody>
+          <a:bodyPr rtlCol="0" anchor="ctr"/>
+          <a:lstStyle/>
+          <a:p>
+            <a:pPr algn="ctr"/>
+            <a:r>
+              <a:rPr lang="en-US" sz="800" dirty="0"/>
+              <a:t>Container</a:t>
+            </a:r>
+          </a:p>
+          <a:p>
+            <a:pPr algn="ctr"/>
+            <a:r>
+              <a:rPr lang="en-US" sz="800" dirty="0"/>
+              <a:t>Task A001 Agent</a:t>
+            </a:r>
+          </a:p>
+        </p:txBody>
+      </p:sp>
+      <p:sp>
+        <p:nvSpPr>
+          <p:cNvPr id="35" name="Oval 34">
+            <a:extLst>
+              <a:ext uri="{FF2B5EF4-FFF2-40B4-BE49-F238E27FC236}">
+                <a16:creationId xmlns:a16="http://schemas.microsoft.com/office/drawing/2014/main" id="{C83263CB-D214-4F91-A946-33F236C24A73}"/>
+              </a:ext>
+            </a:extLst>
+          </p:cNvPr>
+          <p:cNvSpPr/>
+          <p:nvPr/>
+        </p:nvSpPr>
+        <p:spPr>
+          <a:xfrm>
+            <a:off x="7808080" y="4496766"/>
+            <a:ext cx="914400" cy="504939"/>
+          </a:xfrm>
+          <a:prstGeom prst="ellipse">
+            <a:avLst/>
+          </a:prstGeom>
+          <a:solidFill>
+            <a:schemeClr val="bg1">
+              <a:lumMod val="85000"/>
+              <a:lumOff val="15000"/>
+            </a:schemeClr>
+          </a:solidFill>
+        </p:spPr>
+        <p:style>
+          <a:lnRef idx="2">
+            <a:schemeClr val="accent1">
+              <a:shade val="50000"/>
+            </a:schemeClr>
+          </a:lnRef>
+          <a:fillRef idx="1">
+            <a:schemeClr val="accent1"/>
+          </a:fillRef>
+          <a:effectRef idx="0">
+            <a:schemeClr val="accent1"/>
+          </a:effectRef>
+          <a:fontRef idx="minor">
+            <a:schemeClr val="lt1"/>
+          </a:fontRef>
+        </p:style>
+        <p:txBody>
+          <a:bodyPr rtlCol="0" anchor="ctr"/>
+          <a:lstStyle/>
+          <a:p>
+            <a:pPr algn="ctr"/>
+            <a:r>
+              <a:rPr lang="en-US" sz="800" dirty="0"/>
+              <a:t>Container</a:t>
+            </a:r>
+          </a:p>
+          <a:p>
+            <a:pPr algn="ctr"/>
+            <a:r>
+              <a:rPr lang="en-US" sz="800" dirty="0"/>
+              <a:t>Task A001 App</a:t>
+            </a:r>
+          </a:p>
+        </p:txBody>
+      </p:sp>
+      <p:sp>
+        <p:nvSpPr>
+          <p:cNvPr id="39" name="Rectangle: Top Corners One Rounded and One Snipped 38">
+            <a:extLst>
+              <a:ext uri="{FF2B5EF4-FFF2-40B4-BE49-F238E27FC236}">
+                <a16:creationId xmlns:a16="http://schemas.microsoft.com/office/drawing/2014/main" id="{251C5694-9738-4BFA-B426-33F21CF52203}"/>
+              </a:ext>
+            </a:extLst>
+          </p:cNvPr>
+          <p:cNvSpPr/>
+          <p:nvPr/>
+        </p:nvSpPr>
+        <p:spPr>
+          <a:xfrm>
+            <a:off x="4312297" y="3295047"/>
+            <a:ext cx="491530" cy="336626"/>
+          </a:xfrm>
+          <a:prstGeom prst="snipRoundRect">
+            <a:avLst/>
+          </a:prstGeom>
+          <a:solidFill>
+            <a:schemeClr val="accent3">
+              <a:lumMod val="50000"/>
+            </a:schemeClr>
+          </a:solidFill>
+          <a:ln>
+            <a:noFill/>
+          </a:ln>
+        </p:spPr>
+        <p:style>
+          <a:lnRef idx="0">
+            <a:scrgbClr r="0" g="0" b="0"/>
+          </a:lnRef>
+          <a:fillRef idx="0">
+            <a:scrgbClr r="0" g="0" b="0"/>
+          </a:fillRef>
+          <a:effectRef idx="0">
+            <a:scrgbClr r="0" g="0" b="0"/>
+          </a:effectRef>
+          <a:fontRef idx="minor">
+            <a:schemeClr val="lt1"/>
+          </a:fontRef>
+        </p:style>
+        <p:txBody>
+          <a:bodyPr rtlCol="0" anchor="ctr"/>
+          <a:lstStyle/>
+          <a:p>
+            <a:pPr algn="ctr"/>
+            <a:r>
+              <a:rPr lang="en-US" sz="800" dirty="0"/>
+              <a:t>A001 CDT</a:t>
+            </a:r>
+          </a:p>
+        </p:txBody>
+      </p:sp>
+      <p:sp>
+        <p:nvSpPr>
+          <p:cNvPr id="41" name="Rectangle: Top Corners One Rounded and One Snipped 40">
+            <a:extLst>
+              <a:ext uri="{FF2B5EF4-FFF2-40B4-BE49-F238E27FC236}">
+                <a16:creationId xmlns:a16="http://schemas.microsoft.com/office/drawing/2014/main" id="{17C1C430-0603-480E-8FAA-E3C345CFB447}"/>
+              </a:ext>
+            </a:extLst>
+          </p:cNvPr>
+          <p:cNvSpPr/>
+          <p:nvPr/>
+        </p:nvSpPr>
+        <p:spPr>
+          <a:xfrm>
+            <a:off x="3599722" y="3525383"/>
+            <a:ext cx="491530" cy="336626"/>
+          </a:xfrm>
+          <a:prstGeom prst="snipRoundRect">
+            <a:avLst/>
+          </a:prstGeom>
+          <a:solidFill>
+            <a:schemeClr val="accent3">
+              <a:lumMod val="50000"/>
+            </a:schemeClr>
+          </a:solidFill>
+          <a:ln>
+            <a:noFill/>
+          </a:ln>
+        </p:spPr>
+        <p:style>
+          <a:lnRef idx="0">
+            <a:scrgbClr r="0" g="0" b="0"/>
+          </a:lnRef>
+          <a:fillRef idx="0">
+            <a:scrgbClr r="0" g="0" b="0"/>
+          </a:fillRef>
+          <a:effectRef idx="0">
+            <a:scrgbClr r="0" g="0" b="0"/>
+          </a:effectRef>
+          <a:fontRef idx="minor">
+            <a:schemeClr val="lt1"/>
+          </a:fontRef>
+        </p:style>
+        <p:txBody>
+          <a:bodyPr rtlCol="0" anchor="ctr"/>
+          <a:lstStyle/>
+          <a:p>
+            <a:pPr algn="ctr"/>
+            <a:r>
+              <a:rPr lang="en-US" sz="800" dirty="0" err="1"/>
+              <a:t>Srvc</a:t>
+            </a:r>
+            <a:r>
+              <a:rPr lang="en-US" sz="800" dirty="0"/>
+              <a:t> A CDT</a:t>
+            </a:r>
+          </a:p>
+        </p:txBody>
+      </p:sp>
+      <p:sp>
+        <p:nvSpPr>
+          <p:cNvPr id="42" name="Rectangle: Rounded Corners 41">
+            <a:extLst>
+              <a:ext uri="{FF2B5EF4-FFF2-40B4-BE49-F238E27FC236}">
+                <a16:creationId xmlns:a16="http://schemas.microsoft.com/office/drawing/2014/main" id="{90C36B77-720A-4533-8586-534B42688379}"/>
+              </a:ext>
+            </a:extLst>
+          </p:cNvPr>
+          <p:cNvSpPr/>
+          <p:nvPr/>
+        </p:nvSpPr>
+        <p:spPr>
+          <a:xfrm>
+            <a:off x="1372475" y="4426456"/>
+            <a:ext cx="1027032" cy="336626"/>
+          </a:xfrm>
+          <a:prstGeom prst="roundRect">
+            <a:avLst/>
+          </a:prstGeom>
+          <a:gradFill flip="none" rotWithShape="1">
+            <a:gsLst>
+              <a:gs pos="0">
+                <a:schemeClr val="dk1">
+                  <a:lumMod val="67000"/>
+                </a:schemeClr>
+              </a:gs>
+              <a:gs pos="48000">
+                <a:schemeClr val="dk1">
+                  <a:lumMod val="97000"/>
+                  <a:lumOff val="3000"/>
+                </a:schemeClr>
+              </a:gs>
+              <a:gs pos="100000">
+                <a:schemeClr val="dk1">
+                  <a:lumMod val="60000"/>
+                  <a:lumOff val="40000"/>
+                </a:schemeClr>
+              </a:gs>
+            </a:gsLst>
+            <a:lin ang="16200000" scaled="1"/>
+            <a:tileRect/>
+          </a:gradFill>
+          <a:ln>
+            <a:noFill/>
+          </a:ln>
+        </p:spPr>
+        <p:style>
+          <a:lnRef idx="0">
+            <a:scrgbClr r="0" g="0" b="0"/>
+          </a:lnRef>
+          <a:fillRef idx="0">
+            <a:scrgbClr r="0" g="0" b="0"/>
+          </a:fillRef>
+          <a:effectRef idx="0">
+            <a:scrgbClr r="0" g="0" b="0"/>
+          </a:effectRef>
+          <a:fontRef idx="minor">
+            <a:schemeClr val="lt1"/>
+          </a:fontRef>
+        </p:style>
+        <p:txBody>
+          <a:bodyPr rtlCol="0" anchor="ctr"/>
+          <a:lstStyle/>
+          <a:p>
+            <a:pPr algn="ctr"/>
+            <a:r>
+              <a:rPr lang="en-US" sz="900" dirty="0"/>
+              <a:t>Image</a:t>
+            </a:r>
+          </a:p>
+          <a:p>
+            <a:pPr algn="ctr"/>
+            <a:r>
+              <a:rPr lang="en-US" sz="900" dirty="0"/>
+              <a:t>Service A Agent</a:t>
+            </a:r>
+          </a:p>
+        </p:txBody>
+      </p:sp>
+      <p:sp>
+        <p:nvSpPr>
+          <p:cNvPr id="43" name="Rectangle: Rounded Corners 42">
+            <a:extLst>
+              <a:ext uri="{FF2B5EF4-FFF2-40B4-BE49-F238E27FC236}">
+                <a16:creationId xmlns:a16="http://schemas.microsoft.com/office/drawing/2014/main" id="{D908A264-91E7-4657-9E53-ABAD9AF343A2}"/>
+              </a:ext>
+            </a:extLst>
+          </p:cNvPr>
+          <p:cNvSpPr/>
+          <p:nvPr/>
+        </p:nvSpPr>
+        <p:spPr>
+          <a:xfrm>
+            <a:off x="1372475" y="3970309"/>
+            <a:ext cx="1027032" cy="336626"/>
+          </a:xfrm>
+          <a:prstGeom prst="roundRect">
+            <a:avLst/>
+          </a:prstGeom>
+          <a:gradFill flip="none" rotWithShape="1">
+            <a:gsLst>
+              <a:gs pos="0">
+                <a:schemeClr val="dk1">
+                  <a:lumMod val="67000"/>
+                </a:schemeClr>
+              </a:gs>
+              <a:gs pos="48000">
+                <a:schemeClr val="dk1">
+                  <a:lumMod val="97000"/>
+                  <a:lumOff val="3000"/>
+                </a:schemeClr>
+              </a:gs>
+              <a:gs pos="100000">
+                <a:schemeClr val="dk1">
+                  <a:lumMod val="60000"/>
+                  <a:lumOff val="40000"/>
+                </a:schemeClr>
+              </a:gs>
+            </a:gsLst>
+            <a:lin ang="16200000" scaled="1"/>
+            <a:tileRect/>
+          </a:gradFill>
+          <a:ln>
+            <a:noFill/>
+          </a:ln>
+        </p:spPr>
+        <p:style>
+          <a:lnRef idx="0">
+            <a:scrgbClr r="0" g="0" b="0"/>
+          </a:lnRef>
+          <a:fillRef idx="0">
+            <a:scrgbClr r="0" g="0" b="0"/>
+          </a:fillRef>
+          <a:effectRef idx="0">
+            <a:scrgbClr r="0" g="0" b="0"/>
+          </a:effectRef>
+          <a:fontRef idx="minor">
+            <a:schemeClr val="lt1"/>
+          </a:fontRef>
+        </p:style>
+        <p:txBody>
+          <a:bodyPr rtlCol="0" anchor="ctr"/>
+          <a:lstStyle/>
+          <a:p>
+            <a:pPr algn="ctr"/>
+            <a:r>
+              <a:rPr lang="en-US" sz="900" dirty="0"/>
+              <a:t>Image</a:t>
+            </a:r>
+          </a:p>
+          <a:p>
+            <a:pPr algn="ctr"/>
+            <a:r>
+              <a:rPr lang="en-US" sz="900" dirty="0"/>
+              <a:t>Service A App</a:t>
+            </a:r>
+          </a:p>
+        </p:txBody>
+      </p:sp>
+      <p:sp>
+        <p:nvSpPr>
+          <p:cNvPr id="40" name="Rectangle: Top Corners One Rounded and One Snipped 39">
+            <a:extLst>
+              <a:ext uri="{FF2B5EF4-FFF2-40B4-BE49-F238E27FC236}">
+                <a16:creationId xmlns:a16="http://schemas.microsoft.com/office/drawing/2014/main" id="{342CB059-56E3-416F-A0CE-5EAA544FBDF9}"/>
+              </a:ext>
+            </a:extLst>
+          </p:cNvPr>
+          <p:cNvSpPr/>
+          <p:nvPr/>
+        </p:nvSpPr>
+        <p:spPr>
+          <a:xfrm>
+            <a:off x="3591886" y="3069236"/>
+            <a:ext cx="491530" cy="336626"/>
+          </a:xfrm>
+          <a:prstGeom prst="snipRoundRect">
+            <a:avLst/>
+          </a:prstGeom>
+          <a:solidFill>
+            <a:schemeClr val="accent3">
+              <a:lumMod val="50000"/>
+            </a:schemeClr>
+          </a:solidFill>
+          <a:ln>
+            <a:noFill/>
+          </a:ln>
+        </p:spPr>
+        <p:style>
+          <a:lnRef idx="0">
+            <a:scrgbClr r="0" g="0" b="0"/>
+          </a:lnRef>
+          <a:fillRef idx="0">
+            <a:scrgbClr r="0" g="0" b="0"/>
+          </a:fillRef>
+          <a:effectRef idx="0">
+            <a:scrgbClr r="0" g="0" b="0"/>
+          </a:effectRef>
+          <a:fontRef idx="minor">
+            <a:schemeClr val="lt1"/>
+          </a:fontRef>
+        </p:style>
+        <p:txBody>
+          <a:bodyPr rtlCol="0" anchor="ctr"/>
+          <a:lstStyle/>
+          <a:p>
+            <a:pPr algn="ctr"/>
+            <a:r>
+              <a:rPr lang="en-US" sz="800" dirty="0" err="1"/>
+              <a:t>Srvc</a:t>
+            </a:r>
+            <a:r>
+              <a:rPr lang="en-US" sz="800" dirty="0"/>
+              <a:t> A Code</a:t>
+            </a:r>
+          </a:p>
+        </p:txBody>
+      </p:sp>
+      <p:sp>
+        <p:nvSpPr>
+          <p:cNvPr id="37" name="Rectangle: Top Corners One Rounded and One Snipped 36">
+            <a:extLst>
+              <a:ext uri="{FF2B5EF4-FFF2-40B4-BE49-F238E27FC236}">
+                <a16:creationId xmlns:a16="http://schemas.microsoft.com/office/drawing/2014/main" id="{A918067D-4076-446A-ADFF-7E2B1C1A0F1D}"/>
+              </a:ext>
+            </a:extLst>
+          </p:cNvPr>
+          <p:cNvSpPr/>
+          <p:nvPr/>
+        </p:nvSpPr>
+        <p:spPr>
+          <a:xfrm>
+            <a:off x="4304461" y="2838900"/>
+            <a:ext cx="491530" cy="336626"/>
+          </a:xfrm>
+          <a:prstGeom prst="snipRoundRect">
+            <a:avLst/>
+          </a:prstGeom>
+          <a:solidFill>
+            <a:schemeClr val="accent3">
+              <a:lumMod val="50000"/>
+            </a:schemeClr>
+          </a:solidFill>
+          <a:ln>
+            <a:noFill/>
+          </a:ln>
+        </p:spPr>
+        <p:style>
+          <a:lnRef idx="0">
+            <a:scrgbClr r="0" g="0" b="0"/>
+          </a:lnRef>
+          <a:fillRef idx="0">
+            <a:scrgbClr r="0" g="0" b="0"/>
+          </a:fillRef>
+          <a:effectRef idx="0">
+            <a:scrgbClr r="0" g="0" b="0"/>
+          </a:effectRef>
+          <a:fontRef idx="minor">
+            <a:schemeClr val="lt1"/>
+          </a:fontRef>
+        </p:style>
+        <p:txBody>
+          <a:bodyPr rtlCol="0" anchor="ctr"/>
+          <a:lstStyle/>
+          <a:p>
+            <a:pPr algn="ctr"/>
+            <a:r>
+              <a:rPr lang="en-US" sz="800" dirty="0"/>
+              <a:t>A001 Code</a:t>
+            </a:r>
+          </a:p>
+        </p:txBody>
+      </p:sp>
+    </p:spTree>
+    <p:extLst>
+      <p:ext uri="{BB962C8B-B14F-4D97-AF65-F5344CB8AC3E}">
+        <p14:creationId xmlns:p14="http://schemas.microsoft.com/office/powerpoint/2010/main" val="2073033784"/>
+      </p:ext>
+    </p:extLst>
+  </p:cSld>
+  <p:clrMapOvr>
+    <a:masterClrMapping/>
+  </p:clrMapOvr>
+  <p:timing>
+    <p:tnLst>
+      <p:par>
+        <p:cTn id="1" dur="indefinite" restart="never" nodeType="tmRoot">
+          <p:childTnLst>
+            <p:seq concurrent="1" nextAc="seek">
+              <p:cTn id="2" dur="indefinite" nodeType="mainSeq">
+                <p:childTnLst>
+                  <p:par>
+                    <p:cTn id="3" fill="hold">
+                      <p:stCondLst>
+                        <p:cond delay="indefinite"/>
+                      </p:stCondLst>
+                      <p:childTnLst>
+                        <p:par>
+                          <p:cTn id="4" fill="hold">
+                            <p:stCondLst>
+                              <p:cond delay="0"/>
+                            </p:stCondLst>
+                            <p:childTnLst>
+                              <p:par>
+                                <p:cTn id="5" presetID="1" presetClass="entr" presetSubtype="0" fill="hold" grpId="1" nodeType="clickEffect">
+                                  <p:stCondLst>
+                                    <p:cond delay="0"/>
+                                  </p:stCondLst>
+                                  <p:childTnLst>
+                                    <p:set>
+                                      <p:cBhvr>
+                                        <p:cTn id="6" dur="1" fill="hold">
+                                          <p:stCondLst>
+                                            <p:cond delay="0"/>
+                                          </p:stCondLst>
+                                        </p:cTn>
+                                        <p:tgtEl>
+                                          <p:spTgt spid="34"/>
+                                        </p:tgtEl>
+                                        <p:attrNameLst>
+                                          <p:attrName>style.visibility</p:attrName>
+                                        </p:attrNameLst>
+                                      </p:cBhvr>
+                                      <p:to>
+                                        <p:strVal val="visible"/>
+                                      </p:to>
+                                    </p:set>
+                                  </p:childTnLst>
+                                </p:cTn>
+                              </p:par>
+                              <p:par>
+                                <p:cTn id="7" presetID="42" presetClass="path" presetSubtype="0" accel="50000" decel="50000" fill="hold" grpId="0" nodeType="withEffect">
+                                  <p:stCondLst>
+                                    <p:cond delay="0"/>
+                                  </p:stCondLst>
+                                  <p:childTnLst>
+                                    <p:animMotion origin="layout" path="M -2.29167E-6 3.7037E-6 L -0.48034 -0.29399 " pathEditMode="relative" rAng="0" ptsTypes="AA">
+                                      <p:cBhvr>
+                                        <p:cTn id="8" dur="2000" spd="-100000" fill="hold"/>
+                                        <p:tgtEl>
+                                          <p:spTgt spid="34"/>
+                                        </p:tgtEl>
+                                        <p:attrNameLst>
+                                          <p:attrName>ppt_x</p:attrName>
+                                          <p:attrName>ppt_y</p:attrName>
+                                        </p:attrNameLst>
+                                      </p:cBhvr>
+                                      <p:rCtr x="-24023" y="-14699"/>
+                                    </p:animMotion>
+                                  </p:childTnLst>
+                                </p:cTn>
+                              </p:par>
+                            </p:childTnLst>
+                          </p:cTn>
+                        </p:par>
+                      </p:childTnLst>
+                    </p:cTn>
+                  </p:par>
+                  <p:par>
+                    <p:cTn id="9" fill="hold">
+                      <p:stCondLst>
+                        <p:cond delay="indefinite"/>
+                      </p:stCondLst>
+                      <p:childTnLst>
+                        <p:par>
+                          <p:cTn id="10" fill="hold">
+                            <p:stCondLst>
+                              <p:cond delay="0"/>
+                            </p:stCondLst>
+                            <p:childTnLst>
+                              <p:par>
+                                <p:cTn id="11" presetID="1" presetClass="entr" presetSubtype="0" fill="hold" grpId="1" nodeType="clickEffect">
+                                  <p:stCondLst>
+                                    <p:cond delay="0"/>
+                                  </p:stCondLst>
+                                  <p:childTnLst>
+                                    <p:set>
+                                      <p:cBhvr>
+                                        <p:cTn id="12" dur="1" fill="hold">
+                                          <p:stCondLst>
+                                            <p:cond delay="0"/>
+                                          </p:stCondLst>
+                                        </p:cTn>
+                                        <p:tgtEl>
+                                          <p:spTgt spid="35"/>
+                                        </p:tgtEl>
+                                        <p:attrNameLst>
+                                          <p:attrName>style.visibility</p:attrName>
+                                        </p:attrNameLst>
+                                      </p:cBhvr>
+                                      <p:to>
+                                        <p:strVal val="visible"/>
+                                      </p:to>
+                                    </p:set>
+                                  </p:childTnLst>
+                                </p:cTn>
+                              </p:par>
+                              <p:par>
+                                <p:cTn id="13" presetID="42" presetClass="path" presetSubtype="0" accel="50000" decel="50000" fill="hold" grpId="0" nodeType="withEffect">
+                                  <p:stCondLst>
+                                    <p:cond delay="0"/>
+                                  </p:stCondLst>
+                                  <p:childTnLst>
+                                    <p:animMotion origin="layout" path="M -4.58333E-6 -2.59259E-6 L -0.43424 -0.35254 " pathEditMode="relative" rAng="0" ptsTypes="AA">
+                                      <p:cBhvr>
+                                        <p:cTn id="14" dur="2000" spd="-100000" fill="hold"/>
+                                        <p:tgtEl>
+                                          <p:spTgt spid="35"/>
+                                        </p:tgtEl>
+                                        <p:attrNameLst>
+                                          <p:attrName>ppt_x</p:attrName>
+                                          <p:attrName>ppt_y</p:attrName>
+                                        </p:attrNameLst>
+                                      </p:cBhvr>
+                                      <p:rCtr x="-21719" y="-17639"/>
+                                    </p:animMotion>
+                                  </p:childTnLst>
+                                </p:cTn>
+                              </p:par>
+                            </p:childTnLst>
+                          </p:cTn>
+                        </p:par>
+                      </p:childTnLst>
+                    </p:cTn>
+                  </p:par>
+                  <p:par>
+                    <p:cTn id="15" fill="hold">
+                      <p:stCondLst>
+                        <p:cond delay="indefinite"/>
+                      </p:stCondLst>
+                      <p:childTnLst>
+                        <p:par>
+                          <p:cTn id="16" fill="hold">
+                            <p:stCondLst>
+                              <p:cond delay="0"/>
+                            </p:stCondLst>
+                            <p:childTnLst>
+                              <p:par>
+                                <p:cTn id="17" presetID="1" presetClass="entr" presetSubtype="0" fill="hold" grpId="1" nodeType="clickEffect">
+                                  <p:stCondLst>
+                                    <p:cond delay="0"/>
+                                  </p:stCondLst>
+                                  <p:childTnLst>
+                                    <p:set>
+                                      <p:cBhvr>
+                                        <p:cTn id="18" dur="1" fill="hold">
+                                          <p:stCondLst>
+                                            <p:cond delay="0"/>
+                                          </p:stCondLst>
+                                        </p:cTn>
+                                        <p:tgtEl>
+                                          <p:spTgt spid="36"/>
+                                        </p:tgtEl>
+                                        <p:attrNameLst>
+                                          <p:attrName>style.visibility</p:attrName>
+                                        </p:attrNameLst>
+                                      </p:cBhvr>
+                                      <p:to>
+                                        <p:strVal val="visible"/>
+                                      </p:to>
+                                    </p:set>
+                                  </p:childTnLst>
+                                </p:cTn>
+                              </p:par>
+                              <p:par>
+                                <p:cTn id="19" presetID="42" presetClass="path" presetSubtype="0" accel="50000" decel="50000" fill="hold" grpId="0" nodeType="withEffect">
+                                  <p:stCondLst>
+                                    <p:cond delay="0"/>
+                                  </p:stCondLst>
+                                  <p:childTnLst>
+                                    <p:animMotion origin="layout" path="M -2.29167E-6 -2.59259E-6 L -0.52031 -0.29629 " pathEditMode="relative" rAng="0" ptsTypes="AA">
+                                      <p:cBhvr>
+                                        <p:cTn id="20" dur="2000" spd="-100000" fill="hold"/>
+                                        <p:tgtEl>
+                                          <p:spTgt spid="36"/>
+                                        </p:tgtEl>
+                                        <p:attrNameLst>
+                                          <p:attrName>ppt_x</p:attrName>
+                                          <p:attrName>ppt_y</p:attrName>
+                                        </p:attrNameLst>
+                                      </p:cBhvr>
+                                      <p:rCtr x="-26016" y="-14815"/>
+                                    </p:animMotion>
+                                  </p:childTnLst>
+                                </p:cTn>
+                              </p:par>
+                            </p:childTnLst>
+                          </p:cTn>
+                        </p:par>
+                      </p:childTnLst>
+                    </p:cTn>
+                  </p:par>
+                  <p:par>
+                    <p:cTn id="21" fill="hold">
+                      <p:stCondLst>
+                        <p:cond delay="indefinite"/>
+                      </p:stCondLst>
+                      <p:childTnLst>
+                        <p:par>
+                          <p:cTn id="22" fill="hold">
+                            <p:stCondLst>
+                              <p:cond delay="0"/>
+                            </p:stCondLst>
+                            <p:childTnLst>
+                              <p:par>
+                                <p:cTn id="23" presetID="42" presetClass="path" presetSubtype="0" accel="50000" decel="50000" fill="hold" grpId="0" nodeType="clickEffect">
+                                  <p:stCondLst>
+                                    <p:cond delay="0"/>
+                                  </p:stCondLst>
+                                  <p:childTnLst>
+                                    <p:animMotion origin="layout" path="M 3.75E-6 4.07407E-6 L -0.00938 0.06365 " pathEditMode="relative" rAng="0" ptsTypes="AA">
+                                      <p:cBhvr>
+                                        <p:cTn id="24" dur="2000" fill="hold"/>
+                                        <p:tgtEl>
+                                          <p:spTgt spid="22"/>
+                                        </p:tgtEl>
+                                        <p:attrNameLst>
+                                          <p:attrName>ppt_x</p:attrName>
+                                          <p:attrName>ppt_y</p:attrName>
+                                        </p:attrNameLst>
+                                      </p:cBhvr>
+                                      <p:rCtr x="-469" y="3171"/>
+                                    </p:animMotion>
+                                  </p:childTnLst>
+                                </p:cTn>
+                              </p:par>
+                            </p:childTnLst>
+                          </p:cTn>
+                        </p:par>
+                      </p:childTnLst>
+                    </p:cTn>
+                  </p:par>
+                  <p:par>
+                    <p:cTn id="25" fill="hold">
+                      <p:stCondLst>
+                        <p:cond delay="indefinite"/>
+                      </p:stCondLst>
+                      <p:childTnLst>
+                        <p:par>
+                          <p:cTn id="26" fill="hold">
+                            <p:stCondLst>
+                              <p:cond delay="0"/>
+                            </p:stCondLst>
+                            <p:childTnLst>
+                              <p:par>
+                                <p:cTn id="27" presetID="42" presetClass="path" presetSubtype="0" accel="50000" decel="50000" autoRev="1" fill="hold" grpId="0" nodeType="clickEffect">
+                                  <p:stCondLst>
+                                    <p:cond delay="0"/>
+                                  </p:stCondLst>
+                                  <p:childTnLst>
+                                    <p:animMotion origin="layout" path="M 1.04167E-6 2.22222E-6 L 0.3526 0.51898 " pathEditMode="relative" rAng="0" ptsTypes="AA">
+                                      <p:cBhvr>
+                                        <p:cTn id="28" dur="2000" fill="hold"/>
+                                        <p:tgtEl>
+                                          <p:spTgt spid="20"/>
+                                        </p:tgtEl>
+                                        <p:attrNameLst>
+                                          <p:attrName>ppt_x</p:attrName>
+                                          <p:attrName>ppt_y</p:attrName>
+                                        </p:attrNameLst>
+                                      </p:cBhvr>
+                                      <p:rCtr x="17630" y="25949"/>
+                                    </p:animMotion>
+                                  </p:childTnLst>
+                                </p:cTn>
+                              </p:par>
+                            </p:childTnLst>
+                          </p:cTn>
+                        </p:par>
+                      </p:childTnLst>
+                    </p:cTn>
+                  </p:par>
+                  <p:par>
+                    <p:cTn id="29" fill="hold">
+                      <p:stCondLst>
+                        <p:cond delay="indefinite"/>
+                      </p:stCondLst>
+                      <p:childTnLst>
+                        <p:par>
+                          <p:cTn id="30" fill="hold">
+                            <p:stCondLst>
+                              <p:cond delay="0"/>
+                            </p:stCondLst>
+                            <p:childTnLst>
+                              <p:par>
+                                <p:cTn id="31" presetID="10" presetClass="entr" presetSubtype="0" fill="hold" grpId="0" nodeType="clickEffect">
+                                  <p:stCondLst>
+                                    <p:cond delay="0"/>
+                                  </p:stCondLst>
+                                  <p:childTnLst>
+                                    <p:set>
+                                      <p:cBhvr>
+                                        <p:cTn id="32" dur="1" fill="hold">
+                                          <p:stCondLst>
+                                            <p:cond delay="0"/>
+                                          </p:stCondLst>
+                                        </p:cTn>
+                                        <p:tgtEl>
+                                          <p:spTgt spid="4"/>
+                                        </p:tgtEl>
+                                        <p:attrNameLst>
+                                          <p:attrName>style.visibility</p:attrName>
+                                        </p:attrNameLst>
+                                      </p:cBhvr>
+                                      <p:to>
+                                        <p:strVal val="visible"/>
+                                      </p:to>
+                                    </p:set>
+                                    <p:animEffect transition="in" filter="fade">
+                                      <p:cBhvr>
+                                        <p:cTn id="33" dur="500"/>
+                                        <p:tgtEl>
+                                          <p:spTgt spid="4"/>
+                                        </p:tgtEl>
+                                      </p:cBhvr>
+                                    </p:animEffect>
+                                  </p:childTnLst>
+                                </p:cTn>
+                              </p:par>
+                            </p:childTnLst>
+                          </p:cTn>
+                        </p:par>
+                      </p:childTnLst>
+                    </p:cTn>
+                  </p:par>
+                  <p:par>
+                    <p:cTn id="34" fill="hold">
+                      <p:stCondLst>
+                        <p:cond delay="indefinite"/>
+                      </p:stCondLst>
+                      <p:childTnLst>
+                        <p:par>
+                          <p:cTn id="35" fill="hold">
+                            <p:stCondLst>
+                              <p:cond delay="0"/>
+                            </p:stCondLst>
+                            <p:childTnLst>
+                              <p:par>
+                                <p:cTn id="36" presetID="10" presetClass="entr" presetSubtype="0" fill="hold" grpId="2" nodeType="clickEffect">
+                                  <p:stCondLst>
+                                    <p:cond delay="0"/>
+                                  </p:stCondLst>
+                                  <p:childTnLst>
+                                    <p:set>
+                                      <p:cBhvr>
+                                        <p:cTn id="37" dur="1" fill="hold">
+                                          <p:stCondLst>
+                                            <p:cond delay="0"/>
+                                          </p:stCondLst>
+                                        </p:cTn>
+                                        <p:tgtEl>
+                                          <p:spTgt spid="37"/>
+                                        </p:tgtEl>
+                                        <p:attrNameLst>
+                                          <p:attrName>style.visibility</p:attrName>
+                                        </p:attrNameLst>
+                                      </p:cBhvr>
+                                      <p:to>
+                                        <p:strVal val="visible"/>
+                                      </p:to>
+                                    </p:set>
+                                    <p:animEffect transition="in" filter="fade">
+                                      <p:cBhvr>
+                                        <p:cTn id="38" dur="500"/>
+                                        <p:tgtEl>
+                                          <p:spTgt spid="37"/>
+                                        </p:tgtEl>
+                                      </p:cBhvr>
+                                    </p:animEffect>
+                                  </p:childTnLst>
+                                </p:cTn>
+                              </p:par>
+                            </p:childTnLst>
+                          </p:cTn>
+                        </p:par>
+                        <p:par>
+                          <p:cTn id="39" fill="hold">
+                            <p:stCondLst>
+                              <p:cond delay="500"/>
+                            </p:stCondLst>
+                            <p:childTnLst>
+                              <p:par>
+                                <p:cTn id="40" presetID="42" presetClass="path" presetSubtype="0" accel="50000" decel="50000" autoRev="1" fill="hold" grpId="0" nodeType="afterEffect">
+                                  <p:stCondLst>
+                                    <p:cond delay="0"/>
+                                  </p:stCondLst>
+                                  <p:childTnLst>
+                                    <p:animMotion origin="layout" path="M 2.91667E-6 4.07407E-6 L 0.34323 0.21736 " pathEditMode="relative" rAng="0" ptsTypes="AA">
+                                      <p:cBhvr>
+                                        <p:cTn id="41" dur="3000" fill="hold"/>
+                                        <p:tgtEl>
+                                          <p:spTgt spid="37"/>
+                                        </p:tgtEl>
+                                        <p:attrNameLst>
+                                          <p:attrName>ppt_x</p:attrName>
+                                          <p:attrName>ppt_y</p:attrName>
+                                        </p:attrNameLst>
+                                      </p:cBhvr>
+                                      <p:rCtr x="17161" y="10856"/>
+                                    </p:animMotion>
+                                  </p:childTnLst>
+                                </p:cTn>
+                              </p:par>
+                            </p:childTnLst>
+                          </p:cTn>
+                        </p:par>
+                      </p:childTnLst>
+                    </p:cTn>
+                  </p:par>
+                  <p:par>
+                    <p:cTn id="42" fill="hold">
+                      <p:stCondLst>
+                        <p:cond delay="indefinite"/>
+                      </p:stCondLst>
+                      <p:childTnLst>
+                        <p:par>
+                          <p:cTn id="43" fill="hold">
+                            <p:stCondLst>
+                              <p:cond delay="0"/>
+                            </p:stCondLst>
+                            <p:childTnLst>
+                              <p:par>
+                                <p:cTn id="44" presetID="1" presetClass="entr" presetSubtype="0" fill="hold" grpId="2" nodeType="clickEffect">
+                                  <p:stCondLst>
+                                    <p:cond delay="0"/>
+                                  </p:stCondLst>
+                                  <p:childTnLst>
+                                    <p:set>
+                                      <p:cBhvr>
+                                        <p:cTn id="45" dur="1" fill="hold">
+                                          <p:stCondLst>
+                                            <p:cond delay="0"/>
+                                          </p:stCondLst>
+                                        </p:cTn>
+                                        <p:tgtEl>
+                                          <p:spTgt spid="39"/>
+                                        </p:tgtEl>
+                                        <p:attrNameLst>
+                                          <p:attrName>style.visibility</p:attrName>
+                                        </p:attrNameLst>
+                                      </p:cBhvr>
+                                      <p:to>
+                                        <p:strVal val="visible"/>
+                                      </p:to>
+                                    </p:set>
+                                  </p:childTnLst>
+                                </p:cTn>
+                              </p:par>
+                            </p:childTnLst>
+                          </p:cTn>
+                        </p:par>
+                        <p:par>
+                          <p:cTn id="46" fill="hold">
+                            <p:stCondLst>
+                              <p:cond delay="0"/>
+                            </p:stCondLst>
+                            <p:childTnLst>
+                              <p:par>
+                                <p:cTn id="47" presetID="42" presetClass="path" presetSubtype="0" accel="50000" decel="50000" fill="hold" grpId="1" nodeType="afterEffect">
+                                  <p:stCondLst>
+                                    <p:cond delay="0"/>
+                                  </p:stCondLst>
+                                  <p:childTnLst>
+                                    <p:animMotion origin="layout" path="M 1.875E-6 -2.59259E-6 L 0.3181 0.26667 " pathEditMode="relative" rAng="0" ptsTypes="AA">
+                                      <p:cBhvr>
+                                        <p:cTn id="48" dur="2000" spd="-100000" fill="hold"/>
+                                        <p:tgtEl>
+                                          <p:spTgt spid="39"/>
+                                        </p:tgtEl>
+                                        <p:attrNameLst>
+                                          <p:attrName>ppt_x</p:attrName>
+                                          <p:attrName>ppt_y</p:attrName>
+                                        </p:attrNameLst>
+                                      </p:cBhvr>
+                                      <p:rCtr x="15898" y="13333"/>
+                                    </p:animMotion>
+                                  </p:childTnLst>
+                                </p:cTn>
+                              </p:par>
+                            </p:childTnLst>
+                          </p:cTn>
+                        </p:par>
+                      </p:childTnLst>
+                    </p:cTn>
+                  </p:par>
+                  <p:par>
+                    <p:cTn id="49" fill="hold">
+                      <p:stCondLst>
+                        <p:cond delay="indefinite"/>
+                      </p:stCondLst>
+                      <p:childTnLst>
+                        <p:par>
+                          <p:cTn id="50" fill="hold">
+                            <p:stCondLst>
+                              <p:cond delay="0"/>
+                            </p:stCondLst>
+                            <p:childTnLst>
+                              <p:par>
+                                <p:cTn id="51" presetID="42" presetClass="path" presetSubtype="0" accel="50000" decel="50000" autoRev="1" fill="hold" grpId="3" nodeType="clickEffect">
+                                  <p:stCondLst>
+                                    <p:cond delay="0"/>
+                                  </p:stCondLst>
+                                  <p:childTnLst>
+                                    <p:animMotion origin="layout" path="M 2.91667E-6 4.07407E-6 L -0.05769 0.03796 " pathEditMode="relative" rAng="0" ptsTypes="AA">
+                                      <p:cBhvr>
+                                        <p:cTn id="52" dur="2000" fill="hold"/>
+                                        <p:tgtEl>
+                                          <p:spTgt spid="37"/>
+                                        </p:tgtEl>
+                                        <p:attrNameLst>
+                                          <p:attrName>ppt_x</p:attrName>
+                                          <p:attrName>ppt_y</p:attrName>
+                                        </p:attrNameLst>
+                                      </p:cBhvr>
+                                      <p:rCtr x="-2891" y="1898"/>
+                                    </p:animMotion>
+                                  </p:childTnLst>
+                                </p:cTn>
+                              </p:par>
+                              <p:par>
+                                <p:cTn id="53" presetID="10" presetClass="entr" presetSubtype="0" fill="hold" grpId="0" nodeType="withEffect">
+                                  <p:stCondLst>
+                                    <p:cond delay="1500"/>
+                                  </p:stCondLst>
+                                  <p:childTnLst>
+                                    <p:set>
+                                      <p:cBhvr>
+                                        <p:cTn id="54" dur="1" fill="hold">
+                                          <p:stCondLst>
+                                            <p:cond delay="0"/>
+                                          </p:stCondLst>
+                                        </p:cTn>
+                                        <p:tgtEl>
+                                          <p:spTgt spid="40"/>
+                                        </p:tgtEl>
+                                        <p:attrNameLst>
+                                          <p:attrName>style.visibility</p:attrName>
+                                        </p:attrNameLst>
+                                      </p:cBhvr>
+                                      <p:to>
+                                        <p:strVal val="visible"/>
+                                      </p:to>
+                                    </p:set>
+                                    <p:animEffect transition="in" filter="fade">
+                                      <p:cBhvr>
+                                        <p:cTn id="55" dur="500"/>
+                                        <p:tgtEl>
+                                          <p:spTgt spid="40"/>
+                                        </p:tgtEl>
+                                      </p:cBhvr>
+                                    </p:animEffect>
+                                  </p:childTnLst>
+                                </p:cTn>
+                              </p:par>
+                            </p:childTnLst>
+                          </p:cTn>
+                        </p:par>
+                      </p:childTnLst>
+                    </p:cTn>
+                  </p:par>
+                  <p:par>
+                    <p:cTn id="56" fill="hold">
+                      <p:stCondLst>
+                        <p:cond delay="indefinite"/>
+                      </p:stCondLst>
+                      <p:childTnLst>
+                        <p:par>
+                          <p:cTn id="57" fill="hold">
+                            <p:stCondLst>
+                              <p:cond delay="0"/>
+                            </p:stCondLst>
+                            <p:childTnLst>
+                              <p:par>
+                                <p:cTn id="58" presetID="42" presetClass="path" presetSubtype="0" accel="50000" decel="50000" autoRev="1" fill="hold" grpId="3" nodeType="clickEffect">
+                                  <p:stCondLst>
+                                    <p:cond delay="0"/>
+                                  </p:stCondLst>
+                                  <p:childTnLst>
+                                    <p:animMotion origin="layout" path="M 1.875E-6 -2.59259E-6 L -0.05834 0.03426 " pathEditMode="relative" rAng="0" ptsTypes="AA">
+                                      <p:cBhvr>
+                                        <p:cTn id="59" dur="2000" fill="hold"/>
+                                        <p:tgtEl>
+                                          <p:spTgt spid="39"/>
+                                        </p:tgtEl>
+                                        <p:attrNameLst>
+                                          <p:attrName>ppt_x</p:attrName>
+                                          <p:attrName>ppt_y</p:attrName>
+                                        </p:attrNameLst>
+                                      </p:cBhvr>
+                                      <p:rCtr x="-2917" y="1713"/>
+                                    </p:animMotion>
+                                  </p:childTnLst>
+                                </p:cTn>
+                              </p:par>
+                              <p:par>
+                                <p:cTn id="60" presetID="10" presetClass="entr" presetSubtype="0" fill="hold" grpId="0" nodeType="withEffect">
+                                  <p:stCondLst>
+                                    <p:cond delay="1500"/>
+                                  </p:stCondLst>
+                                  <p:childTnLst>
+                                    <p:set>
+                                      <p:cBhvr>
+                                        <p:cTn id="61" dur="1" fill="hold">
+                                          <p:stCondLst>
+                                            <p:cond delay="0"/>
+                                          </p:stCondLst>
+                                        </p:cTn>
+                                        <p:tgtEl>
+                                          <p:spTgt spid="41"/>
+                                        </p:tgtEl>
+                                        <p:attrNameLst>
+                                          <p:attrName>style.visibility</p:attrName>
+                                        </p:attrNameLst>
+                                      </p:cBhvr>
+                                      <p:to>
+                                        <p:strVal val="visible"/>
+                                      </p:to>
+                                    </p:set>
+                                    <p:animEffect transition="in" filter="fade">
+                                      <p:cBhvr>
+                                        <p:cTn id="62" dur="500"/>
+                                        <p:tgtEl>
+                                          <p:spTgt spid="41"/>
+                                        </p:tgtEl>
+                                      </p:cBhvr>
+                                    </p:animEffect>
+                                  </p:childTnLst>
+                                </p:cTn>
+                              </p:par>
+                            </p:childTnLst>
+                          </p:cTn>
+                        </p:par>
+                      </p:childTnLst>
+                    </p:cTn>
+                  </p:par>
+                  <p:par>
+                    <p:cTn id="63" fill="hold">
+                      <p:stCondLst>
+                        <p:cond delay="indefinite"/>
+                      </p:stCondLst>
+                      <p:childTnLst>
+                        <p:par>
+                          <p:cTn id="64" fill="hold">
+                            <p:stCondLst>
+                              <p:cond delay="0"/>
+                            </p:stCondLst>
+                            <p:childTnLst>
+                              <p:par>
+                                <p:cTn id="65" presetID="10" presetClass="exit" presetSubtype="0" fill="hold" grpId="4" nodeType="clickEffect">
+                                  <p:stCondLst>
+                                    <p:cond delay="0"/>
+                                  </p:stCondLst>
+                                  <p:childTnLst>
+                                    <p:animEffect transition="out" filter="fade">
+                                      <p:cBhvr>
+                                        <p:cTn id="66" dur="2000"/>
+                                        <p:tgtEl>
+                                          <p:spTgt spid="37"/>
+                                        </p:tgtEl>
+                                      </p:cBhvr>
+                                    </p:animEffect>
+                                    <p:set>
+                                      <p:cBhvr>
+                                        <p:cTn id="67" dur="1" fill="hold">
+                                          <p:stCondLst>
+                                            <p:cond delay="1999"/>
+                                          </p:stCondLst>
+                                        </p:cTn>
+                                        <p:tgtEl>
+                                          <p:spTgt spid="37"/>
+                                        </p:tgtEl>
+                                        <p:attrNameLst>
+                                          <p:attrName>style.visibility</p:attrName>
+                                        </p:attrNameLst>
+                                      </p:cBhvr>
+                                      <p:to>
+                                        <p:strVal val="hidden"/>
+                                      </p:to>
+                                    </p:set>
+                                  </p:childTnLst>
+                                </p:cTn>
+                              </p:par>
+                              <p:par>
+                                <p:cTn id="68" presetID="10" presetClass="exit" presetSubtype="0" fill="hold" grpId="4" nodeType="withEffect">
+                                  <p:stCondLst>
+                                    <p:cond delay="0"/>
+                                  </p:stCondLst>
+                                  <p:childTnLst>
+                                    <p:animEffect transition="out" filter="fade">
+                                      <p:cBhvr>
+                                        <p:cTn id="69" dur="2000"/>
+                                        <p:tgtEl>
+                                          <p:spTgt spid="39"/>
+                                        </p:tgtEl>
+                                      </p:cBhvr>
+                                    </p:animEffect>
+                                    <p:set>
+                                      <p:cBhvr>
+                                        <p:cTn id="70" dur="1" fill="hold">
+                                          <p:stCondLst>
+                                            <p:cond delay="1999"/>
+                                          </p:stCondLst>
+                                        </p:cTn>
+                                        <p:tgtEl>
+                                          <p:spTgt spid="39"/>
+                                        </p:tgtEl>
+                                        <p:attrNameLst>
+                                          <p:attrName>style.visibility</p:attrName>
+                                        </p:attrNameLst>
+                                      </p:cBhvr>
+                                      <p:to>
+                                        <p:strVal val="hidden"/>
+                                      </p:to>
+                                    </p:set>
+                                  </p:childTnLst>
+                                </p:cTn>
+                              </p:par>
+                              <p:par>
+                                <p:cTn id="71" presetID="10" presetClass="exit" presetSubtype="0" fill="hold" grpId="0" nodeType="withEffect">
+                                  <p:stCondLst>
+                                    <p:cond delay="0"/>
+                                  </p:stCondLst>
+                                  <p:childTnLst>
+                                    <p:animEffect transition="out" filter="fade">
+                                      <p:cBhvr>
+                                        <p:cTn id="72" dur="2000"/>
+                                        <p:tgtEl>
+                                          <p:spTgt spid="33"/>
+                                        </p:tgtEl>
+                                      </p:cBhvr>
+                                    </p:animEffect>
+                                    <p:set>
+                                      <p:cBhvr>
+                                        <p:cTn id="73" dur="1" fill="hold">
+                                          <p:stCondLst>
+                                            <p:cond delay="1999"/>
+                                          </p:stCondLst>
+                                        </p:cTn>
+                                        <p:tgtEl>
+                                          <p:spTgt spid="33"/>
+                                        </p:tgtEl>
+                                        <p:attrNameLst>
+                                          <p:attrName>style.visibility</p:attrName>
+                                        </p:attrNameLst>
+                                      </p:cBhvr>
+                                      <p:to>
+                                        <p:strVal val="hidden"/>
+                                      </p:to>
+                                    </p:set>
+                                  </p:childTnLst>
+                                </p:cTn>
+                              </p:par>
+                            </p:childTnLst>
+                          </p:cTn>
+                        </p:par>
+                      </p:childTnLst>
+                    </p:cTn>
+                  </p:par>
+                  <p:par>
+                    <p:cTn id="74" fill="hold">
+                      <p:stCondLst>
+                        <p:cond delay="indefinite"/>
+                      </p:stCondLst>
+                      <p:childTnLst>
+                        <p:par>
+                          <p:cTn id="75" fill="hold">
+                            <p:stCondLst>
+                              <p:cond delay="0"/>
+                            </p:stCondLst>
+                            <p:childTnLst>
+                              <p:par>
+                                <p:cTn id="76" presetID="42" presetClass="path" presetSubtype="0" accel="50000" decel="50000" autoRev="1" fill="hold" grpId="1" nodeType="clickEffect">
+                                  <p:stCondLst>
+                                    <p:cond delay="0"/>
+                                  </p:stCondLst>
+                                  <p:childTnLst>
+                                    <p:animMotion origin="layout" path="M -3.54167E-6 -7.40741E-7 L -0.11523 0.15741 " pathEditMode="relative" rAng="0" ptsTypes="AA">
+                                      <p:cBhvr>
+                                        <p:cTn id="77" dur="2000" fill="hold"/>
+                                        <p:tgtEl>
+                                          <p:spTgt spid="40"/>
+                                        </p:tgtEl>
+                                        <p:attrNameLst>
+                                          <p:attrName>ppt_x</p:attrName>
+                                          <p:attrName>ppt_y</p:attrName>
+                                        </p:attrNameLst>
+                                      </p:cBhvr>
+                                      <p:rCtr x="-5768" y="7870"/>
+                                    </p:animMotion>
+                                  </p:childTnLst>
+                                </p:cTn>
+                              </p:par>
+                              <p:par>
+                                <p:cTn id="78" presetID="10" presetClass="entr" presetSubtype="0" fill="hold" grpId="0" nodeType="withEffect">
+                                  <p:stCondLst>
+                                    <p:cond delay="1200"/>
+                                  </p:stCondLst>
+                                  <p:childTnLst>
+                                    <p:set>
+                                      <p:cBhvr>
+                                        <p:cTn id="79" dur="1" fill="hold">
+                                          <p:stCondLst>
+                                            <p:cond delay="0"/>
+                                          </p:stCondLst>
+                                        </p:cTn>
+                                        <p:tgtEl>
+                                          <p:spTgt spid="43"/>
+                                        </p:tgtEl>
+                                        <p:attrNameLst>
+                                          <p:attrName>style.visibility</p:attrName>
+                                        </p:attrNameLst>
+                                      </p:cBhvr>
+                                      <p:to>
+                                        <p:strVal val="visible"/>
+                                      </p:to>
+                                    </p:set>
+                                    <p:animEffect transition="in" filter="fade">
+                                      <p:cBhvr>
+                                        <p:cTn id="80" dur="1000"/>
+                                        <p:tgtEl>
+                                          <p:spTgt spid="43"/>
+                                        </p:tgtEl>
+                                      </p:cBhvr>
+                                    </p:animEffect>
+                                  </p:childTnLst>
+                                </p:cTn>
+                              </p:par>
+                              <p:par>
+                                <p:cTn id="81" presetID="10" presetClass="entr" presetSubtype="0" fill="hold" grpId="0" nodeType="withEffect">
+                                  <p:stCondLst>
+                                    <p:cond delay="1200"/>
+                                  </p:stCondLst>
+                                  <p:childTnLst>
+                                    <p:set>
+                                      <p:cBhvr>
+                                        <p:cTn id="82" dur="1" fill="hold">
+                                          <p:stCondLst>
+                                            <p:cond delay="0"/>
+                                          </p:stCondLst>
+                                        </p:cTn>
+                                        <p:tgtEl>
+                                          <p:spTgt spid="42"/>
+                                        </p:tgtEl>
+                                        <p:attrNameLst>
+                                          <p:attrName>style.visibility</p:attrName>
+                                        </p:attrNameLst>
+                                      </p:cBhvr>
+                                      <p:to>
+                                        <p:strVal val="visible"/>
+                                      </p:to>
+                                    </p:set>
+                                    <p:animEffect transition="in" filter="fade">
+                                      <p:cBhvr>
+                                        <p:cTn id="83" dur="1000"/>
+                                        <p:tgtEl>
+                                          <p:spTgt spid="42"/>
+                                        </p:tgtEl>
+                                      </p:cBhvr>
+                                    </p:animEffect>
+                                  </p:childTnLst>
+                                </p:cTn>
+                              </p:par>
+                            </p:childTnLst>
+                          </p:cTn>
+                        </p:par>
+                      </p:childTnLst>
+                    </p:cTn>
+                  </p:par>
+                </p:childTnLst>
+              </p:cTn>
+              <p:prevCondLst>
+                <p:cond evt="onPrev" delay="0">
+                  <p:tgtEl>
+                    <p:sldTgt/>
+                  </p:tgtEl>
+                </p:cond>
+              </p:prevCondLst>
+              <p:nextCondLst>
+                <p:cond evt="onNext" delay="0">
+                  <p:tgtEl>
+                    <p:sldTgt/>
+                  </p:tgtEl>
+                </p:cond>
+              </p:nextCondLst>
+            </p:seq>
+          </p:childTnLst>
+        </p:cTn>
+      </p:par>
+    </p:tnLst>
+    <p:bldLst>
+      <p:bldP spid="4" grpId="0" animBg="1"/>
+      <p:bldP spid="22" grpId="0" animBg="1"/>
+      <p:bldP spid="33" grpId="0" animBg="1"/>
+      <p:bldP spid="20" grpId="0" animBg="1"/>
+      <p:bldP spid="34" grpId="0" animBg="1"/>
+      <p:bldP spid="34" grpId="1" animBg="1"/>
+      <p:bldP spid="36" grpId="0" animBg="1"/>
+      <p:bldP spid="36" grpId="1" animBg="1"/>
+      <p:bldP spid="35" grpId="0" animBg="1"/>
+      <p:bldP spid="35" grpId="1" animBg="1"/>
+      <p:bldP spid="39" grpId="1" animBg="1"/>
+      <p:bldP spid="39" grpId="2" animBg="1"/>
+      <p:bldP spid="39" grpId="3" animBg="1"/>
+      <p:bldP spid="39" grpId="4" animBg="1"/>
+      <p:bldP spid="41" grpId="0" animBg="1"/>
+      <p:bldP spid="42" grpId="0" animBg="1"/>
+      <p:bldP spid="43" grpId="0" animBg="1"/>
+      <p:bldP spid="40" grpId="0" animBg="1"/>
+      <p:bldP spid="40" grpId="1" animBg="1"/>
+      <p:bldP spid="37" grpId="0" animBg="1"/>
+      <p:bldP spid="37" grpId="2" animBg="1"/>
+      <p:bldP spid="37" grpId="3" animBg="1"/>
+      <p:bldP spid="37" grpId="4" animBg="1"/>
+    </p:bldLst>
+  </p:timing>
+</p:sld>
+</file>
+
+<file path=ppt/slides/slide6.xml><?xml version="1.0" encoding="utf-8"?>
+<p:sld xmlns:a="http://schemas.openxmlformats.org/drawingml/2006/main" xmlns:r="http://schemas.openxmlformats.org/officeDocument/2006/relationships" xmlns:p="http://schemas.openxmlformats.org/presentationml/2006/main">
+  <p:cSld>
+    <p:spTree>
+      <p:nvGrpSpPr>
+        <p:cNvPr id="1" name=""/>
+        <p:cNvGrpSpPr/>
+        <p:nvPr/>
+      </p:nvGrpSpPr>
+      <p:grpSpPr>
+        <a:xfrm>
+          <a:off x="0" y="0"/>
+          <a:ext cx="0" cy="0"/>
+          <a:chOff x="0" y="0"/>
+          <a:chExt cx="0" cy="0"/>
+        </a:xfrm>
+      </p:grpSpPr>
+      <p:sp>
+        <p:nvSpPr>
+          <p:cNvPr id="2" name="Title 1">
+            <a:extLst>
+              <a:ext uri="{FF2B5EF4-FFF2-40B4-BE49-F238E27FC236}">
                 <a16:creationId xmlns:a16="http://schemas.microsoft.com/office/drawing/2014/main" id="{DFB02394-9405-43A4-BB6A-AF72622BBE2E}"/>
               </a:ext>
             </a:extLst>
@@ -12964,7 +15822,7 @@
 </p:sld>
 </file>
 
-<file path=ppt/slides/slide6.xml><?xml version="1.0" encoding="utf-8"?>
+<file path=ppt/slides/slide7.xml><?xml version="1.0" encoding="utf-8"?>
 <p:sld xmlns:a="http://schemas.openxmlformats.org/drawingml/2006/main" xmlns:r="http://schemas.openxmlformats.org/officeDocument/2006/relationships" xmlns:p="http://schemas.openxmlformats.org/presentationml/2006/main">
   <p:cSld>
     <p:spTree>

</xml_diff>

<commit_message>
Add slides for Epic #27
</commit_message>
<xml_diff>
--- a/openshift_process.pptx
+++ b/openshift_process.pptx
@@ -13,8 +13,8 @@
     <p:sldId id="262" r:id="rId4"/>
     <p:sldId id="263" r:id="rId5"/>
     <p:sldId id="264" r:id="rId6"/>
-    <p:sldId id="261" r:id="rId7"/>
-    <p:sldId id="258" r:id="rId8"/>
+    <p:sldId id="265" r:id="rId7"/>
+    <p:sldId id="261" r:id="rId8"/>
   </p:sldIdLst>
   <p:sldSz cx="12192000" cy="6858000"/>
   <p:notesSz cx="6858000" cy="9144000"/>
@@ -7686,8 +7686,8 @@
         </p:nvSpPr>
         <p:spPr>
           <a:xfrm>
-            <a:off x="534442" y="1776270"/>
-            <a:ext cx="701752" cy="360511"/>
+            <a:off x="440992" y="1680551"/>
+            <a:ext cx="635373" cy="360511"/>
           </a:xfrm>
           <a:prstGeom prst="roundRect">
             <a:avLst/>
@@ -7759,8 +7759,8 @@
         </p:nvSpPr>
         <p:spPr>
           <a:xfrm>
-            <a:off x="1502595" y="1780055"/>
-            <a:ext cx="701752" cy="360511"/>
+            <a:off x="938447" y="1822984"/>
+            <a:ext cx="635373" cy="360511"/>
           </a:xfrm>
           <a:prstGeom prst="roundRect">
             <a:avLst/>
@@ -7815,6 +7815,153 @@
               <a:rPr lang="en-US" sz="900" dirty="0"/>
               <a:t>Deploy Team</a:t>
             </a:r>
+          </a:p>
+        </p:txBody>
+      </p:sp>
+      <p:sp>
+        <p:nvSpPr>
+          <p:cNvPr id="84" name="Rectangle: Rounded Corners 83">
+            <a:extLst>
+              <a:ext uri="{FF2B5EF4-FFF2-40B4-BE49-F238E27FC236}">
+                <a16:creationId xmlns:a16="http://schemas.microsoft.com/office/drawing/2014/main" id="{056D14EB-4C10-4DC5-812A-6F4482804135}"/>
+              </a:ext>
+            </a:extLst>
+          </p:cNvPr>
+          <p:cNvSpPr/>
+          <p:nvPr/>
+        </p:nvSpPr>
+        <p:spPr>
+          <a:xfrm>
+            <a:off x="1476495" y="1881256"/>
+            <a:ext cx="635373" cy="360511"/>
+          </a:xfrm>
+          <a:prstGeom prst="roundRect">
+            <a:avLst/>
+          </a:prstGeom>
+          <a:gradFill flip="none" rotWithShape="1">
+            <a:gsLst>
+              <a:gs pos="0">
+                <a:schemeClr val="accent1">
+                  <a:lumMod val="67000"/>
+                </a:schemeClr>
+              </a:gs>
+              <a:gs pos="48000">
+                <a:schemeClr val="accent1">
+                  <a:lumMod val="97000"/>
+                  <a:lumOff val="3000"/>
+                </a:schemeClr>
+              </a:gs>
+              <a:gs pos="100000">
+                <a:schemeClr val="accent1">
+                  <a:lumMod val="60000"/>
+                  <a:lumOff val="40000"/>
+                </a:schemeClr>
+              </a:gs>
+            </a:gsLst>
+            <a:lin ang="16200000" scaled="1"/>
+            <a:tileRect/>
+          </a:gradFill>
+          <a:ln>
+            <a:noFill/>
+          </a:ln>
+        </p:spPr>
+        <p:style>
+          <a:lnRef idx="0">
+            <a:scrgbClr r="0" g="0" b="0"/>
+          </a:lnRef>
+          <a:fillRef idx="0">
+            <a:scrgbClr r="0" g="0" b="0"/>
+          </a:fillRef>
+          <a:effectRef idx="0">
+            <a:scrgbClr r="0" g="0" b="0"/>
+          </a:effectRef>
+          <a:fontRef idx="minor">
+            <a:schemeClr val="lt1"/>
+          </a:fontRef>
+        </p:style>
+        <p:txBody>
+          <a:bodyPr rtlCol="0" anchor="t"/>
+          <a:lstStyle/>
+          <a:p>
+            <a:pPr algn="ctr"/>
+            <a:r>
+              <a:rPr lang="en-US" sz="900" dirty="0"/>
+              <a:t>Op Team</a:t>
+            </a:r>
+          </a:p>
+        </p:txBody>
+      </p:sp>
+      <p:sp>
+        <p:nvSpPr>
+          <p:cNvPr id="85" name="Rectangle: Rounded Corners 84">
+            <a:extLst>
+              <a:ext uri="{FF2B5EF4-FFF2-40B4-BE49-F238E27FC236}">
+                <a16:creationId xmlns:a16="http://schemas.microsoft.com/office/drawing/2014/main" id="{10491987-5B2D-47C2-9AEE-884118E2F401}"/>
+              </a:ext>
+            </a:extLst>
+          </p:cNvPr>
+          <p:cNvSpPr/>
+          <p:nvPr/>
+        </p:nvSpPr>
+        <p:spPr>
+          <a:xfrm>
+            <a:off x="1717086" y="1607672"/>
+            <a:ext cx="635373" cy="360511"/>
+          </a:xfrm>
+          <a:prstGeom prst="roundRect">
+            <a:avLst/>
+          </a:prstGeom>
+          <a:gradFill flip="none" rotWithShape="1">
+            <a:gsLst>
+              <a:gs pos="0">
+                <a:schemeClr val="accent1">
+                  <a:lumMod val="67000"/>
+                </a:schemeClr>
+              </a:gs>
+              <a:gs pos="48000">
+                <a:schemeClr val="accent1">
+                  <a:lumMod val="97000"/>
+                  <a:lumOff val="3000"/>
+                </a:schemeClr>
+              </a:gs>
+              <a:gs pos="100000">
+                <a:schemeClr val="accent1">
+                  <a:lumMod val="60000"/>
+                  <a:lumOff val="40000"/>
+                </a:schemeClr>
+              </a:gs>
+            </a:gsLst>
+            <a:lin ang="16200000" scaled="1"/>
+            <a:tileRect/>
+          </a:gradFill>
+          <a:ln>
+            <a:noFill/>
+          </a:ln>
+        </p:spPr>
+        <p:style>
+          <a:lnRef idx="0">
+            <a:scrgbClr r="0" g="0" b="0"/>
+          </a:lnRef>
+          <a:fillRef idx="0">
+            <a:scrgbClr r="0" g="0" b="0"/>
+          </a:fillRef>
+          <a:effectRef idx="0">
+            <a:scrgbClr r="0" g="0" b="0"/>
+          </a:effectRef>
+          <a:fontRef idx="minor">
+            <a:schemeClr val="lt1"/>
+          </a:fontRef>
+        </p:style>
+        <p:txBody>
+          <a:bodyPr rtlCol="0" anchor="t"/>
+          <a:lstStyle/>
+          <a:p>
+            <a:pPr algn="ctr"/>
+            <a:r>
+              <a:rPr lang="en-US" sz="900" dirty="0" err="1"/>
+              <a:t>SupportTeam</a:t>
+            </a:r>
+            <a:endParaRPr lang="en-US" sz="900" dirty="0"/>
           </a:p>
         </p:txBody>
       </p:sp>
@@ -8412,33 +8559,15 @@
                                   </p:childTnLst>
                                 </p:cTn>
                               </p:par>
-                            </p:childTnLst>
-                          </p:cTn>
-                        </p:par>
-                      </p:childTnLst>
-                    </p:cTn>
-                  </p:par>
-                  <p:par>
-                    <p:cTn id="57" fill="hold">
-                      <p:stCondLst>
-                        <p:cond delay="indefinite"/>
-                      </p:stCondLst>
-                      <p:childTnLst>
-                        <p:par>
-                          <p:cTn id="58" fill="hold">
-                            <p:stCondLst>
-                              <p:cond delay="0"/>
-                            </p:stCondLst>
-                            <p:childTnLst>
                               <p:par>
-                                <p:cTn id="59" presetID="10" presetClass="entr" presetSubtype="0" fill="hold" nodeType="clickEffect">
+                                <p:cTn id="57" presetID="10" presetClass="entr" presetSubtype="0" fill="hold" nodeType="withEffect">
                                   <p:stCondLst>
                                     <p:cond delay="0"/>
                                   </p:stCondLst>
                                   <p:childTnLst>
                                     <p:set>
                                       <p:cBhvr>
-                                        <p:cTn id="60" dur="1" fill="hold">
+                                        <p:cTn id="58" dur="1" fill="hold">
                                           <p:stCondLst>
                                             <p:cond delay="0"/>
                                           </p:stCondLst>
@@ -8456,7 +8585,7 @@
                                     </p:set>
                                     <p:animEffect transition="in" filter="fade">
                                       <p:cBhvr>
-                                        <p:cTn id="61" dur="500"/>
+                                        <p:cTn id="59" dur="500"/>
                                         <p:tgtEl>
                                           <p:spTgt spid="135"/>
                                         </p:tgtEl>
@@ -8465,33 +8594,15 @@
                                   </p:childTnLst>
                                 </p:cTn>
                               </p:par>
-                            </p:childTnLst>
-                          </p:cTn>
-                        </p:par>
-                      </p:childTnLst>
-                    </p:cTn>
-                  </p:par>
-                  <p:par>
-                    <p:cTn id="62" fill="hold">
-                      <p:stCondLst>
-                        <p:cond delay="indefinite"/>
-                      </p:stCondLst>
-                      <p:childTnLst>
-                        <p:par>
-                          <p:cTn id="63" fill="hold">
-                            <p:stCondLst>
-                              <p:cond delay="0"/>
-                            </p:stCondLst>
-                            <p:childTnLst>
                               <p:par>
-                                <p:cTn id="64" presetID="10" presetClass="entr" presetSubtype="0" fill="hold" nodeType="clickEffect">
+                                <p:cTn id="60" presetID="10" presetClass="entr" presetSubtype="0" fill="hold" nodeType="withEffect">
                                   <p:stCondLst>
                                     <p:cond delay="0"/>
                                   </p:stCondLst>
                                   <p:childTnLst>
                                     <p:set>
                                       <p:cBhvr>
-                                        <p:cTn id="65" dur="1" fill="hold">
+                                        <p:cTn id="61" dur="1" fill="hold">
                                           <p:stCondLst>
                                             <p:cond delay="0"/>
                                           </p:stCondLst>
@@ -8509,7 +8620,7 @@
                                     </p:set>
                                     <p:animEffect transition="in" filter="fade">
                                       <p:cBhvr>
-                                        <p:cTn id="66" dur="500"/>
+                                        <p:cTn id="62" dur="500"/>
                                         <p:tgtEl>
                                           <p:spTgt spid="130"/>
                                         </p:tgtEl>
@@ -8525,26 +8636,26 @@
                     </p:cTn>
                   </p:par>
                   <p:par>
-                    <p:cTn id="67" fill="hold">
+                    <p:cTn id="63" fill="hold">
                       <p:stCondLst>
                         <p:cond delay="indefinite"/>
                       </p:stCondLst>
                       <p:childTnLst>
                         <p:par>
-                          <p:cTn id="68" fill="hold">
+                          <p:cTn id="64" fill="hold">
                             <p:stCondLst>
                               <p:cond delay="0"/>
                             </p:stCondLst>
                             <p:childTnLst>
                               <p:par>
-                                <p:cTn id="69" presetID="10" presetClass="entr" presetSubtype="0" fill="hold" nodeType="clickEffect">
+                                <p:cTn id="65" presetID="10" presetClass="entr" presetSubtype="0" fill="hold" nodeType="clickEffect">
                                   <p:stCondLst>
                                     <p:cond delay="0"/>
                                   </p:stCondLst>
                                   <p:childTnLst>
                                     <p:set>
                                       <p:cBhvr>
-                                        <p:cTn id="70" dur="1" fill="hold">
+                                        <p:cTn id="66" dur="1" fill="hold">
                                           <p:stCondLst>
                                             <p:cond delay="0"/>
                                           </p:stCondLst>
@@ -8562,7 +8673,7 @@
                                     </p:set>
                                     <p:animEffect transition="in" filter="fade">
                                       <p:cBhvr>
-                                        <p:cTn id="71" dur="500"/>
+                                        <p:cTn id="67" dur="500"/>
                                         <p:tgtEl>
                                           <p:spTgt spid="57"/>
                                         </p:tgtEl>
@@ -8751,7 +8862,7 @@
           <a:p>
             <a:r>
               <a:rPr lang="en-US" dirty="0"/>
-              <a:t>Initialize OMS Group and Create Base CDT</a:t>
+              <a:t>Initialize OMS Group Cluster and Create Base CDT</a:t>
             </a:r>
           </a:p>
         </p:txBody>
@@ -8876,7 +8987,7 @@
             <a:pPr algn="ctr"/>
             <a:r>
               <a:rPr lang="en-US" dirty="0"/>
-              <a:t>OMS Group (Testing) Project</a:t>
+              <a:t>OMS Group Environment (OpenShift Project)</a:t>
             </a:r>
           </a:p>
         </p:txBody>
@@ -9888,6 +9999,62 @@
           </p:txBody>
         </p:sp>
       </p:grpSp>
+      <p:sp>
+        <p:nvSpPr>
+          <p:cNvPr id="25" name="Oval 24">
+            <a:extLst>
+              <a:ext uri="{FF2B5EF4-FFF2-40B4-BE49-F238E27FC236}">
+                <a16:creationId xmlns:a16="http://schemas.microsoft.com/office/drawing/2014/main" id="{1B1BDD40-D616-4650-9C50-18A3D88E37FC}"/>
+              </a:ext>
+            </a:extLst>
+          </p:cNvPr>
+          <p:cNvSpPr/>
+          <p:nvPr/>
+        </p:nvSpPr>
+        <p:spPr>
+          <a:xfrm>
+            <a:off x="7047235" y="4238142"/>
+            <a:ext cx="1042616" cy="504939"/>
+          </a:xfrm>
+          <a:prstGeom prst="ellipse">
+            <a:avLst/>
+          </a:prstGeom>
+        </p:spPr>
+        <p:style>
+          <a:lnRef idx="2">
+            <a:schemeClr val="accent1">
+              <a:shade val="50000"/>
+            </a:schemeClr>
+          </a:lnRef>
+          <a:fillRef idx="1">
+            <a:schemeClr val="accent1"/>
+          </a:fillRef>
+          <a:effectRef idx="0">
+            <a:schemeClr val="accent1"/>
+          </a:effectRef>
+          <a:fontRef idx="minor">
+            <a:schemeClr val="lt1"/>
+          </a:fontRef>
+        </p:style>
+        <p:txBody>
+          <a:bodyPr rtlCol="0" anchor="ctr"/>
+          <a:lstStyle/>
+          <a:p>
+            <a:pPr algn="ctr"/>
+            <a:r>
+              <a:rPr lang="en-US" sz="900" dirty="0"/>
+              <a:t>Container</a:t>
+            </a:r>
+          </a:p>
+          <a:p>
+            <a:pPr algn="ctr"/>
+            <a:r>
+              <a:rPr lang="en-US" sz="900" dirty="0"/>
+              <a:t>App</a:t>
+            </a:r>
+          </a:p>
+        </p:txBody>
+      </p:sp>
     </p:spTree>
     <p:extLst>
       <p:ext uri="{BB962C8B-B14F-4D97-AF65-F5344CB8AC3E}">
@@ -10493,7 +10660,7 @@
                                           </p:stCondLst>
                                         </p:cTn>
                                         <p:tgtEl>
-                                          <p:spTgt spid="17"/>
+                                          <p:spTgt spid="25"/>
                                         </p:tgtEl>
                                         <p:attrNameLst>
                                           <p:attrName>style.visibility</p:attrName>
@@ -10512,18 +10679,18 @@
                                     <p:cond delay="0"/>
                                   </p:stCondLst>
                                   <p:childTnLst>
-                                    <p:animMotion origin="layout" path="M 3.75E-6 -1.48148E-6 L -0.39688 -0.08009 " pathEditMode="relative" rAng="0" ptsTypes="AA">
+                                    <p:animMotion origin="layout" path="M -3.125E-6 -1.11111E-6 L -0.27382 -0.27176 " pathEditMode="relative" rAng="0" ptsTypes="AA">
                                       <p:cBhvr>
                                         <p:cTn id="59" dur="2000" spd="-100000" fill="hold"/>
                                         <p:tgtEl>
-                                          <p:spTgt spid="17"/>
+                                          <p:spTgt spid="25"/>
                                         </p:tgtEl>
                                         <p:attrNameLst>
                                           <p:attrName>ppt_x</p:attrName>
                                           <p:attrName>ppt_y</p:attrName>
                                         </p:attrNameLst>
                                       </p:cBhvr>
-                                      <p:rCtr x="-19844" y="-4005"/>
+                                      <p:rCtr x="-13698" y="-13588"/>
                                     </p:animMotion>
                                   </p:childTnLst>
                                 </p:cTn>
@@ -10560,7 +10727,7 @@
                                           </p:stCondLst>
                                         </p:cTn>
                                         <p:tgtEl>
-                                          <p:spTgt spid="14"/>
+                                          <p:spTgt spid="17"/>
                                         </p:tgtEl>
                                         <p:attrNameLst>
                                           <p:attrName>style.visibility</p:attrName>
@@ -10579,18 +10746,18 @@
                                     <p:cond delay="0"/>
                                   </p:stCondLst>
                                   <p:childTnLst>
-                                    <p:animMotion origin="layout" path="M -2.08333E-6 -4.07407E-6 L -0.25651 -0.27222 " pathEditMode="relative" rAng="0" ptsTypes="AA">
+                                    <p:animMotion origin="layout" path="M 3.75E-6 -1.48148E-6 L -0.39688 -0.08009 " pathEditMode="relative" rAng="0" ptsTypes="AA">
                                       <p:cBhvr>
                                         <p:cTn id="65" dur="2000" spd="-100000" fill="hold"/>
                                         <p:tgtEl>
-                                          <p:spTgt spid="14"/>
+                                          <p:spTgt spid="17"/>
                                         </p:tgtEl>
                                         <p:attrNameLst>
                                           <p:attrName>ppt_x</p:attrName>
                                           <p:attrName>ppt_y</p:attrName>
                                         </p:attrNameLst>
                                       </p:cBhvr>
-                                      <p:rCtr x="-12826" y="-13611"/>
+                                      <p:rCtr x="-19844" y="-4005"/>
                                     </p:animMotion>
                                   </p:childTnLst>
                                 </p:cTn>
@@ -10614,7 +10781,7 @@
                             </p:stCondLst>
                             <p:childTnLst>
                               <p:par>
-                                <p:cTn id="68" presetID="10" presetClass="entr" presetSubtype="0" fill="hold" nodeType="clickEffect">
+                                <p:cTn id="68" presetID="1" presetClass="entr" presetSubtype="0" fill="hold" grpId="1" nodeType="clickEffect">
                                   <p:stCondLst>
                                     <p:cond delay="0"/>
                                   </p:stCondLst>
@@ -10622,6 +10789,73 @@
                                     <p:set>
                                       <p:cBhvr>
                                         <p:cTn id="69" dur="1" fill="hold">
+                                          <p:stCondLst>
+                                            <p:cond delay="0"/>
+                                          </p:stCondLst>
+                                        </p:cTn>
+                                        <p:tgtEl>
+                                          <p:spTgt spid="14"/>
+                                        </p:tgtEl>
+                                        <p:attrNameLst>
+                                          <p:attrName>style.visibility</p:attrName>
+                                        </p:attrNameLst>
+                                      </p:cBhvr>
+                                      <p:to>
+                                        <p:strVal val="visible"/>
+                                      </p:to>
+                                    </p:set>
+                                  </p:childTnLst>
+                                </p:cTn>
+                              </p:par>
+                              <p:par>
+                                <p:cTn id="70" presetID="42" presetClass="path" presetSubtype="0" accel="50000" decel="50000" fill="hold" grpId="0" nodeType="withEffect">
+                                  <p:stCondLst>
+                                    <p:cond delay="0"/>
+                                  </p:stCondLst>
+                                  <p:childTnLst>
+                                    <p:animMotion origin="layout" path="M -2.08333E-6 -4.07407E-6 L -0.25651 -0.27222 " pathEditMode="relative" rAng="0" ptsTypes="AA">
+                                      <p:cBhvr>
+                                        <p:cTn id="71" dur="2000" spd="-100000" fill="hold"/>
+                                        <p:tgtEl>
+                                          <p:spTgt spid="14"/>
+                                        </p:tgtEl>
+                                        <p:attrNameLst>
+                                          <p:attrName>ppt_x</p:attrName>
+                                          <p:attrName>ppt_y</p:attrName>
+                                        </p:attrNameLst>
+                                      </p:cBhvr>
+                                      <p:rCtr x="-12826" y="-13611"/>
+                                    </p:animMotion>
+                                  </p:childTnLst>
+                                </p:cTn>
+                              </p:par>
+                            </p:childTnLst>
+                          </p:cTn>
+                        </p:par>
+                      </p:childTnLst>
+                    </p:cTn>
+                  </p:par>
+                  <p:par>
+                    <p:cTn id="72" fill="hold">
+                      <p:stCondLst>
+                        <p:cond delay="indefinite"/>
+                      </p:stCondLst>
+                      <p:childTnLst>
+                        <p:par>
+                          <p:cTn id="73" fill="hold">
+                            <p:stCondLst>
+                              <p:cond delay="0"/>
+                            </p:stCondLst>
+                            <p:childTnLst>
+                              <p:par>
+                                <p:cTn id="74" presetID="10" presetClass="entr" presetSubtype="0" fill="hold" nodeType="clickEffect">
+                                  <p:stCondLst>
+                                    <p:cond delay="0"/>
+                                  </p:stCondLst>
+                                  <p:childTnLst>
+                                    <p:set>
+                                      <p:cBhvr>
+                                        <p:cTn id="75" dur="1" fill="hold">
                                           <p:stCondLst>
                                             <p:cond delay="0"/>
                                           </p:stCondLst>
@@ -10639,7 +10873,7 @@
                                     </p:set>
                                     <p:animEffect transition="in" filter="fade">
                                       <p:cBhvr>
-                                        <p:cTn id="70" dur="500"/>
+                                        <p:cTn id="76" dur="500"/>
                                         <p:tgtEl>
                                           <p:spTgt spid="34"/>
                                         </p:tgtEl>
@@ -10652,20 +10886,20 @@
                           </p:cTn>
                         </p:par>
                         <p:par>
-                          <p:cTn id="71" fill="hold">
+                          <p:cTn id="77" fill="hold">
                             <p:stCondLst>
                               <p:cond delay="500"/>
                             </p:stCondLst>
                             <p:childTnLst>
                               <p:par>
-                                <p:cTn id="72" presetID="10" presetClass="exit" presetSubtype="0" fill="hold" nodeType="afterEffect">
+                                <p:cTn id="78" presetID="10" presetClass="exit" presetSubtype="0" fill="hold" nodeType="afterEffect">
                                   <p:stCondLst>
                                     <p:cond delay="2000"/>
                                   </p:stCondLst>
                                   <p:childTnLst>
                                     <p:animEffect transition="out" filter="fade">
                                       <p:cBhvr>
-                                        <p:cTn id="73" dur="500"/>
+                                        <p:cTn id="79" dur="500"/>
                                         <p:tgtEl>
                                           <p:spTgt spid="34"/>
                                         </p:tgtEl>
@@ -10673,7 +10907,7 @@
                                     </p:animEffect>
                                     <p:set>
                                       <p:cBhvr>
-                                        <p:cTn id="74" dur="1" fill="hold">
+                                        <p:cTn id="80" dur="1" fill="hold">
                                           <p:stCondLst>
                                             <p:cond delay="499"/>
                                           </p:stCondLst>
@@ -10696,20 +10930,20 @@
                           </p:cTn>
                         </p:par>
                         <p:par>
-                          <p:cTn id="75" fill="hold">
+                          <p:cTn id="81" fill="hold">
                             <p:stCondLst>
                               <p:cond delay="3000"/>
                             </p:stCondLst>
                             <p:childTnLst>
                               <p:par>
-                                <p:cTn id="76" presetID="1" presetClass="entr" presetSubtype="0" fill="hold" grpId="1" nodeType="afterEffect">
+                                <p:cTn id="82" presetID="1" presetClass="entr" presetSubtype="0" fill="hold" grpId="1" nodeType="afterEffect">
                                   <p:stCondLst>
                                     <p:cond delay="0"/>
                                   </p:stCondLst>
                                   <p:childTnLst>
                                     <p:set>
                                       <p:cBhvr>
-                                        <p:cTn id="77" dur="1" fill="hold">
+                                        <p:cTn id="83" dur="1" fill="hold">
                                           <p:stCondLst>
                                             <p:cond delay="0"/>
                                           </p:stCondLst>
@@ -10732,20 +10966,20 @@
                           </p:cTn>
                         </p:par>
                         <p:par>
-                          <p:cTn id="78" fill="hold">
+                          <p:cTn id="84" fill="hold">
                             <p:stCondLst>
                               <p:cond delay="3000"/>
                             </p:stCondLst>
                             <p:childTnLst>
                               <p:par>
-                                <p:cTn id="79" presetID="42" presetClass="path" presetSubtype="0" accel="50000" decel="50000" fill="hold" grpId="0" nodeType="afterEffect">
+                                <p:cTn id="85" presetID="42" presetClass="path" presetSubtype="0" accel="50000" decel="50000" fill="hold" grpId="0" nodeType="afterEffect">
                                   <p:stCondLst>
                                     <p:cond delay="0"/>
                                   </p:stCondLst>
                                   <p:childTnLst>
                                     <p:animMotion origin="layout" path="M -8.33333E-7 -3.33333E-6 L 0.17891 0.25232 " pathEditMode="relative" rAng="0" ptsTypes="AA">
                                       <p:cBhvr>
-                                        <p:cTn id="80" dur="2000" spd="-100000" fill="hold"/>
+                                        <p:cTn id="86" dur="2000" spd="-100000" fill="hold"/>
                                         <p:tgtEl>
                                           <p:spTgt spid="20"/>
                                         </p:tgtEl>
@@ -10808,6 +11042,8 @@
       <p:bldP spid="19" grpId="0" animBg="1"/>
       <p:bldP spid="20" grpId="0" animBg="1"/>
       <p:bldP spid="20" grpId="1" animBg="1"/>
+      <p:bldP spid="25" grpId="0" animBg="1"/>
+      <p:bldP spid="25" grpId="1" animBg="1"/>
     </p:bldLst>
   </p:timing>
 </p:sld>
@@ -11203,7 +11439,7 @@
             <a:pPr algn="ctr"/>
             <a:r>
               <a:rPr lang="en-US" dirty="0"/>
-              <a:t>RH OS Cluster</a:t>
+              <a:t>OpenShift Cluster</a:t>
             </a:r>
           </a:p>
         </p:txBody>
@@ -13340,7 +13576,7 @@
             <a:pPr algn="ctr"/>
             <a:r>
               <a:rPr lang="en-US" dirty="0"/>
-              <a:t>RH OS Cluster</a:t>
+              <a:t>OpenShift Cluster</a:t>
             </a:r>
           </a:p>
         </p:txBody>
@@ -13695,7 +13931,7 @@
             <a:pPr algn="ctr"/>
             <a:r>
               <a:rPr lang="en-US" sz="800" dirty="0"/>
-              <a:t>Svc A CDT</a:t>
+              <a:t>Svc A</a:t>
             </a:r>
           </a:p>
         </p:txBody>
@@ -14451,7 +14687,7 @@
         </p:nvSpPr>
         <p:spPr>
           <a:xfrm>
-            <a:off x="3599722" y="3525383"/>
+            <a:off x="3589460" y="4213964"/>
             <a:ext cx="491530" cy="336626"/>
           </a:xfrm>
           <a:prstGeom prst="snipRoundRect">
@@ -14815,6 +15051,116 @@
             <a:r>
               <a:rPr lang="en-US" sz="800" dirty="0"/>
               <a:t>Svc A CDT</a:t>
+            </a:r>
+          </a:p>
+        </p:txBody>
+      </p:sp>
+      <p:sp>
+        <p:nvSpPr>
+          <p:cNvPr id="44" name="Oval 43">
+            <a:extLst>
+              <a:ext uri="{FF2B5EF4-FFF2-40B4-BE49-F238E27FC236}">
+                <a16:creationId xmlns:a16="http://schemas.microsoft.com/office/drawing/2014/main" id="{966D5A89-0F25-462A-AB97-208D1C0B25E8}"/>
+              </a:ext>
+            </a:extLst>
+          </p:cNvPr>
+          <p:cNvSpPr/>
+          <p:nvPr/>
+        </p:nvSpPr>
+        <p:spPr>
+          <a:xfrm>
+            <a:off x="8400249" y="5001705"/>
+            <a:ext cx="914400" cy="504939"/>
+          </a:xfrm>
+          <a:prstGeom prst="ellipse">
+            <a:avLst/>
+          </a:prstGeom>
+          <a:solidFill>
+            <a:schemeClr val="accent6">
+              <a:lumMod val="50000"/>
+            </a:schemeClr>
+          </a:solidFill>
+        </p:spPr>
+        <p:style>
+          <a:lnRef idx="2">
+            <a:schemeClr val="accent1">
+              <a:shade val="50000"/>
+            </a:schemeClr>
+          </a:lnRef>
+          <a:fillRef idx="1">
+            <a:schemeClr val="accent1"/>
+          </a:fillRef>
+          <a:effectRef idx="0">
+            <a:schemeClr val="accent1"/>
+          </a:effectRef>
+          <a:fontRef idx="minor">
+            <a:schemeClr val="lt1"/>
+          </a:fontRef>
+        </p:style>
+        <p:txBody>
+          <a:bodyPr rtlCol="0" anchor="ctr"/>
+          <a:lstStyle/>
+          <a:p>
+            <a:pPr algn="ctr"/>
+            <a:r>
+              <a:rPr lang="en-US" sz="800" dirty="0"/>
+              <a:t>Service A + </a:t>
+            </a:r>
+          </a:p>
+          <a:p>
+            <a:pPr algn="ctr"/>
+            <a:r>
+              <a:rPr lang="en-US" sz="800" dirty="0"/>
+              <a:t>A001 Config</a:t>
+            </a:r>
+          </a:p>
+        </p:txBody>
+      </p:sp>
+      <p:sp>
+        <p:nvSpPr>
+          <p:cNvPr id="45" name="Rectangle: Top Corners One Rounded and One Snipped 44">
+            <a:extLst>
+              <a:ext uri="{FF2B5EF4-FFF2-40B4-BE49-F238E27FC236}">
+                <a16:creationId xmlns:a16="http://schemas.microsoft.com/office/drawing/2014/main" id="{179FE0EB-C6C9-43FA-98B1-5D8BBFC4B299}"/>
+              </a:ext>
+            </a:extLst>
+          </p:cNvPr>
+          <p:cNvSpPr/>
+          <p:nvPr/>
+        </p:nvSpPr>
+        <p:spPr>
+          <a:xfrm>
+            <a:off x="3534938" y="4213963"/>
+            <a:ext cx="596347" cy="336627"/>
+          </a:xfrm>
+          <a:prstGeom prst="snipRoundRect">
+            <a:avLst/>
+          </a:prstGeom>
+        </p:spPr>
+        <p:style>
+          <a:lnRef idx="2">
+            <a:schemeClr val="accent1">
+              <a:shade val="50000"/>
+            </a:schemeClr>
+          </a:lnRef>
+          <a:fillRef idx="1">
+            <a:schemeClr val="accent1"/>
+          </a:fillRef>
+          <a:effectRef idx="0">
+            <a:schemeClr val="accent1"/>
+          </a:effectRef>
+          <a:fontRef idx="minor">
+            <a:schemeClr val="lt1"/>
+          </a:fontRef>
+        </p:style>
+        <p:txBody>
+          <a:bodyPr rtlCol="0" anchor="ctr"/>
+          <a:lstStyle/>
+          <a:p>
+            <a:pPr algn="ctr"/>
+            <a:r>
+              <a:rPr lang="en-US" sz="800" dirty="0"/>
+              <a:t>Svc A + A001 CDT</a:t>
             </a:r>
           </a:p>
         </p:txBody>
@@ -15290,7 +15636,7 @@
                             </p:stCondLst>
                             <p:childTnLst>
                               <p:par>
-                                <p:cTn id="46" presetID="1" presetClass="entr" presetSubtype="0" fill="hold" grpId="2" nodeType="clickEffect">
+                                <p:cTn id="46" presetID="10" presetClass="entr" presetSubtype="0" fill="hold" grpId="0" nodeType="clickEffect">
                                   <p:stCondLst>
                                     <p:cond delay="0"/>
                                   </p:stCondLst>
@@ -15298,6 +15644,59 @@
                                     <p:set>
                                       <p:cBhvr>
                                         <p:cTn id="47" dur="1" fill="hold">
+                                          <p:stCondLst>
+                                            <p:cond delay="0"/>
+                                          </p:stCondLst>
+                                        </p:cTn>
+                                        <p:tgtEl>
+                                          <p:spTgt spid="44"/>
+                                        </p:tgtEl>
+                                        <p:attrNameLst>
+                                          <p:attrName>style.visibility</p:attrName>
+                                        </p:attrNameLst>
+                                      </p:cBhvr>
+                                      <p:to>
+                                        <p:strVal val="visible"/>
+                                      </p:to>
+                                    </p:set>
+                                    <p:animEffect transition="in" filter="fade">
+                                      <p:cBhvr>
+                                        <p:cTn id="48" dur="500"/>
+                                        <p:tgtEl>
+                                          <p:spTgt spid="44"/>
+                                        </p:tgtEl>
+                                      </p:cBhvr>
+                                    </p:animEffect>
+                                  </p:childTnLst>
+                                </p:cTn>
+                              </p:par>
+                            </p:childTnLst>
+                          </p:cTn>
+                        </p:par>
+                      </p:childTnLst>
+                    </p:cTn>
+                  </p:par>
+                  <p:par>
+                    <p:cTn id="49" fill="hold">
+                      <p:stCondLst>
+                        <p:cond delay="indefinite"/>
+                      </p:stCondLst>
+                      <p:childTnLst>
+                        <p:par>
+                          <p:cTn id="50" fill="hold">
+                            <p:stCondLst>
+                              <p:cond delay="0"/>
+                            </p:stCondLst>
+                            <p:childTnLst>
+                              <p:par>
+                                <p:cTn id="51" presetID="1" presetClass="entr" presetSubtype="0" fill="hold" grpId="2" nodeType="clickEffect">
+                                  <p:stCondLst>
+                                    <p:cond delay="0"/>
+                                  </p:stCondLst>
+                                  <p:childTnLst>
+                                    <p:set>
+                                      <p:cBhvr>
+                                        <p:cTn id="52" dur="1" fill="hold">
                                           <p:stCondLst>
                                             <p:cond delay="0"/>
                                           </p:stCondLst>
@@ -15320,20 +15719,20 @@
                           </p:cTn>
                         </p:par>
                         <p:par>
-                          <p:cTn id="48" fill="hold">
+                          <p:cTn id="53" fill="hold">
                             <p:stCondLst>
                               <p:cond delay="0"/>
                             </p:stCondLst>
                             <p:childTnLst>
                               <p:par>
-                                <p:cTn id="49" presetID="42" presetClass="path" presetSubtype="0" accel="50000" decel="50000" fill="hold" grpId="1" nodeType="afterEffect">
+                                <p:cTn id="54" presetID="42" presetClass="path" presetSubtype="0" accel="50000" decel="50000" fill="hold" grpId="1" nodeType="afterEffect">
                                   <p:stCondLst>
                                     <p:cond delay="0"/>
                                   </p:stCondLst>
                                   <p:childTnLst>
                                     <p:animMotion origin="layout" path="M 1.875E-6 -2.59259E-6 L 0.3181 0.26667 " pathEditMode="relative" rAng="0" ptsTypes="AA">
                                       <p:cBhvr>
-                                        <p:cTn id="50" dur="2000" spd="-100000" fill="hold"/>
+                                        <p:cTn id="55" dur="2000" spd="-100000" fill="hold"/>
                                         <p:tgtEl>
                                           <p:spTgt spid="39"/>
                                         </p:tgtEl>
@@ -15354,26 +15753,26 @@
                     </p:cTn>
                   </p:par>
                   <p:par>
-                    <p:cTn id="51" fill="hold">
+                    <p:cTn id="56" fill="hold">
                       <p:stCondLst>
                         <p:cond delay="indefinite"/>
                       </p:stCondLst>
                       <p:childTnLst>
                         <p:par>
-                          <p:cTn id="52" fill="hold">
+                          <p:cTn id="57" fill="hold">
                             <p:stCondLst>
                               <p:cond delay="0"/>
                             </p:stCondLst>
                             <p:childTnLst>
                               <p:par>
-                                <p:cTn id="53" presetID="42" presetClass="path" presetSubtype="0" accel="50000" decel="50000" autoRev="1" fill="hold" grpId="3" nodeType="clickEffect">
+                                <p:cTn id="58" presetID="42" presetClass="path" presetSubtype="0" accel="50000" decel="50000" autoRev="1" fill="hold" grpId="3" nodeType="clickEffect">
                                   <p:stCondLst>
                                     <p:cond delay="0"/>
                                   </p:stCondLst>
                                   <p:childTnLst>
                                     <p:animMotion origin="layout" path="M 2.91667E-6 4.07407E-6 L -0.05769 0.03796 " pathEditMode="relative" rAng="0" ptsTypes="AA">
                                       <p:cBhvr>
-                                        <p:cTn id="54" dur="2000" fill="hold"/>
+                                        <p:cTn id="59" dur="2000" fill="hold"/>
                                         <p:tgtEl>
                                           <p:spTgt spid="37"/>
                                         </p:tgtEl>
@@ -15388,14 +15787,14 @@
                                 </p:cTn>
                               </p:par>
                               <p:par>
-                                <p:cTn id="55" presetID="10" presetClass="entr" presetSubtype="0" fill="hold" grpId="0" nodeType="withEffect">
+                                <p:cTn id="60" presetID="10" presetClass="entr" presetSubtype="0" fill="hold" grpId="0" nodeType="withEffect">
                                   <p:stCondLst>
                                     <p:cond delay="1500"/>
                                   </p:stCondLst>
                                   <p:childTnLst>
                                     <p:set>
                                       <p:cBhvr>
-                                        <p:cTn id="56" dur="1" fill="hold">
+                                        <p:cTn id="61" dur="1" fill="hold">
                                           <p:stCondLst>
                                             <p:cond delay="0"/>
                                           </p:stCondLst>
@@ -15413,7 +15812,7 @@
                                     </p:set>
                                     <p:animEffect transition="in" filter="fade">
                                       <p:cBhvr>
-                                        <p:cTn id="57" dur="500"/>
+                                        <p:cTn id="62" dur="500"/>
                                         <p:tgtEl>
                                           <p:spTgt spid="40"/>
                                         </p:tgtEl>
@@ -15429,26 +15828,26 @@
                     </p:cTn>
                   </p:par>
                   <p:par>
-                    <p:cTn id="58" fill="hold">
+                    <p:cTn id="63" fill="hold">
                       <p:stCondLst>
                         <p:cond delay="indefinite"/>
                       </p:stCondLst>
                       <p:childTnLst>
                         <p:par>
-                          <p:cTn id="59" fill="hold">
+                          <p:cTn id="64" fill="hold">
                             <p:stCondLst>
                               <p:cond delay="0"/>
                             </p:stCondLst>
                             <p:childTnLst>
                               <p:par>
-                                <p:cTn id="60" presetID="42" presetClass="path" presetSubtype="0" accel="50000" decel="50000" autoRev="1" fill="hold" grpId="3" nodeType="clickEffect">
+                                <p:cTn id="65" presetID="42" presetClass="path" presetSubtype="0" accel="50000" decel="50000" autoRev="1" fill="hold" grpId="3" nodeType="clickEffect">
                                   <p:stCondLst>
                                     <p:cond delay="0"/>
                                   </p:stCondLst>
                                   <p:childTnLst>
-                                    <p:animMotion origin="layout" path="M 1.875E-6 -2.59259E-6 L -0.05834 0.03426 " pathEditMode="relative" rAng="0" ptsTypes="AA">
+                                    <p:animMotion origin="layout" path="M 1.875E-6 -2.59259E-6 L -0.05925 0.1338 " pathEditMode="relative" rAng="0" ptsTypes="AA">
                                       <p:cBhvr>
-                                        <p:cTn id="61" dur="2000" fill="hold"/>
+                                        <p:cTn id="66" dur="2000" fill="hold"/>
                                         <p:tgtEl>
                                           <p:spTgt spid="39"/>
                                         </p:tgtEl>
@@ -15457,20 +15856,20 @@
                                           <p:attrName>ppt_y</p:attrName>
                                         </p:attrNameLst>
                                       </p:cBhvr>
-                                      <p:rCtr x="-2917" y="1713"/>
+                                      <p:rCtr x="-2917" y="6597"/>
                                     </p:animMotion>
                                   </p:childTnLst>
                                 </p:cTn>
                               </p:par>
                               <p:par>
-                                <p:cTn id="62" presetID="10" presetClass="entr" presetSubtype="0" fill="hold" grpId="0" nodeType="withEffect">
+                                <p:cTn id="67" presetID="10" presetClass="entr" presetSubtype="0" fill="hold" grpId="0" nodeType="withEffect">
                                   <p:stCondLst>
                                     <p:cond delay="1500"/>
                                   </p:stCondLst>
                                   <p:childTnLst>
                                     <p:set>
                                       <p:cBhvr>
-                                        <p:cTn id="63" dur="1" fill="hold">
+                                        <p:cTn id="68" dur="1" fill="hold">
                                           <p:stCondLst>
                                             <p:cond delay="0"/>
                                           </p:stCondLst>
@@ -15488,9 +15887,53 @@
                                     </p:set>
                                     <p:animEffect transition="in" filter="fade">
                                       <p:cBhvr>
-                                        <p:cTn id="64" dur="500"/>
+                                        <p:cTn id="69" dur="500"/>
                                         <p:tgtEl>
                                           <p:spTgt spid="41"/>
+                                        </p:tgtEl>
+                                      </p:cBhvr>
+                                    </p:animEffect>
+                                  </p:childTnLst>
+                                </p:cTn>
+                              </p:par>
+                            </p:childTnLst>
+                          </p:cTn>
+                        </p:par>
+                        <p:par>
+                          <p:cTn id="70" fill="hold">
+                            <p:stCondLst>
+                              <p:cond delay="4000"/>
+                            </p:stCondLst>
+                            <p:childTnLst>
+                              <p:par>
+                                <p:cTn id="71" presetID="10" presetClass="entr" presetSubtype="0" fill="hold" grpId="0" nodeType="afterEffect">
+                                  <p:stCondLst>
+                                    <p:cond delay="0"/>
+                                  </p:stCondLst>
+                                  <p:childTnLst>
+                                    <p:set>
+                                      <p:cBhvr>
+                                        <p:cTn id="72" dur="1" fill="hold">
+                                          <p:stCondLst>
+                                            <p:cond delay="0"/>
+                                          </p:stCondLst>
+                                        </p:cTn>
+                                        <p:tgtEl>
+                                          <p:spTgt spid="45"/>
+                                        </p:tgtEl>
+                                        <p:attrNameLst>
+                                          <p:attrName>style.visibility</p:attrName>
+                                        </p:attrNameLst>
+                                      </p:cBhvr>
+                                      <p:to>
+                                        <p:strVal val="visible"/>
+                                      </p:to>
+                                    </p:set>
+                                    <p:animEffect transition="in" filter="fade">
+                                      <p:cBhvr>
+                                        <p:cTn id="73" dur="500"/>
+                                        <p:tgtEl>
+                                          <p:spTgt spid="45"/>
                                         </p:tgtEl>
                                       </p:cBhvr>
                                     </p:animEffect>
@@ -15504,26 +15947,26 @@
                     </p:cTn>
                   </p:par>
                   <p:par>
-                    <p:cTn id="65" fill="hold">
+                    <p:cTn id="74" fill="hold">
                       <p:stCondLst>
                         <p:cond delay="indefinite"/>
                       </p:stCondLst>
                       <p:childTnLst>
                         <p:par>
-                          <p:cTn id="66" fill="hold">
+                          <p:cTn id="75" fill="hold">
                             <p:stCondLst>
                               <p:cond delay="0"/>
                             </p:stCondLst>
                             <p:childTnLst>
                               <p:par>
-                                <p:cTn id="67" presetID="10" presetClass="exit" presetSubtype="0" fill="hold" grpId="4" nodeType="clickEffect">
+                                <p:cTn id="76" presetID="10" presetClass="exit" presetSubtype="0" fill="hold" grpId="4" nodeType="clickEffect">
                                   <p:stCondLst>
                                     <p:cond delay="0"/>
                                   </p:stCondLst>
                                   <p:childTnLst>
                                     <p:animEffect transition="out" filter="fade">
                                       <p:cBhvr>
-                                        <p:cTn id="68" dur="2000"/>
+                                        <p:cTn id="77" dur="2000"/>
                                         <p:tgtEl>
                                           <p:spTgt spid="37"/>
                                         </p:tgtEl>
@@ -15531,7 +15974,7 @@
                                     </p:animEffect>
                                     <p:set>
                                       <p:cBhvr>
-                                        <p:cTn id="69" dur="1" fill="hold">
+                                        <p:cTn id="78" dur="1" fill="hold">
                                           <p:stCondLst>
                                             <p:cond delay="1999"/>
                                           </p:stCondLst>
@@ -15551,14 +15994,14 @@
                                 </p:cTn>
                               </p:par>
                               <p:par>
-                                <p:cTn id="70" presetID="10" presetClass="exit" presetSubtype="0" fill="hold" grpId="4" nodeType="withEffect">
+                                <p:cTn id="79" presetID="10" presetClass="exit" presetSubtype="0" fill="hold" grpId="4" nodeType="withEffect">
                                   <p:stCondLst>
                                     <p:cond delay="0"/>
                                   </p:stCondLst>
                                   <p:childTnLst>
                                     <p:animEffect transition="out" filter="fade">
                                       <p:cBhvr>
-                                        <p:cTn id="71" dur="2000"/>
+                                        <p:cTn id="80" dur="2000"/>
                                         <p:tgtEl>
                                           <p:spTgt spid="39"/>
                                         </p:tgtEl>
@@ -15566,7 +16009,7 @@
                                     </p:animEffect>
                                     <p:set>
                                       <p:cBhvr>
-                                        <p:cTn id="72" dur="1" fill="hold">
+                                        <p:cTn id="81" dur="1" fill="hold">
                                           <p:stCondLst>
                                             <p:cond delay="1999"/>
                                           </p:stCondLst>
@@ -15586,14 +16029,14 @@
                                 </p:cTn>
                               </p:par>
                               <p:par>
-                                <p:cTn id="73" presetID="10" presetClass="exit" presetSubtype="0" fill="hold" grpId="0" nodeType="withEffect">
+                                <p:cTn id="82" presetID="10" presetClass="exit" presetSubtype="0" fill="hold" grpId="0" nodeType="withEffect">
                                   <p:stCondLst>
                                     <p:cond delay="0"/>
                                   </p:stCondLst>
                                   <p:childTnLst>
                                     <p:animEffect transition="out" filter="fade">
                                       <p:cBhvr>
-                                        <p:cTn id="74" dur="2000"/>
+                                        <p:cTn id="83" dur="2000"/>
                                         <p:tgtEl>
                                           <p:spTgt spid="33"/>
                                         </p:tgtEl>
@@ -15601,7 +16044,7 @@
                                     </p:animEffect>
                                     <p:set>
                                       <p:cBhvr>
-                                        <p:cTn id="75" dur="1" fill="hold">
+                                        <p:cTn id="84" dur="1" fill="hold">
                                           <p:stCondLst>
                                             <p:cond delay="1999"/>
                                           </p:stCondLst>
@@ -15627,26 +16070,26 @@
                     </p:cTn>
                   </p:par>
                   <p:par>
-                    <p:cTn id="76" fill="hold">
+                    <p:cTn id="85" fill="hold">
                       <p:stCondLst>
                         <p:cond delay="indefinite"/>
                       </p:stCondLst>
                       <p:childTnLst>
                         <p:par>
-                          <p:cTn id="77" fill="hold">
+                          <p:cTn id="86" fill="hold">
                             <p:stCondLst>
                               <p:cond delay="0"/>
                             </p:stCondLst>
                             <p:childTnLst>
                               <p:par>
-                                <p:cTn id="78" presetID="42" presetClass="path" presetSubtype="0" accel="50000" decel="50000" autoRev="1" fill="hold" grpId="1" nodeType="clickEffect">
+                                <p:cTn id="87" presetID="42" presetClass="path" presetSubtype="0" accel="50000" decel="50000" autoRev="1" fill="hold" grpId="1" nodeType="clickEffect">
                                   <p:stCondLst>
                                     <p:cond delay="0"/>
                                   </p:stCondLst>
                                   <p:childTnLst>
                                     <p:animMotion origin="layout" path="M -3.54167E-6 -7.40741E-7 L -0.11523 0.15741 " pathEditMode="relative" rAng="0" ptsTypes="AA">
                                       <p:cBhvr>
-                                        <p:cTn id="79" dur="2000" fill="hold"/>
+                                        <p:cTn id="88" dur="2000" fill="hold"/>
                                         <p:tgtEl>
                                           <p:spTgt spid="40"/>
                                         </p:tgtEl>
@@ -15661,14 +16104,14 @@
                                 </p:cTn>
                               </p:par>
                               <p:par>
-                                <p:cTn id="80" presetID="10" presetClass="entr" presetSubtype="0" fill="hold" grpId="0" nodeType="withEffect">
+                                <p:cTn id="89" presetID="10" presetClass="entr" presetSubtype="0" fill="hold" grpId="0" nodeType="withEffect">
                                   <p:stCondLst>
                                     <p:cond delay="1200"/>
                                   </p:stCondLst>
                                   <p:childTnLst>
                                     <p:set>
                                       <p:cBhvr>
-                                        <p:cTn id="81" dur="1" fill="hold">
+                                        <p:cTn id="90" dur="1" fill="hold">
                                           <p:stCondLst>
                                             <p:cond delay="0"/>
                                           </p:stCondLst>
@@ -15686,7 +16129,7 @@
                                     </p:set>
                                     <p:animEffect transition="in" filter="fade">
                                       <p:cBhvr>
-                                        <p:cTn id="82" dur="1000"/>
+                                        <p:cTn id="91" dur="1000"/>
                                         <p:tgtEl>
                                           <p:spTgt spid="43"/>
                                         </p:tgtEl>
@@ -15696,14 +16139,14 @@
                                 </p:cTn>
                               </p:par>
                               <p:par>
-                                <p:cTn id="83" presetID="10" presetClass="entr" presetSubtype="0" fill="hold" grpId="0" nodeType="withEffect">
+                                <p:cTn id="92" presetID="10" presetClass="entr" presetSubtype="0" fill="hold" grpId="0" nodeType="withEffect">
                                   <p:stCondLst>
                                     <p:cond delay="1200"/>
                                   </p:stCondLst>
                                   <p:childTnLst>
                                     <p:set>
                                       <p:cBhvr>
-                                        <p:cTn id="84" dur="1" fill="hold">
+                                        <p:cTn id="93" dur="1" fill="hold">
                                           <p:stCondLst>
                                             <p:cond delay="0"/>
                                           </p:stCondLst>
@@ -15721,7 +16164,7 @@
                                     </p:set>
                                     <p:animEffect transition="in" filter="fade">
                                       <p:cBhvr>
-                                        <p:cTn id="85" dur="1000"/>
+                                        <p:cTn id="94" dur="1000"/>
                                         <p:tgtEl>
                                           <p:spTgt spid="42"/>
                                         </p:tgtEl>
@@ -15782,6 +16225,8 @@
       <p:bldP spid="37" grpId="3" animBg="1"/>
       <p:bldP spid="37" grpId="4" animBg="1"/>
       <p:bldP spid="20" grpId="0" animBg="1"/>
+      <p:bldP spid="44" grpId="0" animBg="1"/>
+      <p:bldP spid="45" grpId="0" animBg="1"/>
     </p:bldLst>
   </p:timing>
 </p:sld>
@@ -15809,7 +16254,7 @@
           <p:cNvPr id="2" name="Title 1">
             <a:extLst>
               <a:ext uri="{FF2B5EF4-FFF2-40B4-BE49-F238E27FC236}">
-                <a16:creationId xmlns:a16="http://schemas.microsoft.com/office/drawing/2014/main" id="{DFB02394-9405-43A4-BB6A-AF72622BBE2E}"/>
+                <a16:creationId xmlns:a16="http://schemas.microsoft.com/office/drawing/2014/main" id="{BDFD3F3F-AF75-4C88-A814-75BF3011B88B}"/>
               </a:ext>
             </a:extLst>
           </p:cNvPr>
@@ -15820,54 +16265,29 @@
             <p:ph type="title"/>
           </p:nvPr>
         </p:nvSpPr>
-        <p:spPr/>
+        <p:spPr>
+          <a:xfrm>
+            <a:off x="587189" y="189941"/>
+            <a:ext cx="10515600" cy="482412"/>
+          </a:xfrm>
+        </p:spPr>
         <p:txBody>
           <a:bodyPr/>
           <a:lstStyle/>
           <a:p>
             <a:r>
               <a:rPr lang="en-US" dirty="0"/>
-              <a:t>End</a:t>
+              <a:t>Validate Service A in Group Environment</a:t>
             </a:r>
           </a:p>
         </p:txBody>
       </p:sp>
-    </p:spTree>
-    <p:extLst>
-      <p:ext uri="{BB962C8B-B14F-4D97-AF65-F5344CB8AC3E}">
-        <p14:creationId xmlns:p14="http://schemas.microsoft.com/office/powerpoint/2010/main" val="413529376"/>
-      </p:ext>
-    </p:extLst>
-  </p:cSld>
-  <p:clrMapOvr>
-    <a:masterClrMapping/>
-  </p:clrMapOvr>
-</p:sld>
-</file>
-
-<file path=ppt/slides/slide7.xml><?xml version="1.0" encoding="utf-8"?>
-<p:sld xmlns:a="http://schemas.openxmlformats.org/drawingml/2006/main" xmlns:r="http://schemas.openxmlformats.org/officeDocument/2006/relationships" xmlns:p="http://schemas.openxmlformats.org/presentationml/2006/main">
-  <p:cSld>
-    <p:spTree>
-      <p:nvGrpSpPr>
-        <p:cNvPr id="1" name=""/>
-        <p:cNvGrpSpPr/>
-        <p:nvPr/>
-      </p:nvGrpSpPr>
-      <p:grpSpPr>
-        <a:xfrm>
-          <a:off x="0" y="0"/>
-          <a:ext cx="0" cy="0"/>
-          <a:chOff x="0" y="0"/>
-          <a:chExt cx="0" cy="0"/>
-        </a:xfrm>
-      </p:grpSpPr>
       <p:sp>
         <p:nvSpPr>
-          <p:cNvPr id="18" name="Rectangle 17">
+          <p:cNvPr id="3" name="Rectangle 2">
             <a:extLst>
               <a:ext uri="{FF2B5EF4-FFF2-40B4-BE49-F238E27FC236}">
-                <a16:creationId xmlns:a16="http://schemas.microsoft.com/office/drawing/2014/main" id="{1ED22CAC-3CD0-4284-8A2A-F99ACFC83C7A}"/>
+                <a16:creationId xmlns:a16="http://schemas.microsoft.com/office/drawing/2014/main" id="{C662BC5F-3B49-4675-8541-ADF98EB865CD}"/>
               </a:ext>
             </a:extLst>
           </p:cNvPr>
@@ -15876,27 +16296,48 @@
         </p:nvSpPr>
         <p:spPr>
           <a:xfrm>
-            <a:off x="4778634" y="786101"/>
+            <a:off x="3469786" y="965395"/>
             <a:ext cx="1428983" cy="4826942"/>
           </a:xfrm>
           <a:prstGeom prst="rect">
             <a:avLst/>
           </a:prstGeom>
-          <a:solidFill>
-            <a:srgbClr val="C00000"/>
-          </a:solidFill>
+          <a:gradFill flip="none" rotWithShape="1">
+            <a:gsLst>
+              <a:gs pos="0">
+                <a:schemeClr val="accent4">
+                  <a:lumMod val="67000"/>
+                </a:schemeClr>
+              </a:gs>
+              <a:gs pos="48000">
+                <a:schemeClr val="accent4">
+                  <a:lumMod val="97000"/>
+                  <a:lumOff val="3000"/>
+                </a:schemeClr>
+              </a:gs>
+              <a:gs pos="100000">
+                <a:schemeClr val="accent4">
+                  <a:lumMod val="60000"/>
+                  <a:lumOff val="40000"/>
+                </a:schemeClr>
+              </a:gs>
+            </a:gsLst>
+            <a:lin ang="16200000" scaled="1"/>
+            <a:tileRect/>
+          </a:gradFill>
+          <a:ln>
+            <a:noFill/>
+          </a:ln>
         </p:spPr>
         <p:style>
-          <a:lnRef idx="2">
-            <a:schemeClr val="accent1">
-              <a:shade val="50000"/>
-            </a:schemeClr>
+          <a:lnRef idx="0">
+            <a:scrgbClr r="0" g="0" b="0"/>
           </a:lnRef>
-          <a:fillRef idx="1">
-            <a:schemeClr val="accent1"/>
+          <a:fillRef idx="0">
+            <a:scrgbClr r="0" g="0" b="0"/>
           </a:fillRef>
           <a:effectRef idx="0">
-            <a:schemeClr val="accent1"/>
+            <a:scrgbClr r="0" g="0" b="0"/>
           </a:effectRef>
           <a:fontRef idx="minor">
             <a:schemeClr val="lt1"/>
@@ -15916,10 +16357,10 @@
       </p:sp>
       <p:sp>
         <p:nvSpPr>
-          <p:cNvPr id="16" name="Rectangle 15">
+          <p:cNvPr id="5" name="Rectangle 4">
             <a:extLst>
               <a:ext uri="{FF2B5EF4-FFF2-40B4-BE49-F238E27FC236}">
-                <a16:creationId xmlns:a16="http://schemas.microsoft.com/office/drawing/2014/main" id="{79AE8597-FECD-4510-910B-97CBE2BD71F8}"/>
+                <a16:creationId xmlns:a16="http://schemas.microsoft.com/office/drawing/2014/main" id="{627E70CB-77C6-4F53-BA98-BBDF3A079C9B}"/>
               </a:ext>
             </a:extLst>
           </p:cNvPr>
@@ -15928,59 +16369,7 @@
         </p:nvSpPr>
         <p:spPr>
           <a:xfrm>
-            <a:off x="6336406" y="2295128"/>
-            <a:ext cx="2781836" cy="3317915"/>
-          </a:xfrm>
-          <a:prstGeom prst="rect">
-            <a:avLst/>
-          </a:prstGeom>
-          <a:solidFill>
-            <a:srgbClr val="C00000"/>
-          </a:solidFill>
-        </p:spPr>
-        <p:style>
-          <a:lnRef idx="2">
-            <a:schemeClr val="accent1">
-              <a:shade val="50000"/>
-            </a:schemeClr>
-          </a:lnRef>
-          <a:fillRef idx="1">
-            <a:schemeClr val="accent1"/>
-          </a:fillRef>
-          <a:effectRef idx="0">
-            <a:schemeClr val="accent1"/>
-          </a:effectRef>
-          <a:fontRef idx="minor">
-            <a:schemeClr val="lt1"/>
-          </a:fontRef>
-        </p:style>
-        <p:txBody>
-          <a:bodyPr rtlCol="0" anchor="t"/>
-          <a:lstStyle/>
-          <a:p>
-            <a:pPr algn="ctr"/>
-            <a:r>
-              <a:rPr lang="en-US" dirty="0"/>
-              <a:t>Group Project</a:t>
-            </a:r>
-          </a:p>
-        </p:txBody>
-      </p:sp>
-      <p:sp>
-        <p:nvSpPr>
-          <p:cNvPr id="8" name="Rectangle 7">
-            <a:extLst>
-              <a:ext uri="{FF2B5EF4-FFF2-40B4-BE49-F238E27FC236}">
-                <a16:creationId xmlns:a16="http://schemas.microsoft.com/office/drawing/2014/main" id="{585EBDBE-CDC2-4E02-B531-14C3EA8988E8}"/>
-              </a:ext>
-            </a:extLst>
-          </p:cNvPr>
-          <p:cNvSpPr/>
-          <p:nvPr/>
-        </p:nvSpPr>
-        <p:spPr>
-          <a:xfrm>
-            <a:off x="2409995" y="779925"/>
+            <a:off x="1101147" y="959219"/>
             <a:ext cx="2274765" cy="4513291"/>
           </a:xfrm>
           <a:prstGeom prst="rect">
@@ -16020,45 +16409,10 @@
       </p:sp>
       <p:sp>
         <p:nvSpPr>
-          <p:cNvPr id="2" name="Title 1">
+          <p:cNvPr id="6" name="Rectangle: Rounded Corners 5">
             <a:extLst>
               <a:ext uri="{FF2B5EF4-FFF2-40B4-BE49-F238E27FC236}">
-                <a16:creationId xmlns:a16="http://schemas.microsoft.com/office/drawing/2014/main" id="{5D5325A2-7E4A-44E2-B174-C5554F6965CC}"/>
-              </a:ext>
-            </a:extLst>
-          </p:cNvPr>
-          <p:cNvSpPr>
-            <a:spLocks noGrp="1"/>
-          </p:cNvSpPr>
-          <p:nvPr>
-            <p:ph type="title"/>
-          </p:nvPr>
-        </p:nvSpPr>
-        <p:spPr>
-          <a:xfrm>
-            <a:off x="838200" y="95568"/>
-            <a:ext cx="10515600" cy="684357"/>
-          </a:xfrm>
-        </p:spPr>
-        <p:txBody>
-          <a:bodyPr>
-            <a:normAutofit/>
-          </a:bodyPr>
-          <a:lstStyle/>
-          <a:p>
-            <a:r>
-              <a:rPr lang="en-US" dirty="0"/>
-              <a:t>Initialize OMS Group Env and Repo</a:t>
-            </a:r>
-          </a:p>
-        </p:txBody>
-      </p:sp>
-      <p:sp>
-        <p:nvSpPr>
-          <p:cNvPr id="3" name="Rectangle: Rounded Corners 2">
-            <a:extLst>
-              <a:ext uri="{FF2B5EF4-FFF2-40B4-BE49-F238E27FC236}">
-                <a16:creationId xmlns:a16="http://schemas.microsoft.com/office/drawing/2014/main" id="{B19A8C37-F761-458F-AAC2-C552EE554621}"/>
+                <a16:creationId xmlns:a16="http://schemas.microsoft.com/office/drawing/2014/main" id="{E7A8A31C-4E1C-4DA7-81CF-9C8F57A31607}"/>
               </a:ext>
             </a:extLst>
           </p:cNvPr>
@@ -16067,7 +16421,7 @@
         </p:nvSpPr>
         <p:spPr>
           <a:xfrm>
-            <a:off x="2689540" y="2371772"/>
+            <a:off x="1380692" y="2551066"/>
             <a:ext cx="1027032" cy="336626"/>
           </a:xfrm>
           <a:prstGeom prst="roundRect">
@@ -16111,10 +16465,10 @@
       </p:sp>
       <p:sp>
         <p:nvSpPr>
-          <p:cNvPr id="4" name="Rectangle: Rounded Corners 3">
+          <p:cNvPr id="7" name="Rectangle: Rounded Corners 6">
             <a:extLst>
               <a:ext uri="{FF2B5EF4-FFF2-40B4-BE49-F238E27FC236}">
-                <a16:creationId xmlns:a16="http://schemas.microsoft.com/office/drawing/2014/main" id="{A55BD43A-59E5-4DA1-AA44-CB2AC257D66C}"/>
+                <a16:creationId xmlns:a16="http://schemas.microsoft.com/office/drawing/2014/main" id="{77DCA46F-ADFC-432B-BA5F-A776601F7021}"/>
               </a:ext>
             </a:extLst>
           </p:cNvPr>
@@ -16123,7 +16477,7 @@
         </p:nvSpPr>
         <p:spPr>
           <a:xfrm>
-            <a:off x="2689540" y="1915625"/>
+            <a:off x="1380692" y="2094919"/>
             <a:ext cx="1027032" cy="336626"/>
           </a:xfrm>
           <a:prstGeom prst="roundRect">
@@ -16167,10 +16521,10 @@
       </p:sp>
       <p:sp>
         <p:nvSpPr>
-          <p:cNvPr id="5" name="Rectangle: Rounded Corners 4">
+          <p:cNvPr id="8" name="Rectangle: Rounded Corners 7">
             <a:extLst>
               <a:ext uri="{FF2B5EF4-FFF2-40B4-BE49-F238E27FC236}">
-                <a16:creationId xmlns:a16="http://schemas.microsoft.com/office/drawing/2014/main" id="{4979BC5C-F561-4D05-9481-FE77C2109B0D}"/>
+                <a16:creationId xmlns:a16="http://schemas.microsoft.com/office/drawing/2014/main" id="{3410811C-7345-4FA0-9C97-C8703953AF99}"/>
               </a:ext>
             </a:extLst>
           </p:cNvPr>
@@ -16179,7 +16533,7 @@
         </p:nvSpPr>
         <p:spPr>
           <a:xfrm>
-            <a:off x="2689540" y="1459478"/>
+            <a:off x="1380692" y="1638772"/>
             <a:ext cx="1027032" cy="336626"/>
           </a:xfrm>
           <a:prstGeom prst="roundRect">
@@ -16223,10 +16577,10 @@
       </p:sp>
       <p:sp>
         <p:nvSpPr>
-          <p:cNvPr id="7" name="Rectangle 6">
+          <p:cNvPr id="9" name="Rectangle 8">
             <a:extLst>
               <a:ext uri="{FF2B5EF4-FFF2-40B4-BE49-F238E27FC236}">
-                <a16:creationId xmlns:a16="http://schemas.microsoft.com/office/drawing/2014/main" id="{148B93D5-18DA-4A27-9982-742D5687EBB2}"/>
+                <a16:creationId xmlns:a16="http://schemas.microsoft.com/office/drawing/2014/main" id="{658D5B1D-6C39-4945-B928-666A7A5708B6}"/>
               </a:ext>
             </a:extLst>
           </p:cNvPr>
@@ -16235,8 +16589,8 @@
         </p:nvSpPr>
         <p:spPr>
           <a:xfrm>
-            <a:off x="6336406" y="779925"/>
-            <a:ext cx="5298342" cy="1086606"/>
+            <a:off x="5027558" y="959219"/>
+            <a:ext cx="5782054" cy="1086606"/>
           </a:xfrm>
           <a:prstGeom prst="rect">
             <a:avLst/>
@@ -16275,10 +16629,10 @@
       </p:sp>
       <p:sp>
         <p:nvSpPr>
-          <p:cNvPr id="9" name="Rectangle: Rounded Corners 8">
+          <p:cNvPr id="10" name="Rectangle: Rounded Corners 9">
             <a:extLst>
               <a:ext uri="{FF2B5EF4-FFF2-40B4-BE49-F238E27FC236}">
-                <a16:creationId xmlns:a16="http://schemas.microsoft.com/office/drawing/2014/main" id="{5F606E3F-7A48-4991-8056-1BBA10C07472}"/>
+                <a16:creationId xmlns:a16="http://schemas.microsoft.com/office/drawing/2014/main" id="{580CA604-6520-41AF-A104-ACDA0D0B5EB9}"/>
               </a:ext>
             </a:extLst>
           </p:cNvPr>
@@ -16287,7 +16641,7 @@
         </p:nvSpPr>
         <p:spPr>
           <a:xfrm>
-            <a:off x="2689540" y="3284066"/>
+            <a:off x="1380692" y="3463360"/>
             <a:ext cx="1027032" cy="336626"/>
           </a:xfrm>
           <a:prstGeom prst="roundRect">
@@ -16336,10 +16690,10 @@
       </p:sp>
       <p:sp>
         <p:nvSpPr>
-          <p:cNvPr id="10" name="Rectangle: Rounded Corners 9">
+          <p:cNvPr id="11" name="Rectangle: Rounded Corners 10">
             <a:extLst>
               <a:ext uri="{FF2B5EF4-FFF2-40B4-BE49-F238E27FC236}">
-                <a16:creationId xmlns:a16="http://schemas.microsoft.com/office/drawing/2014/main" id="{FC47ED6C-994B-45DD-A2FC-66C3A406A16B}"/>
+                <a16:creationId xmlns:a16="http://schemas.microsoft.com/office/drawing/2014/main" id="{56EDDB0E-90C2-4A2C-B53A-1F5952038C40}"/>
               </a:ext>
             </a:extLst>
           </p:cNvPr>
@@ -16348,7 +16702,7 @@
         </p:nvSpPr>
         <p:spPr>
           <a:xfrm>
-            <a:off x="2689540" y="2827919"/>
+            <a:off x="1380692" y="3007213"/>
             <a:ext cx="1027032" cy="336626"/>
           </a:xfrm>
           <a:prstGeom prst="roundRect">
@@ -16397,10 +16751,10 @@
       </p:sp>
       <p:sp>
         <p:nvSpPr>
-          <p:cNvPr id="11" name="Rectangle 10">
+          <p:cNvPr id="15" name="Rectangle 14">
             <a:extLst>
               <a:ext uri="{FF2B5EF4-FFF2-40B4-BE49-F238E27FC236}">
-                <a16:creationId xmlns:a16="http://schemas.microsoft.com/office/drawing/2014/main" id="{9F4864EC-79CE-48DC-A692-B6A9E6910E3D}"/>
+                <a16:creationId xmlns:a16="http://schemas.microsoft.com/office/drawing/2014/main" id="{A8C6E649-69D2-49C5-86B9-AB309C90AD84}"/>
               </a:ext>
             </a:extLst>
           </p:cNvPr>
@@ -16409,167 +16763,8 @@
         </p:nvSpPr>
         <p:spPr>
           <a:xfrm>
-            <a:off x="73539" y="2771731"/>
-            <a:ext cx="2195982" cy="1086606"/>
-          </a:xfrm>
-          <a:prstGeom prst="rect">
-            <a:avLst/>
-          </a:prstGeom>
-          <a:solidFill>
-            <a:schemeClr val="accent6">
-              <a:lumMod val="75000"/>
-            </a:schemeClr>
-          </a:solidFill>
-        </p:spPr>
-        <p:style>
-          <a:lnRef idx="2">
-            <a:schemeClr val="accent1">
-              <a:shade val="50000"/>
-            </a:schemeClr>
-          </a:lnRef>
-          <a:fillRef idx="1">
-            <a:schemeClr val="accent1"/>
-          </a:fillRef>
-          <a:effectRef idx="0">
-            <a:schemeClr val="accent1"/>
-          </a:effectRef>
-          <a:fontRef idx="minor">
-            <a:schemeClr val="lt1"/>
-          </a:fontRef>
-        </p:style>
-        <p:txBody>
-          <a:bodyPr rtlCol="0" anchor="ctr"/>
-          <a:lstStyle/>
-          <a:p>
-            <a:pPr algn="ctr"/>
-            <a:r>
-              <a:rPr lang="en-US" dirty="0"/>
-              <a:t>Docker/OpenShift Images</a:t>
-            </a:r>
-          </a:p>
-        </p:txBody>
-      </p:sp>
-      <p:sp>
-        <p:nvSpPr>
-          <p:cNvPr id="6" name="Rectangle 5">
-            <a:extLst>
-              <a:ext uri="{FF2B5EF4-FFF2-40B4-BE49-F238E27FC236}">
-                <a16:creationId xmlns:a16="http://schemas.microsoft.com/office/drawing/2014/main" id="{18716E61-E976-4DEA-8E32-C91B93D18F89}"/>
-              </a:ext>
-            </a:extLst>
-          </p:cNvPr>
-          <p:cNvSpPr/>
-          <p:nvPr/>
-        </p:nvSpPr>
-        <p:spPr>
-          <a:xfrm>
-            <a:off x="73539" y="1108838"/>
-            <a:ext cx="2195982" cy="1086606"/>
-          </a:xfrm>
-          <a:prstGeom prst="rect">
-            <a:avLst/>
-          </a:prstGeom>
-        </p:spPr>
-        <p:style>
-          <a:lnRef idx="2">
-            <a:schemeClr val="accent1">
-              <a:shade val="50000"/>
-            </a:schemeClr>
-          </a:lnRef>
-          <a:fillRef idx="1">
-            <a:schemeClr val="accent1"/>
-          </a:fillRef>
-          <a:effectRef idx="0">
-            <a:schemeClr val="accent1"/>
-          </a:effectRef>
-          <a:fontRef idx="minor">
-            <a:schemeClr val="lt1"/>
-          </a:fontRef>
-        </p:style>
-        <p:txBody>
-          <a:bodyPr rtlCol="0" anchor="ctr"/>
-          <a:lstStyle/>
-          <a:p>
-            <a:pPr algn="ctr"/>
-            <a:r>
-              <a:rPr lang="en-US" dirty="0"/>
-              <a:t>IBM OMS v10</a:t>
-            </a:r>
-          </a:p>
-        </p:txBody>
-      </p:sp>
-      <p:sp>
-        <p:nvSpPr>
-          <p:cNvPr id="12" name="Oval 11">
-            <a:extLst>
-              <a:ext uri="{FF2B5EF4-FFF2-40B4-BE49-F238E27FC236}">
-                <a16:creationId xmlns:a16="http://schemas.microsoft.com/office/drawing/2014/main" id="{0E82E478-A8DD-435F-8EC5-B24869EE03F3}"/>
-              </a:ext>
-            </a:extLst>
-          </p:cNvPr>
-          <p:cNvSpPr/>
-          <p:nvPr/>
-        </p:nvSpPr>
-        <p:spPr>
-          <a:xfrm>
-            <a:off x="6430117" y="3099844"/>
-            <a:ext cx="1042616" cy="504939"/>
-          </a:xfrm>
-          <a:prstGeom prst="ellipse">
-            <a:avLst/>
-          </a:prstGeom>
-        </p:spPr>
-        <p:style>
-          <a:lnRef idx="2">
-            <a:schemeClr val="accent1">
-              <a:shade val="50000"/>
-            </a:schemeClr>
-          </a:lnRef>
-          <a:fillRef idx="1">
-            <a:schemeClr val="accent1"/>
-          </a:fillRef>
-          <a:effectRef idx="0">
-            <a:schemeClr val="accent1"/>
-          </a:effectRef>
-          <a:fontRef idx="minor">
-            <a:schemeClr val="lt1"/>
-          </a:fontRef>
-        </p:style>
-        <p:txBody>
-          <a:bodyPr rtlCol="0" anchor="ctr"/>
-          <a:lstStyle/>
-          <a:p>
-            <a:pPr algn="ctr"/>
-            <a:r>
-              <a:rPr lang="en-US" sz="900" dirty="0"/>
-              <a:t>Container</a:t>
-            </a:r>
-          </a:p>
-          <a:p>
-            <a:pPr algn="ctr"/>
-            <a:r>
-              <a:rPr lang="en-US" sz="900" dirty="0"/>
-              <a:t>Foundation</a:t>
-            </a:r>
-          </a:p>
-        </p:txBody>
-      </p:sp>
-      <p:sp>
-        <p:nvSpPr>
-          <p:cNvPr id="13" name="Rectangle 12">
-            <a:extLst>
-              <a:ext uri="{FF2B5EF4-FFF2-40B4-BE49-F238E27FC236}">
-                <a16:creationId xmlns:a16="http://schemas.microsoft.com/office/drawing/2014/main" id="{A3E05643-DEA5-4708-A928-A1F23D9DD897}"/>
-              </a:ext>
-            </a:extLst>
-          </p:cNvPr>
-          <p:cNvSpPr/>
-          <p:nvPr/>
-        </p:nvSpPr>
-        <p:spPr>
-          <a:xfrm>
-            <a:off x="6336406" y="1899202"/>
-            <a:ext cx="5298342" cy="336626"/>
+            <a:off x="5027557" y="2078496"/>
+            <a:ext cx="5782053" cy="336626"/>
           </a:xfrm>
           <a:prstGeom prst="rect">
             <a:avLst/>
@@ -16608,10 +16803,10 @@
       </p:sp>
       <p:sp>
         <p:nvSpPr>
-          <p:cNvPr id="14" name="Oval 13">
+          <p:cNvPr id="18" name="Rectangle 17">
             <a:extLst>
               <a:ext uri="{FF2B5EF4-FFF2-40B4-BE49-F238E27FC236}">
-                <a16:creationId xmlns:a16="http://schemas.microsoft.com/office/drawing/2014/main" id="{201DE809-64A4-4908-B69B-FE58853F0F0C}"/>
+                <a16:creationId xmlns:a16="http://schemas.microsoft.com/office/drawing/2014/main" id="{0EB48C62-2372-49A1-A36F-FD92B7DFE2FF}"/>
               </a:ext>
             </a:extLst>
           </p:cNvPr>
@@ -16620,8 +16815,60 @@
         </p:nvSpPr>
         <p:spPr>
           <a:xfrm>
-            <a:off x="7942961" y="3020548"/>
-            <a:ext cx="1042616" cy="504939"/>
+            <a:off x="5253316" y="2478941"/>
+            <a:ext cx="5440681" cy="3317915"/>
+          </a:xfrm>
+          <a:prstGeom prst="rect">
+            <a:avLst/>
+          </a:prstGeom>
+          <a:solidFill>
+            <a:srgbClr val="C00000"/>
+          </a:solidFill>
+        </p:spPr>
+        <p:style>
+          <a:lnRef idx="2">
+            <a:schemeClr val="accent1">
+              <a:shade val="50000"/>
+            </a:schemeClr>
+          </a:lnRef>
+          <a:fillRef idx="1">
+            <a:schemeClr val="accent1"/>
+          </a:fillRef>
+          <a:effectRef idx="0">
+            <a:schemeClr val="accent1"/>
+          </a:effectRef>
+          <a:fontRef idx="minor">
+            <a:schemeClr val="lt1"/>
+          </a:fontRef>
+        </p:style>
+        <p:txBody>
+          <a:bodyPr rtlCol="0" anchor="t"/>
+          <a:lstStyle/>
+          <a:p>
+            <a:pPr algn="ctr"/>
+            <a:r>
+              <a:rPr lang="en-US" dirty="0"/>
+              <a:t>Group Environment</a:t>
+            </a:r>
+          </a:p>
+        </p:txBody>
+      </p:sp>
+      <p:sp>
+        <p:nvSpPr>
+          <p:cNvPr id="22" name="Oval 21">
+            <a:extLst>
+              <a:ext uri="{FF2B5EF4-FFF2-40B4-BE49-F238E27FC236}">
+                <a16:creationId xmlns:a16="http://schemas.microsoft.com/office/drawing/2014/main" id="{C52CC768-E412-4890-A899-785F066881E1}"/>
+              </a:ext>
+            </a:extLst>
+          </p:cNvPr>
+          <p:cNvSpPr/>
+          <p:nvPr/>
+        </p:nvSpPr>
+        <p:spPr>
+          <a:xfrm>
+            <a:off x="7455393" y="3253244"/>
+            <a:ext cx="914400" cy="504939"/>
           </a:xfrm>
           <a:prstGeom prst="ellipse">
             <a:avLst/>
@@ -16654,25 +16901,30 @@
           <a:p>
             <a:pPr algn="ctr"/>
             <a:r>
-              <a:rPr lang="en-US" sz="900" dirty="0"/>
+              <a:rPr lang="en-US" sz="800" dirty="0"/>
               <a:t>Container</a:t>
             </a:r>
           </a:p>
           <a:p>
             <a:pPr algn="ctr"/>
             <a:r>
-              <a:rPr lang="en-US" sz="900" dirty="0"/>
-              <a:t>DB2 Config</a:t>
-            </a:r>
+              <a:rPr lang="en-US" sz="800" dirty="0"/>
+              <a:t>DB2 </a:t>
+            </a:r>
+            <a:r>
+              <a:rPr lang="en-US" sz="800" dirty="0" err="1"/>
+              <a:t>NonConfig</a:t>
+            </a:r>
+            <a:endParaRPr lang="en-US" sz="800" dirty="0"/>
           </a:p>
         </p:txBody>
       </p:sp>
       <p:sp>
         <p:nvSpPr>
-          <p:cNvPr id="15" name="Oval 14">
+          <p:cNvPr id="23" name="Rectangle 22">
             <a:extLst>
               <a:ext uri="{FF2B5EF4-FFF2-40B4-BE49-F238E27FC236}">
-                <a16:creationId xmlns:a16="http://schemas.microsoft.com/office/drawing/2014/main" id="{9BF71D0E-DB42-4DCC-A694-134C13E51690}"/>
+                <a16:creationId xmlns:a16="http://schemas.microsoft.com/office/drawing/2014/main" id="{8448B24D-02A4-4D8D-9218-59633BFAF6AB}"/>
               </a:ext>
             </a:extLst>
           </p:cNvPr>
@@ -16681,8 +16933,116 @@
         </p:nvSpPr>
         <p:spPr>
           <a:xfrm>
-            <a:off x="7942961" y="3550252"/>
-            <a:ext cx="1042616" cy="504939"/>
+            <a:off x="5576436" y="2838900"/>
+            <a:ext cx="4831587" cy="336626"/>
+          </a:xfrm>
+          <a:prstGeom prst="rect">
+            <a:avLst/>
+          </a:prstGeom>
+          <a:solidFill>
+            <a:srgbClr val="002060"/>
+          </a:solidFill>
+        </p:spPr>
+        <p:style>
+          <a:lnRef idx="2">
+            <a:schemeClr val="accent1">
+              <a:shade val="50000"/>
+            </a:schemeClr>
+          </a:lnRef>
+          <a:fillRef idx="1">
+            <a:schemeClr val="accent1"/>
+          </a:fillRef>
+          <a:effectRef idx="0">
+            <a:schemeClr val="accent1"/>
+          </a:effectRef>
+          <a:fontRef idx="minor">
+            <a:schemeClr val="lt1"/>
+          </a:fontRef>
+        </p:style>
+        <p:txBody>
+          <a:bodyPr rtlCol="0" anchor="ctr"/>
+          <a:lstStyle/>
+          <a:p>
+            <a:pPr algn="ctr"/>
+            <a:r>
+              <a:rPr lang="en-US" dirty="0"/>
+              <a:t>Project Setup for OMS</a:t>
+            </a:r>
+          </a:p>
+        </p:txBody>
+      </p:sp>
+      <p:sp>
+        <p:nvSpPr>
+          <p:cNvPr id="24" name="Oval 23">
+            <a:extLst>
+              <a:ext uri="{FF2B5EF4-FFF2-40B4-BE49-F238E27FC236}">
+                <a16:creationId xmlns:a16="http://schemas.microsoft.com/office/drawing/2014/main" id="{20CCDCA1-5DFB-4EC4-96B9-1369FABAE4A6}"/>
+              </a:ext>
+            </a:extLst>
+          </p:cNvPr>
+          <p:cNvSpPr/>
+          <p:nvPr/>
+        </p:nvSpPr>
+        <p:spPr>
+          <a:xfrm>
+            <a:off x="6451616" y="3264891"/>
+            <a:ext cx="914400" cy="504939"/>
+          </a:xfrm>
+          <a:prstGeom prst="ellipse">
+            <a:avLst/>
+          </a:prstGeom>
+        </p:spPr>
+        <p:style>
+          <a:lnRef idx="2">
+            <a:schemeClr val="accent1">
+              <a:shade val="50000"/>
+            </a:schemeClr>
+          </a:lnRef>
+          <a:fillRef idx="1">
+            <a:schemeClr val="accent1"/>
+          </a:fillRef>
+          <a:effectRef idx="0">
+            <a:schemeClr val="accent1"/>
+          </a:effectRef>
+          <a:fontRef idx="minor">
+            <a:schemeClr val="lt1"/>
+          </a:fontRef>
+        </p:style>
+        <p:txBody>
+          <a:bodyPr rtlCol="0" anchor="ctr"/>
+          <a:lstStyle/>
+          <a:p>
+            <a:pPr algn="ctr"/>
+            <a:r>
+              <a:rPr lang="en-US" sz="800" dirty="0"/>
+              <a:t>Container</a:t>
+            </a:r>
+          </a:p>
+          <a:p>
+            <a:pPr algn="ctr"/>
+            <a:r>
+              <a:rPr lang="en-US" sz="800" dirty="0"/>
+              <a:t>Foundation</a:t>
+            </a:r>
+          </a:p>
+        </p:txBody>
+      </p:sp>
+      <p:sp>
+        <p:nvSpPr>
+          <p:cNvPr id="27" name="Oval 26">
+            <a:extLst>
+              <a:ext uri="{FF2B5EF4-FFF2-40B4-BE49-F238E27FC236}">
+                <a16:creationId xmlns:a16="http://schemas.microsoft.com/office/drawing/2014/main" id="{00BEB5C7-3E82-496E-A9E5-42E04C2CC432}"/>
+              </a:ext>
+            </a:extLst>
+          </p:cNvPr>
+          <p:cNvSpPr/>
+          <p:nvPr/>
+        </p:nvSpPr>
+        <p:spPr>
+          <a:xfrm>
+            <a:off x="8459170" y="3239345"/>
+            <a:ext cx="914400" cy="504939"/>
           </a:xfrm>
           <a:prstGeom prst="ellipse">
             <a:avLst/>
@@ -16715,30 +17075,25 @@
           <a:p>
             <a:pPr algn="ctr"/>
             <a:r>
-              <a:rPr lang="en-US" sz="900" dirty="0"/>
+              <a:rPr lang="en-US" sz="800" dirty="0"/>
               <a:t>Container</a:t>
             </a:r>
           </a:p>
           <a:p>
             <a:pPr algn="ctr"/>
             <a:r>
-              <a:rPr lang="en-US" sz="900" dirty="0"/>
-              <a:t>DB2 </a:t>
-            </a:r>
-            <a:r>
-              <a:rPr lang="en-US" sz="900" dirty="0" err="1"/>
-              <a:t>NonConfig</a:t>
-            </a:r>
-            <a:endParaRPr lang="en-US" sz="900" dirty="0"/>
+              <a:rPr lang="en-US" sz="800" dirty="0"/>
+              <a:t>ActiveMQ</a:t>
+            </a:r>
           </a:p>
         </p:txBody>
       </p:sp>
       <p:sp>
         <p:nvSpPr>
-          <p:cNvPr id="17" name="Rectangle 16">
+          <p:cNvPr id="38" name="Rectangle 37">
             <a:extLst>
               <a:ext uri="{FF2B5EF4-FFF2-40B4-BE49-F238E27FC236}">
-                <a16:creationId xmlns:a16="http://schemas.microsoft.com/office/drawing/2014/main" id="{B3FFDDF2-0D19-401A-974A-7D822E6B95E5}"/>
+                <a16:creationId xmlns:a16="http://schemas.microsoft.com/office/drawing/2014/main" id="{141A9696-2499-43F5-BBC6-533E1CF139E4}"/>
               </a:ext>
             </a:extLst>
           </p:cNvPr>
@@ -16747,27 +17102,48 @@
         </p:nvSpPr>
         <p:spPr>
           <a:xfrm>
-            <a:off x="9212116" y="2299647"/>
-            <a:ext cx="2422632" cy="3317915"/>
+            <a:off x="3493626" y="3007213"/>
+            <a:ext cx="1364619" cy="2528418"/>
           </a:xfrm>
           <a:prstGeom prst="rect">
             <a:avLst/>
           </a:prstGeom>
-          <a:solidFill>
-            <a:srgbClr val="C00000"/>
-          </a:solidFill>
+          <a:gradFill flip="none" rotWithShape="1">
+            <a:gsLst>
+              <a:gs pos="0">
+                <a:schemeClr val="dk1">
+                  <a:lumMod val="67000"/>
+                </a:schemeClr>
+              </a:gs>
+              <a:gs pos="48000">
+                <a:schemeClr val="dk1">
+                  <a:lumMod val="97000"/>
+                  <a:lumOff val="3000"/>
+                </a:schemeClr>
+              </a:gs>
+              <a:gs pos="100000">
+                <a:schemeClr val="dk1">
+                  <a:lumMod val="60000"/>
+                  <a:lumOff val="40000"/>
+                </a:schemeClr>
+              </a:gs>
+            </a:gsLst>
+            <a:lin ang="16200000" scaled="1"/>
+            <a:tileRect/>
+          </a:gradFill>
+          <a:ln>
+            <a:noFill/>
+          </a:ln>
         </p:spPr>
         <p:style>
-          <a:lnRef idx="2">
-            <a:schemeClr val="accent1">
-              <a:shade val="50000"/>
-            </a:schemeClr>
+          <a:lnRef idx="0">
+            <a:scrgbClr r="0" g="0" b="0"/>
           </a:lnRef>
-          <a:fillRef idx="1">
-            <a:schemeClr val="accent1"/>
+          <a:fillRef idx="0">
+            <a:scrgbClr r="0" g="0" b="0"/>
           </a:fillRef>
           <a:effectRef idx="0">
-            <a:schemeClr val="accent1"/>
+            <a:scrgbClr r="0" g="0" b="0"/>
           </a:effectRef>
           <a:fontRef idx="minor">
             <a:schemeClr val="lt1"/>
@@ -16779,18 +17155,22 @@
           <a:p>
             <a:pPr algn="ctr"/>
             <a:r>
+              <a:rPr lang="en-US" dirty="0" err="1"/>
+              <a:t>Srvc</a:t>
+            </a:r>
+            <a:r>
               <a:rPr lang="en-US" dirty="0"/>
-              <a:t>Team Project</a:t>
+              <a:t> A</a:t>
             </a:r>
           </a:p>
         </p:txBody>
       </p:sp>
       <p:sp>
         <p:nvSpPr>
-          <p:cNvPr id="19" name="Rectangle 18">
+          <p:cNvPr id="34" name="Oval 33">
             <a:extLst>
               <a:ext uri="{FF2B5EF4-FFF2-40B4-BE49-F238E27FC236}">
-                <a16:creationId xmlns:a16="http://schemas.microsoft.com/office/drawing/2014/main" id="{1F026ED2-530C-443A-8E20-AAADA05E7744}"/>
+                <a16:creationId xmlns:a16="http://schemas.microsoft.com/office/drawing/2014/main" id="{E9EA4076-5BC6-455E-B940-C70DACE8AFFD}"/>
               </a:ext>
             </a:extLst>
           </p:cNvPr>
@@ -16799,15 +17179,325 @@
         </p:nvSpPr>
         <p:spPr>
           <a:xfrm>
-            <a:off x="6383261" y="2659157"/>
-            <a:ext cx="2688125" cy="336626"/>
+            <a:off x="6806163" y="4384258"/>
+            <a:ext cx="914400" cy="504939"/>
+          </a:xfrm>
+          <a:prstGeom prst="ellipse">
+            <a:avLst/>
+          </a:prstGeom>
+          <a:gradFill flip="none" rotWithShape="1">
+            <a:gsLst>
+              <a:gs pos="0">
+                <a:schemeClr val="dk1">
+                  <a:lumMod val="67000"/>
+                </a:schemeClr>
+              </a:gs>
+              <a:gs pos="48000">
+                <a:schemeClr val="dk1">
+                  <a:lumMod val="97000"/>
+                  <a:lumOff val="3000"/>
+                </a:schemeClr>
+              </a:gs>
+              <a:gs pos="100000">
+                <a:schemeClr val="dk1">
+                  <a:lumMod val="60000"/>
+                  <a:lumOff val="40000"/>
+                </a:schemeClr>
+              </a:gs>
+            </a:gsLst>
+            <a:lin ang="16200000" scaled="1"/>
+            <a:tileRect/>
+          </a:gradFill>
+          <a:ln>
+            <a:noFill/>
+          </a:ln>
+        </p:spPr>
+        <p:style>
+          <a:lnRef idx="0">
+            <a:scrgbClr r="0" g="0" b="0"/>
+          </a:lnRef>
+          <a:fillRef idx="0">
+            <a:scrgbClr r="0" g="0" b="0"/>
+          </a:fillRef>
+          <a:effectRef idx="0">
+            <a:scrgbClr r="0" g="0" b="0"/>
+          </a:effectRef>
+          <a:fontRef idx="minor">
+            <a:schemeClr val="lt1"/>
+          </a:fontRef>
+        </p:style>
+        <p:txBody>
+          <a:bodyPr rtlCol="0" anchor="ctr"/>
+          <a:lstStyle/>
+          <a:p>
+            <a:pPr algn="ctr"/>
+            <a:r>
+              <a:rPr lang="en-US" sz="900" dirty="0"/>
+              <a:t>Container</a:t>
+            </a:r>
+          </a:p>
+          <a:p>
+            <a:pPr algn="ctr"/>
+            <a:r>
+              <a:rPr lang="en-US" sz="900" dirty="0"/>
+              <a:t>Service A Config</a:t>
+            </a:r>
+          </a:p>
+        </p:txBody>
+      </p:sp>
+      <p:sp>
+        <p:nvSpPr>
+          <p:cNvPr id="42" name="Rectangle: Rounded Corners 41">
+            <a:extLst>
+              <a:ext uri="{FF2B5EF4-FFF2-40B4-BE49-F238E27FC236}">
+                <a16:creationId xmlns:a16="http://schemas.microsoft.com/office/drawing/2014/main" id="{90C36B77-720A-4533-8586-534B42688379}"/>
+              </a:ext>
+            </a:extLst>
+          </p:cNvPr>
+          <p:cNvSpPr/>
+          <p:nvPr/>
+        </p:nvSpPr>
+        <p:spPr>
+          <a:xfrm>
+            <a:off x="1372475" y="4426456"/>
+            <a:ext cx="1027032" cy="336626"/>
+          </a:xfrm>
+          <a:prstGeom prst="roundRect">
+            <a:avLst/>
+          </a:prstGeom>
+          <a:gradFill flip="none" rotWithShape="1">
+            <a:gsLst>
+              <a:gs pos="0">
+                <a:schemeClr val="dk1">
+                  <a:lumMod val="67000"/>
+                </a:schemeClr>
+              </a:gs>
+              <a:gs pos="48000">
+                <a:schemeClr val="dk1">
+                  <a:lumMod val="97000"/>
+                  <a:lumOff val="3000"/>
+                </a:schemeClr>
+              </a:gs>
+              <a:gs pos="100000">
+                <a:schemeClr val="dk1">
+                  <a:lumMod val="60000"/>
+                  <a:lumOff val="40000"/>
+                </a:schemeClr>
+              </a:gs>
+            </a:gsLst>
+            <a:lin ang="16200000" scaled="1"/>
+            <a:tileRect/>
+          </a:gradFill>
+          <a:ln>
+            <a:noFill/>
+          </a:ln>
+        </p:spPr>
+        <p:style>
+          <a:lnRef idx="0">
+            <a:scrgbClr r="0" g="0" b="0"/>
+          </a:lnRef>
+          <a:fillRef idx="0">
+            <a:scrgbClr r="0" g="0" b="0"/>
+          </a:fillRef>
+          <a:effectRef idx="0">
+            <a:scrgbClr r="0" g="0" b="0"/>
+          </a:effectRef>
+          <a:fontRef idx="minor">
+            <a:schemeClr val="lt1"/>
+          </a:fontRef>
+        </p:style>
+        <p:txBody>
+          <a:bodyPr rtlCol="0" anchor="ctr"/>
+          <a:lstStyle/>
+          <a:p>
+            <a:pPr algn="ctr"/>
+            <a:r>
+              <a:rPr lang="en-US" sz="900" dirty="0"/>
+              <a:t>Image</a:t>
+            </a:r>
+          </a:p>
+          <a:p>
+            <a:pPr algn="ctr"/>
+            <a:r>
+              <a:rPr lang="en-US" sz="900" dirty="0"/>
+              <a:t>Service A Agent</a:t>
+            </a:r>
+          </a:p>
+        </p:txBody>
+      </p:sp>
+      <p:sp>
+        <p:nvSpPr>
+          <p:cNvPr id="43" name="Rectangle: Rounded Corners 42">
+            <a:extLst>
+              <a:ext uri="{FF2B5EF4-FFF2-40B4-BE49-F238E27FC236}">
+                <a16:creationId xmlns:a16="http://schemas.microsoft.com/office/drawing/2014/main" id="{D908A264-91E7-4657-9E53-ABAD9AF343A2}"/>
+              </a:ext>
+            </a:extLst>
+          </p:cNvPr>
+          <p:cNvSpPr/>
+          <p:nvPr/>
+        </p:nvSpPr>
+        <p:spPr>
+          <a:xfrm>
+            <a:off x="1372475" y="3970309"/>
+            <a:ext cx="1027032" cy="336626"/>
+          </a:xfrm>
+          <a:prstGeom prst="roundRect">
+            <a:avLst/>
+          </a:prstGeom>
+          <a:gradFill flip="none" rotWithShape="1">
+            <a:gsLst>
+              <a:gs pos="0">
+                <a:schemeClr val="dk1">
+                  <a:lumMod val="67000"/>
+                </a:schemeClr>
+              </a:gs>
+              <a:gs pos="48000">
+                <a:schemeClr val="dk1">
+                  <a:lumMod val="97000"/>
+                  <a:lumOff val="3000"/>
+                </a:schemeClr>
+              </a:gs>
+              <a:gs pos="100000">
+                <a:schemeClr val="dk1">
+                  <a:lumMod val="60000"/>
+                  <a:lumOff val="40000"/>
+                </a:schemeClr>
+              </a:gs>
+            </a:gsLst>
+            <a:lin ang="16200000" scaled="1"/>
+            <a:tileRect/>
+          </a:gradFill>
+          <a:ln>
+            <a:noFill/>
+          </a:ln>
+        </p:spPr>
+        <p:style>
+          <a:lnRef idx="0">
+            <a:scrgbClr r="0" g="0" b="0"/>
+          </a:lnRef>
+          <a:fillRef idx="0">
+            <a:scrgbClr r="0" g="0" b="0"/>
+          </a:fillRef>
+          <a:effectRef idx="0">
+            <a:scrgbClr r="0" g="0" b="0"/>
+          </a:effectRef>
+          <a:fontRef idx="minor">
+            <a:schemeClr val="lt1"/>
+          </a:fontRef>
+        </p:style>
+        <p:txBody>
+          <a:bodyPr rtlCol="0" anchor="ctr"/>
+          <a:lstStyle/>
+          <a:p>
+            <a:pPr algn="ctr"/>
+            <a:r>
+              <a:rPr lang="en-US" sz="900" dirty="0"/>
+              <a:t>Image</a:t>
+            </a:r>
+          </a:p>
+          <a:p>
+            <a:pPr algn="ctr"/>
+            <a:r>
+              <a:rPr lang="en-US" sz="900" dirty="0"/>
+              <a:t>Service A App</a:t>
+            </a:r>
+          </a:p>
+        </p:txBody>
+      </p:sp>
+      <p:sp>
+        <p:nvSpPr>
+          <p:cNvPr id="44" name="Rectangle 43">
+            <a:extLst>
+              <a:ext uri="{FF2B5EF4-FFF2-40B4-BE49-F238E27FC236}">
+                <a16:creationId xmlns:a16="http://schemas.microsoft.com/office/drawing/2014/main" id="{E854220E-7334-4E87-ADF8-20447D8793FD}"/>
+              </a:ext>
+            </a:extLst>
+          </p:cNvPr>
+          <p:cNvSpPr/>
+          <p:nvPr/>
+        </p:nvSpPr>
+        <p:spPr>
+          <a:xfrm>
+            <a:off x="3498924" y="1440336"/>
+            <a:ext cx="1364619" cy="1398564"/>
           </a:xfrm>
           <a:prstGeom prst="rect">
             <a:avLst/>
           </a:prstGeom>
-          <a:solidFill>
-            <a:srgbClr val="002060"/>
-          </a:solidFill>
+          <a:gradFill flip="none" rotWithShape="1">
+            <a:gsLst>
+              <a:gs pos="0">
+                <a:schemeClr val="accent2">
+                  <a:lumMod val="67000"/>
+                </a:schemeClr>
+              </a:gs>
+              <a:gs pos="48000">
+                <a:schemeClr val="accent2">
+                  <a:lumMod val="97000"/>
+                  <a:lumOff val="3000"/>
+                </a:schemeClr>
+              </a:gs>
+              <a:gs pos="100000">
+                <a:schemeClr val="accent2">
+                  <a:lumMod val="60000"/>
+                  <a:lumOff val="40000"/>
+                </a:schemeClr>
+              </a:gs>
+            </a:gsLst>
+            <a:lin ang="16200000" scaled="1"/>
+            <a:tileRect/>
+          </a:gradFill>
+          <a:ln>
+            <a:noFill/>
+          </a:ln>
+        </p:spPr>
+        <p:style>
+          <a:lnRef idx="0">
+            <a:scrgbClr r="0" g="0" b="0"/>
+          </a:lnRef>
+          <a:fillRef idx="0">
+            <a:scrgbClr r="0" g="0" b="0"/>
+          </a:fillRef>
+          <a:effectRef idx="0">
+            <a:scrgbClr r="0" g="0" b="0"/>
+          </a:effectRef>
+          <a:fontRef idx="minor">
+            <a:schemeClr val="lt1"/>
+          </a:fontRef>
+        </p:style>
+        <p:txBody>
+          <a:bodyPr rtlCol="0" anchor="t"/>
+          <a:lstStyle/>
+          <a:p>
+            <a:pPr algn="ctr"/>
+            <a:r>
+              <a:rPr lang="en-US" dirty="0"/>
+              <a:t>Group</a:t>
+            </a:r>
+          </a:p>
+        </p:txBody>
+      </p:sp>
+      <p:sp>
+        <p:nvSpPr>
+          <p:cNvPr id="45" name="Rectangle: Top Corners One Rounded and One Snipped 44">
+            <a:extLst>
+              <a:ext uri="{FF2B5EF4-FFF2-40B4-BE49-F238E27FC236}">
+                <a16:creationId xmlns:a16="http://schemas.microsoft.com/office/drawing/2014/main" id="{1FA02430-74C9-42CD-979B-269B46A12438}"/>
+              </a:ext>
+            </a:extLst>
+          </p:cNvPr>
+          <p:cNvSpPr/>
+          <p:nvPr/>
+        </p:nvSpPr>
+        <p:spPr>
+          <a:xfrm>
+            <a:off x="3867985" y="2045825"/>
+            <a:ext cx="596347" cy="336627"/>
+          </a:xfrm>
+          <a:prstGeom prst="snipRoundRect">
+            <a:avLst/>
+          </a:prstGeom>
         </p:spPr>
         <p:style>
           <a:lnRef idx="2">
@@ -16831,16 +17521,992 @@
           <a:p>
             <a:pPr algn="ctr"/>
             <a:r>
-              <a:rPr lang="en-US" dirty="0"/>
-              <a:t>OMS Project Setup</a:t>
+              <a:rPr lang="en-US" sz="800" dirty="0"/>
+              <a:t>Group Entities</a:t>
             </a:r>
           </a:p>
         </p:txBody>
       </p:sp>
+      <p:sp>
+        <p:nvSpPr>
+          <p:cNvPr id="25" name="Oval 24">
+            <a:extLst>
+              <a:ext uri="{FF2B5EF4-FFF2-40B4-BE49-F238E27FC236}">
+                <a16:creationId xmlns:a16="http://schemas.microsoft.com/office/drawing/2014/main" id="{11600F30-8475-4B7E-BAAF-8E0714DDCECD}"/>
+              </a:ext>
+            </a:extLst>
+          </p:cNvPr>
+          <p:cNvSpPr/>
+          <p:nvPr/>
+        </p:nvSpPr>
+        <p:spPr>
+          <a:xfrm>
+            <a:off x="5994416" y="4067970"/>
+            <a:ext cx="914400" cy="504939"/>
+          </a:xfrm>
+          <a:prstGeom prst="ellipse">
+            <a:avLst/>
+          </a:prstGeom>
+          <a:gradFill flip="none" rotWithShape="1">
+            <a:gsLst>
+              <a:gs pos="0">
+                <a:schemeClr val="dk1">
+                  <a:lumMod val="67000"/>
+                </a:schemeClr>
+              </a:gs>
+              <a:gs pos="48000">
+                <a:schemeClr val="dk1">
+                  <a:lumMod val="97000"/>
+                  <a:lumOff val="3000"/>
+                </a:schemeClr>
+              </a:gs>
+              <a:gs pos="100000">
+                <a:schemeClr val="dk1">
+                  <a:lumMod val="60000"/>
+                  <a:lumOff val="40000"/>
+                </a:schemeClr>
+              </a:gs>
+            </a:gsLst>
+            <a:lin ang="16200000" scaled="1"/>
+            <a:tileRect/>
+          </a:gradFill>
+          <a:ln>
+            <a:noFill/>
+          </a:ln>
+        </p:spPr>
+        <p:style>
+          <a:lnRef idx="0">
+            <a:scrgbClr r="0" g="0" b="0"/>
+          </a:lnRef>
+          <a:fillRef idx="0">
+            <a:scrgbClr r="0" g="0" b="0"/>
+          </a:fillRef>
+          <a:effectRef idx="0">
+            <a:scrgbClr r="0" g="0" b="0"/>
+          </a:effectRef>
+          <a:fontRef idx="minor">
+            <a:schemeClr val="lt1"/>
+          </a:fontRef>
+        </p:style>
+        <p:txBody>
+          <a:bodyPr rtlCol="0" anchor="ctr"/>
+          <a:lstStyle/>
+          <a:p>
+            <a:pPr algn="ctr"/>
+            <a:r>
+              <a:rPr lang="en-US" sz="900" dirty="0"/>
+              <a:t>Container</a:t>
+            </a:r>
+          </a:p>
+          <a:p>
+            <a:pPr algn="ctr"/>
+            <a:r>
+              <a:rPr lang="en-US" sz="900" dirty="0"/>
+              <a:t>Service A App</a:t>
+            </a:r>
+          </a:p>
+        </p:txBody>
+      </p:sp>
+      <p:sp>
+        <p:nvSpPr>
+          <p:cNvPr id="26" name="Oval 25">
+            <a:extLst>
+              <a:ext uri="{FF2B5EF4-FFF2-40B4-BE49-F238E27FC236}">
+                <a16:creationId xmlns:a16="http://schemas.microsoft.com/office/drawing/2014/main" id="{11D941F9-5E80-45C3-A062-FC0F5D88C65E}"/>
+              </a:ext>
+            </a:extLst>
+          </p:cNvPr>
+          <p:cNvSpPr/>
+          <p:nvPr/>
+        </p:nvSpPr>
+        <p:spPr>
+          <a:xfrm>
+            <a:off x="5994416" y="4713703"/>
+            <a:ext cx="914400" cy="504939"/>
+          </a:xfrm>
+          <a:prstGeom prst="ellipse">
+            <a:avLst/>
+          </a:prstGeom>
+          <a:gradFill flip="none" rotWithShape="1">
+            <a:gsLst>
+              <a:gs pos="0">
+                <a:schemeClr val="dk1">
+                  <a:lumMod val="67000"/>
+                </a:schemeClr>
+              </a:gs>
+              <a:gs pos="48000">
+                <a:schemeClr val="dk1">
+                  <a:lumMod val="97000"/>
+                  <a:lumOff val="3000"/>
+                </a:schemeClr>
+              </a:gs>
+              <a:gs pos="100000">
+                <a:schemeClr val="dk1">
+                  <a:lumMod val="60000"/>
+                  <a:lumOff val="40000"/>
+                </a:schemeClr>
+              </a:gs>
+            </a:gsLst>
+            <a:lin ang="16200000" scaled="1"/>
+            <a:tileRect/>
+          </a:gradFill>
+          <a:ln>
+            <a:noFill/>
+          </a:ln>
+        </p:spPr>
+        <p:style>
+          <a:lnRef idx="0">
+            <a:scrgbClr r="0" g="0" b="0"/>
+          </a:lnRef>
+          <a:fillRef idx="0">
+            <a:scrgbClr r="0" g="0" b="0"/>
+          </a:fillRef>
+          <a:effectRef idx="0">
+            <a:scrgbClr r="0" g="0" b="0"/>
+          </a:effectRef>
+          <a:fontRef idx="minor">
+            <a:schemeClr val="lt1"/>
+          </a:fontRef>
+        </p:style>
+        <p:txBody>
+          <a:bodyPr rtlCol="0" anchor="ctr"/>
+          <a:lstStyle/>
+          <a:p>
+            <a:pPr algn="ctr"/>
+            <a:r>
+              <a:rPr lang="en-US" sz="900" dirty="0"/>
+              <a:t>Container</a:t>
+            </a:r>
+          </a:p>
+          <a:p>
+            <a:pPr algn="ctr"/>
+            <a:r>
+              <a:rPr lang="en-US" sz="900" dirty="0"/>
+              <a:t>Service A Agent</a:t>
+            </a:r>
+          </a:p>
+        </p:txBody>
+      </p:sp>
+      <p:sp>
+        <p:nvSpPr>
+          <p:cNvPr id="46" name="Rectangle: Top Corners One Rounded and One Snipped 45">
+            <a:extLst>
+              <a:ext uri="{FF2B5EF4-FFF2-40B4-BE49-F238E27FC236}">
+                <a16:creationId xmlns:a16="http://schemas.microsoft.com/office/drawing/2014/main" id="{A0BD90FA-D79C-44A3-82AB-3478C86B6C0E}"/>
+              </a:ext>
+            </a:extLst>
+          </p:cNvPr>
+          <p:cNvSpPr/>
+          <p:nvPr/>
+        </p:nvSpPr>
+        <p:spPr>
+          <a:xfrm>
+            <a:off x="3862836" y="3707412"/>
+            <a:ext cx="548640" cy="329184"/>
+          </a:xfrm>
+          <a:prstGeom prst="snipRoundRect">
+            <a:avLst/>
+          </a:prstGeom>
+          <a:solidFill>
+            <a:schemeClr val="accent3">
+              <a:lumMod val="50000"/>
+            </a:schemeClr>
+          </a:solidFill>
+          <a:ln>
+            <a:noFill/>
+          </a:ln>
+        </p:spPr>
+        <p:style>
+          <a:lnRef idx="0">
+            <a:scrgbClr r="0" g="0" b="0"/>
+          </a:lnRef>
+          <a:fillRef idx="0">
+            <a:scrgbClr r="0" g="0" b="0"/>
+          </a:fillRef>
+          <a:effectRef idx="0">
+            <a:scrgbClr r="0" g="0" b="0"/>
+          </a:effectRef>
+          <a:fontRef idx="minor">
+            <a:schemeClr val="lt1"/>
+          </a:fontRef>
+        </p:style>
+        <p:txBody>
+          <a:bodyPr rtlCol="0" anchor="ctr"/>
+          <a:lstStyle/>
+          <a:p>
+            <a:pPr algn="ctr"/>
+            <a:r>
+              <a:rPr lang="en-US" sz="800" dirty="0"/>
+              <a:t>DB </a:t>
+            </a:r>
+            <a:r>
+              <a:rPr lang="en-US" sz="800" dirty="0" err="1"/>
+              <a:t>Extens</a:t>
+            </a:r>
+            <a:endParaRPr lang="en-US" sz="800" dirty="0"/>
+          </a:p>
+        </p:txBody>
+      </p:sp>
+      <p:sp>
+        <p:nvSpPr>
+          <p:cNvPr id="40" name="Rectangle: Top Corners One Rounded and One Snipped 39">
+            <a:extLst>
+              <a:ext uri="{FF2B5EF4-FFF2-40B4-BE49-F238E27FC236}">
+                <a16:creationId xmlns:a16="http://schemas.microsoft.com/office/drawing/2014/main" id="{342CB059-56E3-416F-A0CE-5EAA544FBDF9}"/>
+              </a:ext>
+            </a:extLst>
+          </p:cNvPr>
+          <p:cNvSpPr/>
+          <p:nvPr/>
+        </p:nvSpPr>
+        <p:spPr>
+          <a:xfrm>
+            <a:off x="3856613" y="3707412"/>
+            <a:ext cx="548640" cy="329184"/>
+          </a:xfrm>
+          <a:prstGeom prst="snipRoundRect">
+            <a:avLst/>
+          </a:prstGeom>
+          <a:solidFill>
+            <a:schemeClr val="accent3">
+              <a:lumMod val="50000"/>
+            </a:schemeClr>
+          </a:solidFill>
+          <a:ln>
+            <a:noFill/>
+          </a:ln>
+        </p:spPr>
+        <p:style>
+          <a:lnRef idx="0">
+            <a:scrgbClr r="0" g="0" b="0"/>
+          </a:lnRef>
+          <a:fillRef idx="0">
+            <a:scrgbClr r="0" g="0" b="0"/>
+          </a:fillRef>
+          <a:effectRef idx="0">
+            <a:scrgbClr r="0" g="0" b="0"/>
+          </a:effectRef>
+          <a:fontRef idx="minor">
+            <a:schemeClr val="lt1"/>
+          </a:fontRef>
+        </p:style>
+        <p:txBody>
+          <a:bodyPr rtlCol="0" anchor="ctr"/>
+          <a:lstStyle/>
+          <a:p>
+            <a:pPr algn="ctr"/>
+            <a:r>
+              <a:rPr lang="en-US" sz="800" dirty="0" err="1"/>
+              <a:t>Srvc</a:t>
+            </a:r>
+            <a:r>
+              <a:rPr lang="en-US" sz="800" dirty="0"/>
+              <a:t> A Code</a:t>
+            </a:r>
+          </a:p>
+        </p:txBody>
+      </p:sp>
+      <p:grpSp>
+        <p:nvGrpSpPr>
+          <p:cNvPr id="16" name="Group 15">
+            <a:extLst>
+              <a:ext uri="{FF2B5EF4-FFF2-40B4-BE49-F238E27FC236}">
+                <a16:creationId xmlns:a16="http://schemas.microsoft.com/office/drawing/2014/main" id="{8B4184E8-51F3-4144-9176-31425F7C4579}"/>
+              </a:ext>
+            </a:extLst>
+          </p:cNvPr>
+          <p:cNvGrpSpPr/>
+          <p:nvPr/>
+        </p:nvGrpSpPr>
+        <p:grpSpPr>
+          <a:xfrm>
+            <a:off x="5511780" y="3239345"/>
+            <a:ext cx="4034972" cy="2262647"/>
+            <a:chOff x="5511780" y="3239345"/>
+            <a:chExt cx="4034972" cy="2262647"/>
+          </a:xfrm>
+        </p:grpSpPr>
+        <p:sp>
+          <p:nvSpPr>
+            <p:cNvPr id="50" name="Freeform: Shape 49">
+              <a:extLst>
+                <a:ext uri="{FF2B5EF4-FFF2-40B4-BE49-F238E27FC236}">
+                  <a16:creationId xmlns:a16="http://schemas.microsoft.com/office/drawing/2014/main" id="{56D8D987-FAE8-4401-8620-B5CE7CF1AD7E}"/>
+                </a:ext>
+              </a:extLst>
+            </p:cNvPr>
+            <p:cNvSpPr/>
+            <p:nvPr/>
+          </p:nvSpPr>
+          <p:spPr>
+            <a:xfrm>
+              <a:off x="5511780" y="3239345"/>
+              <a:ext cx="4034972" cy="2262647"/>
+            </a:xfrm>
+            <a:custGeom>
+              <a:avLst/>
+              <a:gdLst>
+                <a:gd name="connsiteX0" fmla="*/ 1943612 w 4034972"/>
+                <a:gd name="connsiteY0" fmla="*/ 0 h 2262647"/>
+                <a:gd name="connsiteX1" fmla="*/ 3950383 w 4034972"/>
+                <a:gd name="connsiteY1" fmla="*/ 0 h 2262647"/>
+                <a:gd name="connsiteX2" fmla="*/ 3950383 w 4034972"/>
+                <a:gd name="connsiteY2" fmla="*/ 604187 h 2262647"/>
+                <a:gd name="connsiteX3" fmla="*/ 4034972 w 4034972"/>
+                <a:gd name="connsiteY3" fmla="*/ 604187 h 2262647"/>
+                <a:gd name="connsiteX4" fmla="*/ 4034972 w 4034972"/>
+                <a:gd name="connsiteY4" fmla="*/ 696586 h 2262647"/>
+                <a:gd name="connsiteX5" fmla="*/ 2858013 w 4034972"/>
+                <a:gd name="connsiteY5" fmla="*/ 696586 h 2262647"/>
+                <a:gd name="connsiteX6" fmla="*/ 2858013 w 4034972"/>
+                <a:gd name="connsiteY6" fmla="*/ 2262647 h 2262647"/>
+                <a:gd name="connsiteX7" fmla="*/ 0 w 4034972"/>
+                <a:gd name="connsiteY7" fmla="*/ 2262647 h 2262647"/>
+                <a:gd name="connsiteX8" fmla="*/ 0 w 4034972"/>
+                <a:gd name="connsiteY8" fmla="*/ 604187 h 2262647"/>
+                <a:gd name="connsiteX9" fmla="*/ 1943612 w 4034972"/>
+                <a:gd name="connsiteY9" fmla="*/ 604187 h 2262647"/>
+              </a:gdLst>
+              <a:ahLst/>
+              <a:cxnLst>
+                <a:cxn ang="0">
+                  <a:pos x="connsiteX0" y="connsiteY0"/>
+                </a:cxn>
+                <a:cxn ang="0">
+                  <a:pos x="connsiteX1" y="connsiteY1"/>
+                </a:cxn>
+                <a:cxn ang="0">
+                  <a:pos x="connsiteX2" y="connsiteY2"/>
+                </a:cxn>
+                <a:cxn ang="0">
+                  <a:pos x="connsiteX3" y="connsiteY3"/>
+                </a:cxn>
+                <a:cxn ang="0">
+                  <a:pos x="connsiteX4" y="connsiteY4"/>
+                </a:cxn>
+                <a:cxn ang="0">
+                  <a:pos x="connsiteX5" y="connsiteY5"/>
+                </a:cxn>
+                <a:cxn ang="0">
+                  <a:pos x="connsiteX6" y="connsiteY6"/>
+                </a:cxn>
+                <a:cxn ang="0">
+                  <a:pos x="connsiteX7" y="connsiteY7"/>
+                </a:cxn>
+                <a:cxn ang="0">
+                  <a:pos x="connsiteX8" y="connsiteY8"/>
+                </a:cxn>
+                <a:cxn ang="0">
+                  <a:pos x="connsiteX9" y="connsiteY9"/>
+                </a:cxn>
+              </a:cxnLst>
+              <a:rect l="l" t="t" r="r" b="b"/>
+              <a:pathLst>
+                <a:path w="4034972" h="2262647">
+                  <a:moveTo>
+                    <a:pt x="1943612" y="0"/>
+                  </a:moveTo>
+                  <a:lnTo>
+                    <a:pt x="3950383" y="0"/>
+                  </a:lnTo>
+                  <a:lnTo>
+                    <a:pt x="3950383" y="604187"/>
+                  </a:lnTo>
+                  <a:lnTo>
+                    <a:pt x="4034972" y="604187"/>
+                  </a:lnTo>
+                  <a:lnTo>
+                    <a:pt x="4034972" y="696586"/>
+                  </a:lnTo>
+                  <a:lnTo>
+                    <a:pt x="2858013" y="696586"/>
+                  </a:lnTo>
+                  <a:lnTo>
+                    <a:pt x="2858013" y="2262647"/>
+                  </a:lnTo>
+                  <a:lnTo>
+                    <a:pt x="0" y="2262647"/>
+                  </a:lnTo>
+                  <a:lnTo>
+                    <a:pt x="0" y="604187"/>
+                  </a:lnTo>
+                  <a:lnTo>
+                    <a:pt x="1943612" y="604187"/>
+                  </a:lnTo>
+                  <a:close/>
+                </a:path>
+              </a:pathLst>
+            </a:custGeom>
+            <a:noFill/>
+            <a:ln w="38100">
+              <a:solidFill>
+                <a:schemeClr val="bg1">
+                  <a:lumMod val="95000"/>
+                  <a:lumOff val="5000"/>
+                </a:schemeClr>
+              </a:solidFill>
+              <a:prstDash val="lgDashDot"/>
+            </a:ln>
+          </p:spPr>
+          <p:style>
+            <a:lnRef idx="2">
+              <a:schemeClr val="accent1">
+                <a:shade val="50000"/>
+              </a:schemeClr>
+            </a:lnRef>
+            <a:fillRef idx="1">
+              <a:schemeClr val="accent1"/>
+            </a:fillRef>
+            <a:effectRef idx="0">
+              <a:schemeClr val="accent1"/>
+            </a:effectRef>
+            <a:fontRef idx="minor">
+              <a:schemeClr val="lt1"/>
+            </a:fontRef>
+          </p:style>
+          <p:txBody>
+            <a:bodyPr wrap="square" rtlCol="0" anchor="t">
+              <a:noAutofit/>
+            </a:bodyPr>
+            <a:lstStyle/>
+            <a:p>
+              <a:endParaRPr lang="en-US" sz="1100" dirty="0"/>
+            </a:p>
+          </p:txBody>
+        </p:sp>
+        <p:sp>
+          <p:nvSpPr>
+            <p:cNvPr id="14" name="TextBox 13">
+              <a:extLst>
+                <a:ext uri="{FF2B5EF4-FFF2-40B4-BE49-F238E27FC236}">
+                  <a16:creationId xmlns:a16="http://schemas.microsoft.com/office/drawing/2014/main" id="{498BD242-18AD-416D-AF32-866E4748C022}"/>
+                </a:ext>
+              </a:extLst>
+            </p:cNvPr>
+            <p:cNvSpPr txBox="1"/>
+            <p:nvPr/>
+          </p:nvSpPr>
+          <p:spPr>
+            <a:xfrm>
+              <a:off x="6847613" y="4087707"/>
+              <a:ext cx="1317027" cy="307777"/>
+            </a:xfrm>
+            <a:prstGeom prst="rect">
+              <a:avLst/>
+            </a:prstGeom>
+            <a:noFill/>
+          </p:spPr>
+          <p:txBody>
+            <a:bodyPr wrap="none" rtlCol="0">
+              <a:spAutoFit/>
+            </a:bodyPr>
+            <a:lstStyle/>
+            <a:p>
+              <a:r>
+                <a:rPr lang="en-US" sz="1400" b="1" dirty="0">
+                  <a:solidFill>
+                    <a:srgbClr val="0D0D0D"/>
+                  </a:solidFill>
+                </a:rPr>
+                <a:t>Svc A Run Time</a:t>
+              </a:r>
+            </a:p>
+          </p:txBody>
+        </p:sp>
+      </p:grpSp>
+      <p:sp>
+        <p:nvSpPr>
+          <p:cNvPr id="20" name="Rectangle: Top Corners One Rounded and One Snipped 19">
+            <a:extLst>
+              <a:ext uri="{FF2B5EF4-FFF2-40B4-BE49-F238E27FC236}">
+                <a16:creationId xmlns:a16="http://schemas.microsoft.com/office/drawing/2014/main" id="{6A5C490F-E6F7-44C3-8B87-EDE8D1419A49}"/>
+              </a:ext>
+            </a:extLst>
+          </p:cNvPr>
+          <p:cNvSpPr/>
+          <p:nvPr/>
+        </p:nvSpPr>
+        <p:spPr>
+          <a:xfrm>
+            <a:off x="3901853" y="4496765"/>
+            <a:ext cx="548640" cy="329184"/>
+          </a:xfrm>
+          <a:prstGeom prst="snipRoundRect">
+            <a:avLst/>
+          </a:prstGeom>
+          <a:solidFill>
+            <a:schemeClr val="accent3">
+              <a:lumMod val="50000"/>
+            </a:schemeClr>
+          </a:solidFill>
+          <a:ln>
+            <a:noFill/>
+          </a:ln>
+        </p:spPr>
+        <p:style>
+          <a:lnRef idx="0">
+            <a:scrgbClr r="0" g="0" b="0"/>
+          </a:lnRef>
+          <a:fillRef idx="0">
+            <a:scrgbClr r="0" g="0" b="0"/>
+          </a:fillRef>
+          <a:effectRef idx="0">
+            <a:scrgbClr r="0" g="0" b="0"/>
+          </a:effectRef>
+          <a:fontRef idx="minor">
+            <a:schemeClr val="lt1"/>
+          </a:fontRef>
+        </p:style>
+        <p:txBody>
+          <a:bodyPr rtlCol="0" anchor="ctr"/>
+          <a:lstStyle/>
+          <a:p>
+            <a:pPr algn="ctr"/>
+            <a:r>
+              <a:rPr lang="en-US" sz="800" dirty="0"/>
+              <a:t>Svc A CDT</a:t>
+            </a:r>
+          </a:p>
+        </p:txBody>
+      </p:sp>
+      <p:grpSp>
+        <p:nvGrpSpPr>
+          <p:cNvPr id="19" name="Group 18">
+            <a:extLst>
+              <a:ext uri="{FF2B5EF4-FFF2-40B4-BE49-F238E27FC236}">
+                <a16:creationId xmlns:a16="http://schemas.microsoft.com/office/drawing/2014/main" id="{9DAF8ADE-22CB-4F81-9188-C5F5E346A2F1}"/>
+              </a:ext>
+            </a:extLst>
+          </p:cNvPr>
+          <p:cNvGrpSpPr/>
+          <p:nvPr/>
+        </p:nvGrpSpPr>
+        <p:grpSpPr>
+          <a:xfrm>
+            <a:off x="7391452" y="3216427"/>
+            <a:ext cx="3108909" cy="2426991"/>
+            <a:chOff x="7391452" y="3216427"/>
+            <a:chExt cx="3108909" cy="2426991"/>
+          </a:xfrm>
+        </p:grpSpPr>
+        <p:sp>
+          <p:nvSpPr>
+            <p:cNvPr id="51" name="Oval 50">
+              <a:extLst>
+                <a:ext uri="{FF2B5EF4-FFF2-40B4-BE49-F238E27FC236}">
+                  <a16:creationId xmlns:a16="http://schemas.microsoft.com/office/drawing/2014/main" id="{D1BF8DC1-24C0-4FF1-B4B8-C129E587EAA7}"/>
+                </a:ext>
+              </a:extLst>
+            </p:cNvPr>
+            <p:cNvSpPr/>
+            <p:nvPr/>
+          </p:nvSpPr>
+          <p:spPr>
+            <a:xfrm>
+              <a:off x="8632352" y="4700417"/>
+              <a:ext cx="914400" cy="504939"/>
+            </a:xfrm>
+            <a:prstGeom prst="ellipse">
+              <a:avLst/>
+            </a:prstGeom>
+            <a:gradFill flip="none" rotWithShape="1">
+              <a:gsLst>
+                <a:gs pos="0">
+                  <a:schemeClr val="accent5">
+                    <a:lumMod val="67000"/>
+                  </a:schemeClr>
+                </a:gs>
+                <a:gs pos="48000">
+                  <a:schemeClr val="accent5">
+                    <a:lumMod val="97000"/>
+                    <a:lumOff val="3000"/>
+                  </a:schemeClr>
+                </a:gs>
+                <a:gs pos="100000">
+                  <a:schemeClr val="accent5">
+                    <a:lumMod val="60000"/>
+                    <a:lumOff val="40000"/>
+                  </a:schemeClr>
+                </a:gs>
+              </a:gsLst>
+              <a:lin ang="16200000" scaled="1"/>
+              <a:tileRect/>
+            </a:gradFill>
+            <a:ln>
+              <a:noFill/>
+            </a:ln>
+          </p:spPr>
+          <p:style>
+            <a:lnRef idx="0">
+              <a:scrgbClr r="0" g="0" b="0"/>
+            </a:lnRef>
+            <a:fillRef idx="0">
+              <a:scrgbClr r="0" g="0" b="0"/>
+            </a:fillRef>
+            <a:effectRef idx="0">
+              <a:scrgbClr r="0" g="0" b="0"/>
+            </a:effectRef>
+            <a:fontRef idx="minor">
+              <a:schemeClr val="lt1"/>
+            </a:fontRef>
+          </p:style>
+          <p:txBody>
+            <a:bodyPr rtlCol="0" anchor="ctr"/>
+            <a:lstStyle/>
+            <a:p>
+              <a:pPr algn="ctr"/>
+              <a:r>
+                <a:rPr lang="en-US" sz="900" dirty="0"/>
+                <a:t>Container</a:t>
+              </a:r>
+            </a:p>
+            <a:p>
+              <a:pPr algn="ctr"/>
+              <a:r>
+                <a:rPr lang="en-US" sz="900" dirty="0"/>
+                <a:t>Service B Config</a:t>
+              </a:r>
+            </a:p>
+          </p:txBody>
+        </p:sp>
+        <p:sp>
+          <p:nvSpPr>
+            <p:cNvPr id="52" name="Oval 51">
+              <a:extLst>
+                <a:ext uri="{FF2B5EF4-FFF2-40B4-BE49-F238E27FC236}">
+                  <a16:creationId xmlns:a16="http://schemas.microsoft.com/office/drawing/2014/main" id="{D37AB39E-33E2-4BD3-9EAF-18BD0A617AC4}"/>
+                </a:ext>
+              </a:extLst>
+            </p:cNvPr>
+            <p:cNvSpPr/>
+            <p:nvPr/>
+          </p:nvSpPr>
+          <p:spPr>
+            <a:xfrm>
+              <a:off x="9506975" y="4416038"/>
+              <a:ext cx="914400" cy="504939"/>
+            </a:xfrm>
+            <a:prstGeom prst="ellipse">
+              <a:avLst/>
+            </a:prstGeom>
+            <a:gradFill flip="none" rotWithShape="1">
+              <a:gsLst>
+                <a:gs pos="0">
+                  <a:schemeClr val="accent5">
+                    <a:lumMod val="67000"/>
+                  </a:schemeClr>
+                </a:gs>
+                <a:gs pos="48000">
+                  <a:schemeClr val="accent5">
+                    <a:lumMod val="97000"/>
+                    <a:lumOff val="3000"/>
+                  </a:schemeClr>
+                </a:gs>
+                <a:gs pos="100000">
+                  <a:schemeClr val="accent5">
+                    <a:lumMod val="60000"/>
+                    <a:lumOff val="40000"/>
+                  </a:schemeClr>
+                </a:gs>
+              </a:gsLst>
+              <a:lin ang="16200000" scaled="1"/>
+              <a:tileRect/>
+            </a:gradFill>
+            <a:ln>
+              <a:noFill/>
+            </a:ln>
+          </p:spPr>
+          <p:style>
+            <a:lnRef idx="0">
+              <a:scrgbClr r="0" g="0" b="0"/>
+            </a:lnRef>
+            <a:fillRef idx="0">
+              <a:scrgbClr r="0" g="0" b="0"/>
+            </a:fillRef>
+            <a:effectRef idx="0">
+              <a:scrgbClr r="0" g="0" b="0"/>
+            </a:effectRef>
+            <a:fontRef idx="minor">
+              <a:schemeClr val="lt1"/>
+            </a:fontRef>
+          </p:style>
+          <p:txBody>
+            <a:bodyPr rtlCol="0" anchor="ctr"/>
+            <a:lstStyle/>
+            <a:p>
+              <a:pPr algn="ctr"/>
+              <a:r>
+                <a:rPr lang="en-US" sz="900" dirty="0"/>
+                <a:t>Container</a:t>
+              </a:r>
+            </a:p>
+            <a:p>
+              <a:pPr algn="ctr"/>
+              <a:r>
+                <a:rPr lang="en-US" sz="900" dirty="0"/>
+                <a:t>Service B App</a:t>
+              </a:r>
+            </a:p>
+          </p:txBody>
+        </p:sp>
+        <p:sp>
+          <p:nvSpPr>
+            <p:cNvPr id="53" name="Oval 52">
+              <a:extLst>
+                <a:ext uri="{FF2B5EF4-FFF2-40B4-BE49-F238E27FC236}">
+                  <a16:creationId xmlns:a16="http://schemas.microsoft.com/office/drawing/2014/main" id="{D94A9E0F-B4B8-48B2-8497-89EB568A0264}"/>
+                </a:ext>
+              </a:extLst>
+            </p:cNvPr>
+            <p:cNvSpPr/>
+            <p:nvPr/>
+          </p:nvSpPr>
+          <p:spPr>
+            <a:xfrm>
+              <a:off x="9482575" y="5060872"/>
+              <a:ext cx="914400" cy="504939"/>
+            </a:xfrm>
+            <a:prstGeom prst="ellipse">
+              <a:avLst/>
+            </a:prstGeom>
+            <a:gradFill flip="none" rotWithShape="1">
+              <a:gsLst>
+                <a:gs pos="0">
+                  <a:schemeClr val="accent5">
+                    <a:lumMod val="67000"/>
+                  </a:schemeClr>
+                </a:gs>
+                <a:gs pos="48000">
+                  <a:schemeClr val="accent5">
+                    <a:lumMod val="97000"/>
+                    <a:lumOff val="3000"/>
+                  </a:schemeClr>
+                </a:gs>
+                <a:gs pos="100000">
+                  <a:schemeClr val="accent5">
+                    <a:lumMod val="60000"/>
+                    <a:lumOff val="40000"/>
+                  </a:schemeClr>
+                </a:gs>
+              </a:gsLst>
+              <a:lin ang="16200000" scaled="1"/>
+              <a:tileRect/>
+            </a:gradFill>
+            <a:ln>
+              <a:noFill/>
+            </a:ln>
+          </p:spPr>
+          <p:style>
+            <a:lnRef idx="0">
+              <a:scrgbClr r="0" g="0" b="0"/>
+            </a:lnRef>
+            <a:fillRef idx="0">
+              <a:scrgbClr r="0" g="0" b="0"/>
+            </a:fillRef>
+            <a:effectRef idx="0">
+              <a:scrgbClr r="0" g="0" b="0"/>
+            </a:effectRef>
+            <a:fontRef idx="minor">
+              <a:schemeClr val="lt1"/>
+            </a:fontRef>
+          </p:style>
+          <p:txBody>
+            <a:bodyPr rtlCol="0" anchor="ctr"/>
+            <a:lstStyle/>
+            <a:p>
+              <a:pPr algn="ctr"/>
+              <a:r>
+                <a:rPr lang="en-US" sz="900" dirty="0"/>
+                <a:t>Container</a:t>
+              </a:r>
+            </a:p>
+            <a:p>
+              <a:pPr algn="ctr"/>
+              <a:r>
+                <a:rPr lang="en-US" sz="900" dirty="0"/>
+                <a:t>Service B Agent</a:t>
+              </a:r>
+            </a:p>
+          </p:txBody>
+        </p:sp>
+        <p:sp>
+          <p:nvSpPr>
+            <p:cNvPr id="55" name="Freeform: Shape 54">
+              <a:extLst>
+                <a:ext uri="{FF2B5EF4-FFF2-40B4-BE49-F238E27FC236}">
+                  <a16:creationId xmlns:a16="http://schemas.microsoft.com/office/drawing/2014/main" id="{B4F2151C-63BC-44C8-A0CB-C836ECEB66E4}"/>
+                </a:ext>
+              </a:extLst>
+            </p:cNvPr>
+            <p:cNvSpPr/>
+            <p:nvPr/>
+          </p:nvSpPr>
+          <p:spPr>
+            <a:xfrm>
+              <a:off x="7391452" y="3216427"/>
+              <a:ext cx="3108909" cy="2426991"/>
+            </a:xfrm>
+            <a:custGeom>
+              <a:avLst/>
+              <a:gdLst>
+                <a:gd name="connsiteX0" fmla="*/ 0 w 3108909"/>
+                <a:gd name="connsiteY0" fmla="*/ 0 h 2426991"/>
+                <a:gd name="connsiteX1" fmla="*/ 2155300 w 3108909"/>
+                <a:gd name="connsiteY1" fmla="*/ 0 h 2426991"/>
+                <a:gd name="connsiteX2" fmla="*/ 2155300 w 3108909"/>
+                <a:gd name="connsiteY2" fmla="*/ 808098 h 2426991"/>
+                <a:gd name="connsiteX3" fmla="*/ 3108909 w 3108909"/>
+                <a:gd name="connsiteY3" fmla="*/ 808098 h 2426991"/>
+                <a:gd name="connsiteX4" fmla="*/ 3108909 w 3108909"/>
+                <a:gd name="connsiteY4" fmla="*/ 2426991 h 2426991"/>
+                <a:gd name="connsiteX5" fmla="*/ 1152185 w 3108909"/>
+                <a:gd name="connsiteY5" fmla="*/ 2426991 h 2426991"/>
+                <a:gd name="connsiteX6" fmla="*/ 1152185 w 3108909"/>
+                <a:gd name="connsiteY6" fmla="*/ 838386 h 2426991"/>
+                <a:gd name="connsiteX7" fmla="*/ 0 w 3108909"/>
+                <a:gd name="connsiteY7" fmla="*/ 838386 h 2426991"/>
+              </a:gdLst>
+              <a:ahLst/>
+              <a:cxnLst>
+                <a:cxn ang="0">
+                  <a:pos x="connsiteX0" y="connsiteY0"/>
+                </a:cxn>
+                <a:cxn ang="0">
+                  <a:pos x="connsiteX1" y="connsiteY1"/>
+                </a:cxn>
+                <a:cxn ang="0">
+                  <a:pos x="connsiteX2" y="connsiteY2"/>
+                </a:cxn>
+                <a:cxn ang="0">
+                  <a:pos x="connsiteX3" y="connsiteY3"/>
+                </a:cxn>
+                <a:cxn ang="0">
+                  <a:pos x="connsiteX4" y="connsiteY4"/>
+                </a:cxn>
+                <a:cxn ang="0">
+                  <a:pos x="connsiteX5" y="connsiteY5"/>
+                </a:cxn>
+                <a:cxn ang="0">
+                  <a:pos x="connsiteX6" y="connsiteY6"/>
+                </a:cxn>
+                <a:cxn ang="0">
+                  <a:pos x="connsiteX7" y="connsiteY7"/>
+                </a:cxn>
+              </a:cxnLst>
+              <a:rect l="l" t="t" r="r" b="b"/>
+              <a:pathLst>
+                <a:path w="3108909" h="2426991">
+                  <a:moveTo>
+                    <a:pt x="0" y="0"/>
+                  </a:moveTo>
+                  <a:lnTo>
+                    <a:pt x="2155300" y="0"/>
+                  </a:lnTo>
+                  <a:lnTo>
+                    <a:pt x="2155300" y="808098"/>
+                  </a:lnTo>
+                  <a:lnTo>
+                    <a:pt x="3108909" y="808098"/>
+                  </a:lnTo>
+                  <a:lnTo>
+                    <a:pt x="3108909" y="2426991"/>
+                  </a:lnTo>
+                  <a:lnTo>
+                    <a:pt x="1152185" y="2426991"/>
+                  </a:lnTo>
+                  <a:lnTo>
+                    <a:pt x="1152185" y="838386"/>
+                  </a:lnTo>
+                  <a:lnTo>
+                    <a:pt x="0" y="838386"/>
+                  </a:lnTo>
+                  <a:close/>
+                </a:path>
+              </a:pathLst>
+            </a:custGeom>
+            <a:noFill/>
+            <a:ln w="38100">
+              <a:solidFill>
+                <a:schemeClr val="accent5">
+                  <a:lumMod val="40000"/>
+                  <a:lumOff val="60000"/>
+                </a:schemeClr>
+              </a:solidFill>
+              <a:prstDash val="lgDashDot"/>
+            </a:ln>
+          </p:spPr>
+          <p:style>
+            <a:lnRef idx="2">
+              <a:schemeClr val="accent1">
+                <a:shade val="50000"/>
+              </a:schemeClr>
+            </a:lnRef>
+            <a:fillRef idx="1">
+              <a:schemeClr val="accent1"/>
+            </a:fillRef>
+            <a:effectRef idx="0">
+              <a:schemeClr val="accent1"/>
+            </a:effectRef>
+            <a:fontRef idx="minor">
+              <a:schemeClr val="lt1"/>
+            </a:fontRef>
+          </p:style>
+          <p:txBody>
+            <a:bodyPr rtlCol="0" anchor="ctr"/>
+            <a:lstStyle/>
+            <a:p>
+              <a:pPr algn="ctr"/>
+              <a:endParaRPr lang="en-US"/>
+            </a:p>
+          </p:txBody>
+        </p:sp>
+        <p:sp>
+          <p:nvSpPr>
+            <p:cNvPr id="56" name="TextBox 55">
+              <a:extLst>
+                <a:ext uri="{FF2B5EF4-FFF2-40B4-BE49-F238E27FC236}">
+                  <a16:creationId xmlns:a16="http://schemas.microsoft.com/office/drawing/2014/main" id="{C72D7292-D2F9-4D63-84BA-3520DA887065}"/>
+                </a:ext>
+              </a:extLst>
+            </p:cNvPr>
+            <p:cNvSpPr txBox="1"/>
+            <p:nvPr/>
+          </p:nvSpPr>
+          <p:spPr>
+            <a:xfrm>
+              <a:off x="8709663" y="4076481"/>
+              <a:ext cx="1309013" cy="307777"/>
+            </a:xfrm>
+            <a:prstGeom prst="rect">
+              <a:avLst/>
+            </a:prstGeom>
+            <a:noFill/>
+          </p:spPr>
+          <p:txBody>
+            <a:bodyPr wrap="none" rtlCol="0">
+              <a:spAutoFit/>
+            </a:bodyPr>
+            <a:lstStyle/>
+            <a:p>
+              <a:r>
+                <a:rPr lang="en-US" sz="1400" b="1" dirty="0">
+                  <a:solidFill>
+                    <a:schemeClr val="accent5">
+                      <a:lumMod val="40000"/>
+                      <a:lumOff val="60000"/>
+                    </a:schemeClr>
+                  </a:solidFill>
+                </a:rPr>
+                <a:t>Svc B Run Time</a:t>
+              </a:r>
+            </a:p>
+          </p:txBody>
+        </p:sp>
+      </p:grpSp>
     </p:spTree>
     <p:extLst>
       <p:ext uri="{BB962C8B-B14F-4D97-AF65-F5344CB8AC3E}">
-        <p14:creationId xmlns:p14="http://schemas.microsoft.com/office/powerpoint/2010/main" val="3674611190"/>
+        <p14:creationId xmlns:p14="http://schemas.microsoft.com/office/powerpoint/2010/main" val="3455186568"/>
       </p:ext>
     </p:extLst>
   </p:cSld>
@@ -16881,7 +18547,7 @@
                                           </p:stCondLst>
                                         </p:cTn>
                                         <p:tgtEl>
-                                          <p:spTgt spid="5"/>
+                                          <p:spTgt spid="34"/>
                                         </p:tgtEl>
                                         <p:attrNameLst>
                                           <p:attrName>style.visibility</p:attrName>
@@ -16900,18 +18566,18 @@
                                     <p:cond delay="0"/>
                                   </p:stCondLst>
                                   <p:childTnLst>
-                                    <p:animMotion origin="layout" path="M -2.08333E-7 1.48148E-6 L -0.15365 0.0081 " pathEditMode="relative" rAng="0" ptsTypes="AA">
+                                    <p:animMotion origin="layout" path="M -3.125E-6 2.59259E-6 L -0.37669 -0.20972 " pathEditMode="relative" rAng="0" ptsTypes="AA">
                                       <p:cBhvr>
                                         <p:cTn id="8" dur="2000" spd="-100000" fill="hold"/>
                                         <p:tgtEl>
-                                          <p:spTgt spid="5"/>
+                                          <p:spTgt spid="34"/>
                                         </p:tgtEl>
                                         <p:attrNameLst>
                                           <p:attrName>ppt_x</p:attrName>
                                           <p:attrName>ppt_y</p:attrName>
                                         </p:attrNameLst>
                                       </p:cBhvr>
-                                      <p:rCtr x="-7682" y="394"/>
+                                      <p:rCtr x="-18841" y="-10486"/>
                                     </p:animMotion>
                                   </p:childTnLst>
                                 </p:cTn>
@@ -16948,7 +18614,7 @@
                                           </p:stCondLst>
                                         </p:cTn>
                                         <p:tgtEl>
-                                          <p:spTgt spid="4"/>
+                                          <p:spTgt spid="25"/>
                                         </p:tgtEl>
                                         <p:attrNameLst>
                                           <p:attrName>style.visibility</p:attrName>
@@ -16961,24 +18627,33 @@
                                   </p:childTnLst>
                                 </p:cTn>
                               </p:par>
+                            </p:childTnLst>
+                          </p:cTn>
+                        </p:par>
+                        <p:par>
+                          <p:cTn id="13" fill="hold">
+                            <p:stCondLst>
+                              <p:cond delay="0"/>
+                            </p:stCondLst>
+                            <p:childTnLst>
                               <p:par>
-                                <p:cTn id="13" presetID="42" presetClass="path" presetSubtype="0" accel="50000" decel="50000" fill="hold" grpId="0" nodeType="withEffect">
+                                <p:cTn id="14" presetID="42" presetClass="path" presetSubtype="0" accel="50000" decel="50000" fill="hold" grpId="0" nodeType="afterEffect">
                                   <p:stCondLst>
                                     <p:cond delay="0"/>
                                   </p:stCondLst>
                                   <p:childTnLst>
-                                    <p:animMotion origin="layout" path="M -2.08333E-7 4.81481E-6 L -0.1513 -0.0845 " pathEditMode="relative" rAng="0" ptsTypes="AA">
+                                    <p:animMotion origin="layout" path="M 3.33333E-6 -2.59259E-6 L -0.29922 -0.02106 " pathEditMode="relative" rAng="0" ptsTypes="AA">
                                       <p:cBhvr>
-                                        <p:cTn id="14" dur="2000" spd="-100000" fill="hold"/>
+                                        <p:cTn id="15" dur="2000" spd="-100000" fill="hold"/>
                                         <p:tgtEl>
-                                          <p:spTgt spid="4"/>
+                                          <p:spTgt spid="25"/>
                                         </p:tgtEl>
                                         <p:attrNameLst>
                                           <p:attrName>ppt_x</p:attrName>
                                           <p:attrName>ppt_y</p:attrName>
                                         </p:attrNameLst>
                                       </p:cBhvr>
-                                      <p:rCtr x="-7565" y="-4236"/>
+                                      <p:rCtr x="-14961" y="-1065"/>
                                     </p:animMotion>
                                   </p:childTnLst>
                                 </p:cTn>
@@ -16990,32 +18665,32 @@
                     </p:cTn>
                   </p:par>
                   <p:par>
-                    <p:cTn id="15" fill="hold">
+                    <p:cTn id="16" fill="hold">
                       <p:stCondLst>
                         <p:cond delay="indefinite"/>
                       </p:stCondLst>
                       <p:childTnLst>
                         <p:par>
-                          <p:cTn id="16" fill="hold">
+                          <p:cTn id="17" fill="hold">
                             <p:stCondLst>
                               <p:cond delay="0"/>
                             </p:stCondLst>
                             <p:childTnLst>
                               <p:par>
-                                <p:cTn id="17" presetID="1" presetClass="entr" presetSubtype="0" fill="hold" grpId="1" nodeType="clickEffect">
+                                <p:cTn id="18" presetID="1" presetClass="entr" presetSubtype="0" fill="hold" grpId="0" nodeType="clickEffect">
                                   <p:stCondLst>
                                     <p:cond delay="0"/>
                                   </p:stCondLst>
                                   <p:childTnLst>
                                     <p:set>
                                       <p:cBhvr>
-                                        <p:cTn id="18" dur="1" fill="hold">
+                                        <p:cTn id="19" dur="1" fill="hold">
                                           <p:stCondLst>
                                             <p:cond delay="0"/>
                                           </p:stCondLst>
                                         </p:cTn>
                                         <p:tgtEl>
-                                          <p:spTgt spid="3"/>
+                                          <p:spTgt spid="26"/>
                                         </p:tgtEl>
                                         <p:attrNameLst>
                                           <p:attrName>style.visibility</p:attrName>
@@ -17028,24 +18703,33 @@
                                   </p:childTnLst>
                                 </p:cTn>
                               </p:par>
+                            </p:childTnLst>
+                          </p:cTn>
+                        </p:par>
+                        <p:par>
+                          <p:cTn id="20" fill="hold">
+                            <p:stCondLst>
+                              <p:cond delay="0"/>
+                            </p:stCondLst>
+                            <p:childTnLst>
                               <p:par>
-                                <p:cTn id="19" presetID="42" presetClass="path" presetSubtype="0" accel="50000" decel="50000" fill="hold" grpId="0" nodeType="withEffect">
+                                <p:cTn id="21" presetID="37" presetClass="path" presetSubtype="0" accel="50000" decel="50000" fill="hold" grpId="1" nodeType="afterEffect">
                                   <p:stCondLst>
                                     <p:cond delay="0"/>
                                   </p:stCondLst>
                                   <p:childTnLst>
-                                    <p:animMotion origin="layout" path="M -2.08333E-7 -3.7037E-7 L -0.15911 -0.14352 " pathEditMode="relative" rAng="0" ptsTypes="AA">
+                                    <p:animMotion origin="layout" path="M -2.29167E-6 3.33333E-6 L -0.07578 0.04467 C -0.0914 0.05532 -0.11471 0.06041 -0.13919 0.05879 C -0.16719 0.05717 -0.18945 0.0493 -0.20469 0.0368 L -0.27786 -0.01713 " pathEditMode="relative" rAng="120000" ptsTypes="AAAAA">
                                       <p:cBhvr>
-                                        <p:cTn id="20" dur="2000" spd="-100000" fill="hold"/>
+                                        <p:cTn id="22" dur="2000" spd="-100000" fill="hold"/>
                                         <p:tgtEl>
-                                          <p:spTgt spid="3"/>
+                                          <p:spTgt spid="26"/>
                                         </p:tgtEl>
                                         <p:attrNameLst>
                                           <p:attrName>ppt_x</p:attrName>
                                           <p:attrName>ppt_y</p:attrName>
                                         </p:attrNameLst>
                                       </p:cBhvr>
-                                      <p:rCtr x="-7956" y="-7176"/>
+                                      <p:rCtr x="-13958" y="2500"/>
                                     </p:animMotion>
                                   </p:childTnLst>
                                 </p:cTn>
@@ -17057,62 +18741,35 @@
                     </p:cTn>
                   </p:par>
                   <p:par>
-                    <p:cTn id="21" fill="hold">
+                    <p:cTn id="23" fill="hold">
                       <p:stCondLst>
                         <p:cond delay="indefinite"/>
                       </p:stCondLst>
                       <p:childTnLst>
                         <p:par>
-                          <p:cTn id="22" fill="hold">
+                          <p:cTn id="24" fill="hold">
                             <p:stCondLst>
                               <p:cond delay="0"/>
                             </p:stCondLst>
                             <p:childTnLst>
                               <p:par>
-                                <p:cTn id="23" presetID="1" presetClass="entr" presetSubtype="0" fill="hold" grpId="1" nodeType="clickEffect">
+                                <p:cTn id="25" presetID="42" presetClass="path" presetSubtype="0" accel="50000" decel="50000" autoRev="1" fill="hold" grpId="0" nodeType="clickEffect">
                                   <p:stCondLst>
                                     <p:cond delay="0"/>
                                   </p:stCondLst>
                                   <p:childTnLst>
-                                    <p:set>
+                                    <p:animMotion origin="layout" path="M 2.08333E-6 3.7037E-7 L 0.25573 0.04097 " pathEditMode="relative" rAng="0" ptsTypes="AA">
                                       <p:cBhvr>
-                                        <p:cTn id="24" dur="1" fill="hold">
-                                          <p:stCondLst>
-                                            <p:cond delay="0"/>
-                                          </p:stCondLst>
-                                        </p:cTn>
+                                        <p:cTn id="26" dur="2000" fill="hold"/>
                                         <p:tgtEl>
-                                          <p:spTgt spid="10"/>
-                                        </p:tgtEl>
-                                        <p:attrNameLst>
-                                          <p:attrName>style.visibility</p:attrName>
-                                        </p:attrNameLst>
-                                      </p:cBhvr>
-                                      <p:to>
-                                        <p:strVal val="visible"/>
-                                      </p:to>
-                                    </p:set>
-                                  </p:childTnLst>
-                                </p:cTn>
-                              </p:par>
-                              <p:par>
-                                <p:cTn id="25" presetID="42" presetClass="path" presetSubtype="0" accel="50000" decel="50000" fill="hold" grpId="0" nodeType="withEffect">
-                                  <p:stCondLst>
-                                    <p:cond delay="0"/>
-                                  </p:stCondLst>
-                                  <p:childTnLst>
-                                    <p:animMotion origin="layout" path="M -2.08333E-7 4.44444E-6 L -0.18008 0.00555 " pathEditMode="relative" rAng="0" ptsTypes="AA">
-                                      <p:cBhvr>
-                                        <p:cTn id="26" dur="2000" spd="-100000" fill="hold"/>
-                                        <p:tgtEl>
-                                          <p:spTgt spid="10"/>
+                                          <p:spTgt spid="20"/>
                                         </p:tgtEl>
                                         <p:attrNameLst>
                                           <p:attrName>ppt_x</p:attrName>
                                           <p:attrName>ppt_y</p:attrName>
                                         </p:attrNameLst>
                                       </p:cBhvr>
-                                      <p:rCtr x="-9010" y="278"/>
+                                      <p:rCtr x="12786" y="2037"/>
                                     </p:animMotion>
                                   </p:childTnLst>
                                 </p:cTn>
@@ -17136,50 +18793,54 @@
                             </p:stCondLst>
                             <p:childTnLst>
                               <p:par>
-                                <p:cTn id="29" presetID="1" presetClass="entr" presetSubtype="0" fill="hold" grpId="1" nodeType="clickEffect">
+                                <p:cTn id="29" presetID="42" presetClass="path" presetSubtype="0" accel="50000" decel="50000" autoRev="1" fill="hold" grpId="0" nodeType="clickEffect">
                                   <p:stCondLst>
                                     <p:cond delay="0"/>
                                   </p:stCondLst>
                                   <p:childTnLst>
-                                    <p:set>
+                                    <p:animMotion origin="layout" path="M -2.91667E-6 -3.33333E-6 L 0.00977 -0.2125 " pathEditMode="relative" rAng="0" ptsTypes="AA">
                                       <p:cBhvr>
-                                        <p:cTn id="30" dur="1" fill="hold">
-                                          <p:stCondLst>
-                                            <p:cond delay="0"/>
-                                          </p:stCondLst>
-                                        </p:cTn>
+                                        <p:cTn id="30" dur="2000" fill="hold"/>
                                         <p:tgtEl>
-                                          <p:spTgt spid="9"/>
-                                        </p:tgtEl>
-                                        <p:attrNameLst>
-                                          <p:attrName>style.visibility</p:attrName>
-                                        </p:attrNameLst>
-                                      </p:cBhvr>
-                                      <p:to>
-                                        <p:strVal val="visible"/>
-                                      </p:to>
-                                    </p:set>
-                                  </p:childTnLst>
-                                </p:cTn>
-                              </p:par>
-                              <p:par>
-                                <p:cTn id="31" presetID="42" presetClass="path" presetSubtype="0" accel="50000" decel="50000" fill="hold" grpId="0" nodeType="withEffect">
-                                  <p:stCondLst>
-                                    <p:cond delay="0"/>
-                                  </p:stCondLst>
-                                  <p:childTnLst>
-                                    <p:animMotion origin="layout" path="M -2.08333E-7 -2.22222E-6 L -0.18008 -0.04907 " pathEditMode="relative" rAng="0" ptsTypes="AA">
-                                      <p:cBhvr>
-                                        <p:cTn id="32" dur="2000" spd="-100000" fill="hold"/>
-                                        <p:tgtEl>
-                                          <p:spTgt spid="9"/>
+                                          <p:spTgt spid="46"/>
                                         </p:tgtEl>
                                         <p:attrNameLst>
                                           <p:attrName>ppt_x</p:attrName>
                                           <p:attrName>ppt_y</p:attrName>
                                         </p:attrNameLst>
                                       </p:cBhvr>
-                                      <p:rCtr x="-9010" y="-2454"/>
+                                      <p:rCtr x="482" y="-10625"/>
+                                    </p:animMotion>
+                                  </p:childTnLst>
+                                </p:cTn>
+                              </p:par>
+                            </p:childTnLst>
+                          </p:cTn>
+                        </p:par>
+                        <p:par>
+                          <p:cTn id="31" fill="hold">
+                            <p:stCondLst>
+                              <p:cond delay="4000"/>
+                            </p:stCondLst>
+                            <p:childTnLst>
+                              <p:par>
+                                <p:cTn id="32" presetID="42" presetClass="path" presetSubtype="0" accel="50000" decel="50000" autoRev="1" fill="hold" grpId="0" nodeType="afterEffect">
+                                  <p:stCondLst>
+                                    <p:cond delay="0"/>
+                                  </p:stCondLst>
+                                  <p:childTnLst>
+                                    <p:animMotion origin="layout" path="M 3.33333E-6 3.33333E-6 L 0.26979 0.16875 " pathEditMode="relative" rAng="0" ptsTypes="AA">
+                                      <p:cBhvr>
+                                        <p:cTn id="33" dur="3000" fill="hold"/>
+                                        <p:tgtEl>
+                                          <p:spTgt spid="45"/>
+                                        </p:tgtEl>
+                                        <p:attrNameLst>
+                                          <p:attrName>ppt_x</p:attrName>
+                                          <p:attrName>ppt_y</p:attrName>
+                                        </p:attrNameLst>
+                                      </p:cBhvr>
+                                      <p:rCtr x="13490" y="8426"/>
                                     </p:animMotion>
                                   </p:childTnLst>
                                 </p:cTn>
@@ -17191,79 +18852,26 @@
                     </p:cTn>
                   </p:par>
                   <p:par>
-                    <p:cTn id="33" fill="hold">
+                    <p:cTn id="34" fill="hold">
                       <p:stCondLst>
                         <p:cond delay="indefinite"/>
                       </p:stCondLst>
                       <p:childTnLst>
                         <p:par>
-                          <p:cTn id="34" fill="hold">
+                          <p:cTn id="35" fill="hold">
                             <p:stCondLst>
                               <p:cond delay="0"/>
                             </p:stCondLst>
                             <p:childTnLst>
                               <p:par>
-                                <p:cTn id="35" presetID="10" presetClass="entr" presetSubtype="0" fill="hold" grpId="0" nodeType="clickEffect">
+                                <p:cTn id="36" presetID="10" presetClass="entr" presetSubtype="0" fill="hold" nodeType="clickEffect">
                                   <p:stCondLst>
                                     <p:cond delay="0"/>
                                   </p:stCondLst>
                                   <p:childTnLst>
                                     <p:set>
                                       <p:cBhvr>
-                                        <p:cTn id="36" dur="1" fill="hold">
-                                          <p:stCondLst>
-                                            <p:cond delay="0"/>
-                                          </p:stCondLst>
-                                        </p:cTn>
-                                        <p:tgtEl>
-                                          <p:spTgt spid="13"/>
-                                        </p:tgtEl>
-                                        <p:attrNameLst>
-                                          <p:attrName>style.visibility</p:attrName>
-                                        </p:attrNameLst>
-                                      </p:cBhvr>
-                                      <p:to>
-                                        <p:strVal val="visible"/>
-                                      </p:to>
-                                    </p:set>
-                                    <p:animEffect transition="in" filter="fade">
-                                      <p:cBhvr>
-                                        <p:cTn id="37" dur="1000"/>
-                                        <p:tgtEl>
-                                          <p:spTgt spid="13"/>
-                                        </p:tgtEl>
-                                      </p:cBhvr>
-                                    </p:animEffect>
-                                  </p:childTnLst>
-                                </p:cTn>
-                              </p:par>
-                            </p:childTnLst>
-                          </p:cTn>
-                        </p:par>
-                      </p:childTnLst>
-                    </p:cTn>
-                  </p:par>
-                  <p:par>
-                    <p:cTn id="38" fill="hold">
-                      <p:stCondLst>
-                        <p:cond delay="indefinite"/>
-                      </p:stCondLst>
-                      <p:childTnLst>
-                        <p:par>
-                          <p:cTn id="39" fill="hold">
-                            <p:stCondLst>
-                              <p:cond delay="0"/>
-                            </p:stCondLst>
-                            <p:childTnLst>
-                              <p:par>
-                                <p:cTn id="40" presetID="10" presetClass="entr" presetSubtype="0" fill="hold" grpId="0" nodeType="clickEffect">
-                                  <p:stCondLst>
-                                    <p:cond delay="0"/>
-                                  </p:stCondLst>
-                                  <p:childTnLst>
-                                    <p:set>
-                                      <p:cBhvr>
-                                        <p:cTn id="41" dur="1" fill="hold">
+                                        <p:cTn id="37" dur="1" fill="hold">
                                           <p:stCondLst>
                                             <p:cond delay="0"/>
                                           </p:stCondLst>
@@ -17281,7 +18889,7 @@
                                     </p:set>
                                     <p:animEffect transition="in" filter="fade">
                                       <p:cBhvr>
-                                        <p:cTn id="42" dur="500"/>
+                                        <p:cTn id="38" dur="500"/>
                                         <p:tgtEl>
                                           <p:spTgt spid="16"/>
                                         </p:tgtEl>
@@ -17297,26 +18905,26 @@
                     </p:cTn>
                   </p:par>
                   <p:par>
-                    <p:cTn id="43" fill="hold">
+                    <p:cTn id="39" fill="hold">
                       <p:stCondLst>
                         <p:cond delay="indefinite"/>
                       </p:stCondLst>
                       <p:childTnLst>
                         <p:par>
-                          <p:cTn id="44" fill="hold">
+                          <p:cTn id="40" fill="hold">
                             <p:stCondLst>
                               <p:cond delay="0"/>
                             </p:stCondLst>
                             <p:childTnLst>
                               <p:par>
-                                <p:cTn id="45" presetID="10" presetClass="entr" presetSubtype="0" fill="hold" grpId="0" nodeType="clickEffect">
+                                <p:cTn id="41" presetID="2" presetClass="entr" presetSubtype="6" fill="hold" nodeType="clickEffect">
                                   <p:stCondLst>
                                     <p:cond delay="0"/>
                                   </p:stCondLst>
                                   <p:childTnLst>
                                     <p:set>
                                       <p:cBhvr>
-                                        <p:cTn id="46" dur="1" fill="hold">
+                                        <p:cTn id="42" dur="1" fill="hold">
                                           <p:stCondLst>
                                             <p:cond delay="0"/>
                                           </p:stCondLst>
@@ -17332,268 +18940,52 @@
                                         <p:strVal val="visible"/>
                                       </p:to>
                                     </p:set>
-                                    <p:animEffect transition="in" filter="fade">
-                                      <p:cBhvr>
-                                        <p:cTn id="47" dur="1000"/>
+                                    <p:anim calcmode="lin" valueType="num">
+                                      <p:cBhvr additive="base">
+                                        <p:cTn id="43" dur="1000" fill="hold"/>
                                         <p:tgtEl>
                                           <p:spTgt spid="19"/>
                                         </p:tgtEl>
+                                        <p:attrNameLst>
+                                          <p:attrName>ppt_x</p:attrName>
+                                        </p:attrNameLst>
                                       </p:cBhvr>
-                                    </p:animEffect>
-                                  </p:childTnLst>
-                                </p:cTn>
-                              </p:par>
-                            </p:childTnLst>
-                          </p:cTn>
-                        </p:par>
-                      </p:childTnLst>
-                    </p:cTn>
-                  </p:par>
-                  <p:par>
-                    <p:cTn id="48" fill="hold">
-                      <p:stCondLst>
-                        <p:cond delay="indefinite"/>
-                      </p:stCondLst>
-                      <p:childTnLst>
-                        <p:par>
-                          <p:cTn id="49" fill="hold">
-                            <p:stCondLst>
-                              <p:cond delay="0"/>
-                            </p:stCondLst>
-                            <p:childTnLst>
-                              <p:par>
-                                <p:cTn id="50" presetID="1" presetClass="entr" presetSubtype="0" fill="hold" grpId="1" nodeType="clickEffect">
-                                  <p:stCondLst>
-                                    <p:cond delay="0"/>
-                                  </p:stCondLst>
-                                  <p:childTnLst>
-                                    <p:set>
-                                      <p:cBhvr>
-                                        <p:cTn id="51" dur="1" fill="hold">
-                                          <p:stCondLst>
-                                            <p:cond delay="0"/>
-                                          </p:stCondLst>
-                                        </p:cTn>
+                                      <p:tavLst>
+                                        <p:tav tm="0">
+                                          <p:val>
+                                            <p:strVal val="1+#ppt_w/2"/>
+                                          </p:val>
+                                        </p:tav>
+                                        <p:tav tm="100000">
+                                          <p:val>
+                                            <p:strVal val="#ppt_x"/>
+                                          </p:val>
+                                        </p:tav>
+                                      </p:tavLst>
+                                    </p:anim>
+                                    <p:anim calcmode="lin" valueType="num">
+                                      <p:cBhvr additive="base">
+                                        <p:cTn id="44" dur="1000" fill="hold"/>
                                         <p:tgtEl>
-                                          <p:spTgt spid="14"/>
+                                          <p:spTgt spid="19"/>
                                         </p:tgtEl>
                                         <p:attrNameLst>
-                                          <p:attrName>style.visibility</p:attrName>
-                                        </p:attrNameLst>
-                                      </p:cBhvr>
-                                      <p:to>
-                                        <p:strVal val="visible"/>
-                                      </p:to>
-                                    </p:set>
-                                  </p:childTnLst>
-                                </p:cTn>
-                              </p:par>
-                              <p:par>
-                                <p:cTn id="52" presetID="42" presetClass="path" presetSubtype="0" accel="50000" decel="50000" fill="hold" grpId="0" nodeType="withEffect">
-                                  <p:stCondLst>
-                                    <p:cond delay="0"/>
-                                  </p:stCondLst>
-                                  <p:childTnLst>
-                                    <p:animMotion origin="layout" path="M -6.25E-7 -4.81481E-6 L -0.35599 0.01389 " pathEditMode="relative" rAng="0" ptsTypes="AA">
-                                      <p:cBhvr>
-                                        <p:cTn id="53" dur="2000" spd="-100000" fill="hold"/>
-                                        <p:tgtEl>
-                                          <p:spTgt spid="14"/>
-                                        </p:tgtEl>
-                                        <p:attrNameLst>
-                                          <p:attrName>ppt_x</p:attrName>
                                           <p:attrName>ppt_y</p:attrName>
                                         </p:attrNameLst>
                                       </p:cBhvr>
-                                      <p:rCtr x="-17799" y="694"/>
-                                    </p:animMotion>
-                                  </p:childTnLst>
-                                </p:cTn>
-                              </p:par>
-                            </p:childTnLst>
-                          </p:cTn>
-                        </p:par>
-                      </p:childTnLst>
-                    </p:cTn>
-                  </p:par>
-                  <p:par>
-                    <p:cTn id="54" fill="hold">
-                      <p:stCondLst>
-                        <p:cond delay="indefinite"/>
-                      </p:stCondLst>
-                      <p:childTnLst>
-                        <p:par>
-                          <p:cTn id="55" fill="hold">
-                            <p:stCondLst>
-                              <p:cond delay="0"/>
-                            </p:stCondLst>
-                            <p:childTnLst>
-                              <p:par>
-                                <p:cTn id="56" presetID="1" presetClass="entr" presetSubtype="0" fill="hold" grpId="1" nodeType="clickEffect">
-                                  <p:stCondLst>
-                                    <p:cond delay="0"/>
-                                  </p:stCondLst>
-                                  <p:childTnLst>
-                                    <p:set>
-                                      <p:cBhvr>
-                                        <p:cTn id="57" dur="1" fill="hold">
-                                          <p:stCondLst>
-                                            <p:cond delay="0"/>
-                                          </p:stCondLst>
-                                        </p:cTn>
-                                        <p:tgtEl>
-                                          <p:spTgt spid="15"/>
-                                        </p:tgtEl>
-                                        <p:attrNameLst>
-                                          <p:attrName>style.visibility</p:attrName>
-                                        </p:attrNameLst>
-                                      </p:cBhvr>
-                                      <p:to>
-                                        <p:strVal val="visible"/>
-                                      </p:to>
-                                    </p:set>
-                                  </p:childTnLst>
-                                </p:cTn>
-                              </p:par>
-                              <p:par>
-                                <p:cTn id="58" presetID="42" presetClass="path" presetSubtype="0" accel="50000" decel="50000" fill="hold" grpId="0" nodeType="withEffect">
-                                  <p:stCondLst>
-                                    <p:cond delay="0"/>
-                                  </p:stCondLst>
-                                  <p:childTnLst>
-                                    <p:animMotion origin="layout" path="M -6.25E-7 1.85185E-6 L -0.35443 -0.07361 " pathEditMode="relative" rAng="0" ptsTypes="AA">
-                                      <p:cBhvr>
-                                        <p:cTn id="59" dur="2000" spd="-100000" fill="hold"/>
-                                        <p:tgtEl>
-                                          <p:spTgt spid="15"/>
-                                        </p:tgtEl>
-                                        <p:attrNameLst>
-                                          <p:attrName>ppt_x</p:attrName>
-                                          <p:attrName>ppt_y</p:attrName>
-                                        </p:attrNameLst>
-                                      </p:cBhvr>
-                                      <p:rCtr x="-17721" y="-3681"/>
-                                    </p:animMotion>
-                                  </p:childTnLst>
-                                </p:cTn>
-                              </p:par>
-                            </p:childTnLst>
-                          </p:cTn>
-                        </p:par>
-                      </p:childTnLst>
-                    </p:cTn>
-                  </p:par>
-                  <p:par>
-                    <p:cTn id="60" fill="hold">
-                      <p:stCondLst>
-                        <p:cond delay="indefinite"/>
-                      </p:stCondLst>
-                      <p:childTnLst>
-                        <p:par>
-                          <p:cTn id="61" fill="hold">
-                            <p:stCondLst>
-                              <p:cond delay="0"/>
-                            </p:stCondLst>
-                            <p:childTnLst>
-                              <p:par>
-                                <p:cTn id="62" presetID="1" presetClass="entr" presetSubtype="0" fill="hold" grpId="1" nodeType="clickEffect">
-                                  <p:stCondLst>
-                                    <p:cond delay="0"/>
-                                  </p:stCondLst>
-                                  <p:childTnLst>
-                                    <p:set>
-                                      <p:cBhvr>
-                                        <p:cTn id="63" dur="1" fill="hold">
-                                          <p:stCondLst>
-                                            <p:cond delay="0"/>
-                                          </p:stCondLst>
-                                        </p:cTn>
-                                        <p:tgtEl>
-                                          <p:spTgt spid="12"/>
-                                        </p:tgtEl>
-                                        <p:attrNameLst>
-                                          <p:attrName>style.visibility</p:attrName>
-                                        </p:attrNameLst>
-                                      </p:cBhvr>
-                                      <p:to>
-                                        <p:strVal val="visible"/>
-                                      </p:to>
-                                    </p:set>
-                                  </p:childTnLst>
-                                </p:cTn>
-                              </p:par>
-                              <p:par>
-                                <p:cTn id="64" presetID="42" presetClass="path" presetSubtype="0" accel="50000" decel="50000" fill="hold" grpId="0" nodeType="withEffect">
-                                  <p:stCondLst>
-                                    <p:cond delay="0"/>
-                                  </p:stCondLst>
-                                  <p:childTnLst>
-                                    <p:animMotion origin="layout" path="M -2.08333E-6 1.11111E-6 L -0.26706 -0.20347 " pathEditMode="relative" rAng="0" ptsTypes="AA">
-                                      <p:cBhvr>
-                                        <p:cTn id="65" dur="2000" spd="-100000" fill="hold"/>
-                                        <p:tgtEl>
-                                          <p:spTgt spid="12"/>
-                                        </p:tgtEl>
-                                        <p:attrNameLst>
-                                          <p:attrName>ppt_x</p:attrName>
-                                          <p:attrName>ppt_y</p:attrName>
-                                        </p:attrNameLst>
-                                      </p:cBhvr>
-                                      <p:rCtr x="-13359" y="-10185"/>
-                                    </p:animMotion>
-                                  </p:childTnLst>
-                                </p:cTn>
-                              </p:par>
-                            </p:childTnLst>
-                          </p:cTn>
-                        </p:par>
-                      </p:childTnLst>
-                    </p:cTn>
-                  </p:par>
-                  <p:par>
-                    <p:cTn id="66" fill="hold">
-                      <p:stCondLst>
-                        <p:cond delay="indefinite"/>
-                      </p:stCondLst>
-                      <p:childTnLst>
-                        <p:par>
-                          <p:cTn id="67" fill="hold">
-                            <p:stCondLst>
-                              <p:cond delay="0"/>
-                            </p:stCondLst>
-                            <p:childTnLst>
-                              <p:par>
-                                <p:cTn id="68" presetID="10" presetClass="entr" presetSubtype="0" fill="hold" grpId="0" nodeType="clickEffect">
-                                  <p:stCondLst>
-                                    <p:cond delay="0"/>
-                                  </p:stCondLst>
-                                  <p:childTnLst>
-                                    <p:set>
-                                      <p:cBhvr>
-                                        <p:cTn id="69" dur="1" fill="hold">
-                                          <p:stCondLst>
-                                            <p:cond delay="0"/>
-                                          </p:stCondLst>
-                                        </p:cTn>
-                                        <p:tgtEl>
-                                          <p:spTgt spid="17"/>
-                                        </p:tgtEl>
-                                        <p:attrNameLst>
-                                          <p:attrName>style.visibility</p:attrName>
-                                        </p:attrNameLst>
-                                      </p:cBhvr>
-                                      <p:to>
-                                        <p:strVal val="visible"/>
-                                      </p:to>
-                                    </p:set>
-                                    <p:animEffect transition="in" filter="fade">
-                                      <p:cBhvr>
-                                        <p:cTn id="70" dur="500"/>
-                                        <p:tgtEl>
-                                          <p:spTgt spid="17"/>
-                                        </p:tgtEl>
-                                      </p:cBhvr>
-                                    </p:animEffect>
+                                      <p:tavLst>
+                                        <p:tav tm="0">
+                                          <p:val>
+                                            <p:strVal val="1+#ppt_h/2"/>
+                                          </p:val>
+                                        </p:tav>
+                                        <p:tav tm="100000">
+                                          <p:val>
+                                            <p:strVal val="#ppt_y"/>
+                                          </p:val>
+                                        </p:tav>
+                                      </p:tavLst>
+                                    </p:anim>
                                   </p:childTnLst>
                                 </p:cTn>
                               </p:par>
@@ -17625,28 +19017,75 @@
       </p:par>
     </p:tnLst>
     <p:bldLst>
-      <p:bldP spid="16" grpId="0" animBg="1"/>
-      <p:bldP spid="3" grpId="0" animBg="1"/>
-      <p:bldP spid="3" grpId="1" animBg="1"/>
-      <p:bldP spid="4" grpId="0" animBg="1"/>
-      <p:bldP spid="4" grpId="1" animBg="1"/>
-      <p:bldP spid="5" grpId="0" animBg="1"/>
-      <p:bldP spid="5" grpId="1" animBg="1"/>
-      <p:bldP spid="9" grpId="0" animBg="1"/>
-      <p:bldP spid="9" grpId="1" animBg="1"/>
-      <p:bldP spid="10" grpId="0" animBg="1"/>
-      <p:bldP spid="10" grpId="1" animBg="1"/>
-      <p:bldP spid="12" grpId="0" animBg="1"/>
-      <p:bldP spid="12" grpId="1" animBg="1"/>
-      <p:bldP spid="13" grpId="0" animBg="1"/>
-      <p:bldP spid="14" grpId="0" animBg="1"/>
-      <p:bldP spid="14" grpId="1" animBg="1"/>
-      <p:bldP spid="15" grpId="0" animBg="1"/>
-      <p:bldP spid="15" grpId="1" animBg="1"/>
-      <p:bldP spid="17" grpId="0" animBg="1"/>
-      <p:bldP spid="19" grpId="0" animBg="1"/>
+      <p:bldP spid="34" grpId="0" animBg="1"/>
+      <p:bldP spid="34" grpId="1" animBg="1"/>
+      <p:bldP spid="45" grpId="0" animBg="1"/>
+      <p:bldP spid="25" grpId="0" animBg="1"/>
+      <p:bldP spid="25" grpId="1" animBg="1"/>
+      <p:bldP spid="26" grpId="0" animBg="1"/>
+      <p:bldP spid="26" grpId="1" animBg="1"/>
+      <p:bldP spid="46" grpId="0" animBg="1"/>
+      <p:bldP spid="20" grpId="0" animBg="1"/>
     </p:bldLst>
   </p:timing>
+</p:sld>
+</file>
+
+<file path=ppt/slides/slide7.xml><?xml version="1.0" encoding="utf-8"?>
+<p:sld xmlns:a="http://schemas.openxmlformats.org/drawingml/2006/main" xmlns:r="http://schemas.openxmlformats.org/officeDocument/2006/relationships" xmlns:p="http://schemas.openxmlformats.org/presentationml/2006/main">
+  <p:cSld>
+    <p:spTree>
+      <p:nvGrpSpPr>
+        <p:cNvPr id="1" name=""/>
+        <p:cNvGrpSpPr/>
+        <p:nvPr/>
+      </p:nvGrpSpPr>
+      <p:grpSpPr>
+        <a:xfrm>
+          <a:off x="0" y="0"/>
+          <a:ext cx="0" cy="0"/>
+          <a:chOff x="0" y="0"/>
+          <a:chExt cx="0" cy="0"/>
+        </a:xfrm>
+      </p:grpSpPr>
+      <p:sp>
+        <p:nvSpPr>
+          <p:cNvPr id="2" name="Title 1">
+            <a:extLst>
+              <a:ext uri="{FF2B5EF4-FFF2-40B4-BE49-F238E27FC236}">
+                <a16:creationId xmlns:a16="http://schemas.microsoft.com/office/drawing/2014/main" id="{DFB02394-9405-43A4-BB6A-AF72622BBE2E}"/>
+              </a:ext>
+            </a:extLst>
+          </p:cNvPr>
+          <p:cNvSpPr>
+            <a:spLocks noGrp="1"/>
+          </p:cNvSpPr>
+          <p:nvPr>
+            <p:ph type="title"/>
+          </p:nvPr>
+        </p:nvSpPr>
+        <p:spPr/>
+        <p:txBody>
+          <a:bodyPr/>
+          <a:lstStyle/>
+          <a:p>
+            <a:r>
+              <a:rPr lang="en-US" dirty="0"/>
+              <a:t>End</a:t>
+            </a:r>
+          </a:p>
+        </p:txBody>
+      </p:sp>
+    </p:spTree>
+    <p:extLst>
+      <p:ext uri="{BB962C8B-B14F-4D97-AF65-F5344CB8AC3E}">
+        <p14:creationId xmlns:p14="http://schemas.microsoft.com/office/powerpoint/2010/main" val="413529376"/>
+      </p:ext>
+    </p:extLst>
+  </p:cSld>
+  <p:clrMapOvr>
+    <a:masterClrMapping/>
+  </p:clrMapOvr>
 </p:sld>
 </file>
 

</xml_diff>

<commit_message>
Updated with assumption and dependency
</commit_message>
<xml_diff>
--- a/openshift_process.pptx
+++ b/openshift_process.pptx
@@ -206,7 +206,7 @@
           <a:p>
             <a:fld id="{421F6B50-8E66-47CB-A2B6-8042DD6B6A79}" type="datetimeFigureOut">
               <a:rPr lang="en-US" smtClean="0"/>
-              <a:t>8/26/2019</a:t>
+              <a:t>8/27/2019</a:t>
             </a:fld>
             <a:endParaRPr lang="en-US"/>
           </a:p>
@@ -604,7 +604,7 @@
           <a:p>
             <a:fld id="{BD7B1233-555D-48FA-9E44-77CCB64FCC03}" type="datetimeFigureOut">
               <a:rPr lang="en-US" smtClean="0"/>
-              <a:t>8/26/2019</a:t>
+              <a:t>8/27/2019</a:t>
             </a:fld>
             <a:endParaRPr lang="en-US"/>
           </a:p>
@@ -779,7 +779,7 @@
           <a:p>
             <a:fld id="{BD7B1233-555D-48FA-9E44-77CCB64FCC03}" type="datetimeFigureOut">
               <a:rPr lang="en-US" smtClean="0"/>
-              <a:t>8/26/2019</a:t>
+              <a:t>8/27/2019</a:t>
             </a:fld>
             <a:endParaRPr lang="en-US"/>
           </a:p>
@@ -959,7 +959,7 @@
           <a:p>
             <a:fld id="{BD7B1233-555D-48FA-9E44-77CCB64FCC03}" type="datetimeFigureOut">
               <a:rPr lang="en-US" smtClean="0"/>
-              <a:t>8/26/2019</a:t>
+              <a:t>8/27/2019</a:t>
             </a:fld>
             <a:endParaRPr lang="en-US"/>
           </a:p>
@@ -1134,7 +1134,7 @@
           <a:p>
             <a:fld id="{BD7B1233-555D-48FA-9E44-77CCB64FCC03}" type="datetimeFigureOut">
               <a:rPr lang="en-US" smtClean="0"/>
-              <a:t>8/26/2019</a:t>
+              <a:t>8/27/2019</a:t>
             </a:fld>
             <a:endParaRPr lang="en-US"/>
           </a:p>
@@ -1380,7 +1380,7 @@
           <a:p>
             <a:fld id="{BD7B1233-555D-48FA-9E44-77CCB64FCC03}" type="datetimeFigureOut">
               <a:rPr lang="en-US" smtClean="0"/>
-              <a:t>8/26/2019</a:t>
+              <a:t>8/27/2019</a:t>
             </a:fld>
             <a:endParaRPr lang="en-US"/>
           </a:p>
@@ -1617,7 +1617,7 @@
           <a:p>
             <a:fld id="{BD7B1233-555D-48FA-9E44-77CCB64FCC03}" type="datetimeFigureOut">
               <a:rPr lang="en-US" smtClean="0"/>
-              <a:t>8/26/2019</a:t>
+              <a:t>8/27/2019</a:t>
             </a:fld>
             <a:endParaRPr lang="en-US"/>
           </a:p>
@@ -1984,7 +1984,7 @@
           <a:p>
             <a:fld id="{BD7B1233-555D-48FA-9E44-77CCB64FCC03}" type="datetimeFigureOut">
               <a:rPr lang="en-US" smtClean="0"/>
-              <a:t>8/26/2019</a:t>
+              <a:t>8/27/2019</a:t>
             </a:fld>
             <a:endParaRPr lang="en-US"/>
           </a:p>
@@ -2113,7 +2113,7 @@
           <a:p>
             <a:fld id="{BD7B1233-555D-48FA-9E44-77CCB64FCC03}" type="datetimeFigureOut">
               <a:rPr lang="en-US" smtClean="0"/>
-              <a:t>8/26/2019</a:t>
+              <a:t>8/27/2019</a:t>
             </a:fld>
             <a:endParaRPr lang="en-US"/>
           </a:p>
@@ -2208,7 +2208,7 @@
           <a:p>
             <a:fld id="{BD7B1233-555D-48FA-9E44-77CCB64FCC03}" type="datetimeFigureOut">
               <a:rPr lang="en-US" smtClean="0"/>
-              <a:t>8/26/2019</a:t>
+              <a:t>8/27/2019</a:t>
             </a:fld>
             <a:endParaRPr lang="en-US"/>
           </a:p>
@@ -2485,7 +2485,7 @@
           <a:p>
             <a:fld id="{BD7B1233-555D-48FA-9E44-77CCB64FCC03}" type="datetimeFigureOut">
               <a:rPr lang="en-US" smtClean="0"/>
-              <a:t>8/26/2019</a:t>
+              <a:t>8/27/2019</a:t>
             </a:fld>
             <a:endParaRPr lang="en-US"/>
           </a:p>
@@ -2742,7 +2742,7 @@
           <a:p>
             <a:fld id="{BD7B1233-555D-48FA-9E44-77CCB64FCC03}" type="datetimeFigureOut">
               <a:rPr lang="en-US" smtClean="0"/>
-              <a:t>8/26/2019</a:t>
+              <a:t>8/27/2019</a:t>
             </a:fld>
             <a:endParaRPr lang="en-US"/>
           </a:p>
@@ -2955,7 +2955,7 @@
           <a:p>
             <a:fld id="{BD7B1233-555D-48FA-9E44-77CCB64FCC03}" type="datetimeFigureOut">
               <a:rPr lang="en-US" smtClean="0"/>
-              <a:t>8/26/2019</a:t>
+              <a:t>8/27/2019</a:t>
             </a:fld>
             <a:endParaRPr lang="en-US"/>
           </a:p>
@@ -19076,6 +19076,109 @@
           </a:p>
         </p:txBody>
       </p:sp>
+      <p:sp>
+        <p:nvSpPr>
+          <p:cNvPr id="3" name="TextBox 2">
+            <a:extLst>
+              <a:ext uri="{FF2B5EF4-FFF2-40B4-BE49-F238E27FC236}">
+                <a16:creationId xmlns:a16="http://schemas.microsoft.com/office/drawing/2014/main" id="{DF32ECA3-056B-4FAD-9B5D-16BD89F20C35}"/>
+              </a:ext>
+            </a:extLst>
+          </p:cNvPr>
+          <p:cNvSpPr txBox="1"/>
+          <p:nvPr/>
+        </p:nvSpPr>
+        <p:spPr>
+          <a:xfrm>
+            <a:off x="1784412" y="1233996"/>
+            <a:ext cx="7830104" cy="3416320"/>
+          </a:xfrm>
+          <a:prstGeom prst="rect">
+            <a:avLst/>
+          </a:prstGeom>
+          <a:noFill/>
+        </p:spPr>
+        <p:txBody>
+          <a:bodyPr wrap="square" rtlCol="0">
+            <a:spAutoFit/>
+          </a:bodyPr>
+          <a:lstStyle/>
+          <a:p>
+            <a:r>
+              <a:rPr lang="en-US" dirty="0"/>
+              <a:t>Assumption:</a:t>
+            </a:r>
+          </a:p>
+          <a:p>
+            <a:pPr marL="285750" indent="-285750">
+              <a:buFontTx/>
+              <a:buChar char="-"/>
+            </a:pPr>
+            <a:r>
+              <a:rPr lang="en-US" dirty="0"/>
+              <a:t>Client has license for Multi-schema</a:t>
+            </a:r>
+          </a:p>
+          <a:p>
+            <a:pPr marL="285750" indent="-285750">
+              <a:buFontTx/>
+              <a:buChar char="-"/>
+            </a:pPr>
+            <a:r>
+              <a:rPr lang="en-US" dirty="0"/>
+              <a:t>It is possible for a Multi-schema setup with individual configuration schemas while sharing non-config schemas (meta, statistics, master, transaction)</a:t>
+            </a:r>
+          </a:p>
+          <a:p>
+            <a:endParaRPr lang="en-US" dirty="0"/>
+          </a:p>
+          <a:p>
+            <a:r>
+              <a:rPr lang="en-US" dirty="0"/>
+              <a:t>Product Features Required:</a:t>
+            </a:r>
+          </a:p>
+          <a:p>
+            <a:pPr marL="285750" indent="-285750">
+              <a:buFontTx/>
+              <a:buChar char="-"/>
+            </a:pPr>
+            <a:r>
+              <a:rPr lang="en-US" dirty="0"/>
+              <a:t>Multi-schema support</a:t>
+            </a:r>
+          </a:p>
+          <a:p>
+            <a:endParaRPr lang="en-US" dirty="0"/>
+          </a:p>
+          <a:p>
+            <a:r>
+              <a:rPr lang="en-US" dirty="0"/>
+              <a:t>Product Enhancement:</a:t>
+            </a:r>
+          </a:p>
+          <a:p>
+            <a:pPr marL="285750" indent="-285750">
+              <a:buFontTx/>
+              <a:buChar char="-"/>
+            </a:pPr>
+            <a:r>
+              <a:rPr lang="en-US" dirty="0"/>
+              <a:t>Configuration inheritance</a:t>
+            </a:r>
+          </a:p>
+          <a:p>
+            <a:pPr marL="285750" indent="-285750">
+              <a:buFontTx/>
+              <a:buChar char="-"/>
+            </a:pPr>
+            <a:endParaRPr lang="en-US" dirty="0"/>
+          </a:p>
+          <a:p>
+            <a:endParaRPr lang="en-US" dirty="0"/>
+          </a:p>
+        </p:txBody>
+      </p:sp>
     </p:spTree>
     <p:extLst>
       <p:ext uri="{BB962C8B-B14F-4D97-AF65-F5344CB8AC3E}">

</xml_diff>